<commit_message>
Updated infographic and headings
</commit_message>
<xml_diff>
--- a/docs/source/img/publishing_extensions.pptx
+++ b/docs/source/img/publishing_extensions.pptx
@@ -6,6 +6,8 @@
   </p:sldMasterIdLst>
   <p:sldIdLst>
     <p:sldId id="256" r:id="rId2"/>
+    <p:sldId id="258" r:id="rId3"/>
+    <p:sldId id="257" r:id="rId4"/>
   </p:sldIdLst>
   <p:sldSz cx="12192000" cy="6858000"/>
   <p:notesSz cx="6858000" cy="9144000"/>
@@ -124,6 +126,813 @@
 </file>
 
 <file path=ppt/diagrams/colors1.xml><?xml version="1.0" encoding="utf-8"?>
+<dgm:colorsDef xmlns:dgm="http://schemas.openxmlformats.org/drawingml/2006/diagram" xmlns:a="http://schemas.openxmlformats.org/drawingml/2006/main" uniqueId="urn:microsoft.com/office/officeart/2005/8/colors/accent1_1">
+  <dgm:title val=""/>
+  <dgm:desc val=""/>
+  <dgm:catLst>
+    <dgm:cat type="accent1" pri="11100"/>
+  </dgm:catLst>
+  <dgm:styleLbl name="node0">
+    <dgm:fillClrLst meth="repeat">
+      <a:schemeClr val="lt1"/>
+    </dgm:fillClrLst>
+    <dgm:linClrLst meth="repeat">
+      <a:schemeClr val="accent1">
+        <a:shade val="80000"/>
+      </a:schemeClr>
+    </dgm:linClrLst>
+    <dgm:effectClrLst/>
+    <dgm:txLinClrLst/>
+    <dgm:txFillClrLst meth="repeat">
+      <a:schemeClr val="dk1"/>
+    </dgm:txFillClrLst>
+    <dgm:txEffectClrLst/>
+  </dgm:styleLbl>
+  <dgm:styleLbl name="alignNode1">
+    <dgm:fillClrLst meth="repeat">
+      <a:schemeClr val="lt1"/>
+    </dgm:fillClrLst>
+    <dgm:linClrLst meth="repeat">
+      <a:schemeClr val="accent1">
+        <a:shade val="80000"/>
+      </a:schemeClr>
+    </dgm:linClrLst>
+    <dgm:effectClrLst/>
+    <dgm:txLinClrLst/>
+    <dgm:txFillClrLst meth="repeat">
+      <a:schemeClr val="dk1"/>
+    </dgm:txFillClrLst>
+    <dgm:txEffectClrLst/>
+  </dgm:styleLbl>
+  <dgm:styleLbl name="node1">
+    <dgm:fillClrLst meth="repeat">
+      <a:schemeClr val="lt1"/>
+    </dgm:fillClrLst>
+    <dgm:linClrLst meth="repeat">
+      <a:schemeClr val="accent1">
+        <a:shade val="80000"/>
+      </a:schemeClr>
+    </dgm:linClrLst>
+    <dgm:effectClrLst/>
+    <dgm:txLinClrLst/>
+    <dgm:txFillClrLst meth="repeat">
+      <a:schemeClr val="dk1"/>
+    </dgm:txFillClrLst>
+    <dgm:txEffectClrLst/>
+  </dgm:styleLbl>
+  <dgm:styleLbl name="lnNode1">
+    <dgm:fillClrLst meth="repeat">
+      <a:schemeClr val="lt1"/>
+    </dgm:fillClrLst>
+    <dgm:linClrLst meth="repeat">
+      <a:schemeClr val="accent1">
+        <a:shade val="80000"/>
+      </a:schemeClr>
+    </dgm:linClrLst>
+    <dgm:effectClrLst/>
+    <dgm:txLinClrLst/>
+    <dgm:txFillClrLst meth="repeat">
+      <a:schemeClr val="dk1"/>
+    </dgm:txFillClrLst>
+    <dgm:txEffectClrLst/>
+  </dgm:styleLbl>
+  <dgm:styleLbl name="vennNode1">
+    <dgm:fillClrLst meth="repeat">
+      <a:schemeClr val="lt1">
+        <a:alpha val="50000"/>
+      </a:schemeClr>
+    </dgm:fillClrLst>
+    <dgm:linClrLst meth="repeat">
+      <a:schemeClr val="accent1">
+        <a:shade val="80000"/>
+      </a:schemeClr>
+    </dgm:linClrLst>
+    <dgm:effectClrLst/>
+    <dgm:txLinClrLst/>
+    <dgm:txFillClrLst/>
+    <dgm:txEffectClrLst/>
+  </dgm:styleLbl>
+  <dgm:styleLbl name="node2">
+    <dgm:fillClrLst meth="repeat">
+      <a:schemeClr val="lt1"/>
+    </dgm:fillClrLst>
+    <dgm:linClrLst meth="repeat">
+      <a:schemeClr val="accent1">
+        <a:shade val="80000"/>
+      </a:schemeClr>
+    </dgm:linClrLst>
+    <dgm:effectClrLst/>
+    <dgm:txLinClrLst/>
+    <dgm:txFillClrLst meth="repeat">
+      <a:schemeClr val="dk1"/>
+    </dgm:txFillClrLst>
+    <dgm:txEffectClrLst/>
+  </dgm:styleLbl>
+  <dgm:styleLbl name="node3">
+    <dgm:fillClrLst meth="repeat">
+      <a:schemeClr val="lt1"/>
+    </dgm:fillClrLst>
+    <dgm:linClrLst meth="repeat">
+      <a:schemeClr val="accent1">
+        <a:shade val="80000"/>
+      </a:schemeClr>
+    </dgm:linClrLst>
+    <dgm:effectClrLst/>
+    <dgm:txLinClrLst/>
+    <dgm:txFillClrLst meth="repeat">
+      <a:schemeClr val="dk1"/>
+    </dgm:txFillClrLst>
+    <dgm:txEffectClrLst/>
+  </dgm:styleLbl>
+  <dgm:styleLbl name="node4">
+    <dgm:fillClrLst meth="repeat">
+      <a:schemeClr val="lt1"/>
+    </dgm:fillClrLst>
+    <dgm:linClrLst meth="repeat">
+      <a:schemeClr val="accent1">
+        <a:shade val="80000"/>
+      </a:schemeClr>
+    </dgm:linClrLst>
+    <dgm:effectClrLst/>
+    <dgm:txLinClrLst/>
+    <dgm:txFillClrLst meth="repeat">
+      <a:schemeClr val="dk1"/>
+    </dgm:txFillClrLst>
+    <dgm:txEffectClrLst/>
+  </dgm:styleLbl>
+  <dgm:styleLbl name="fgImgPlace1">
+    <dgm:fillClrLst meth="repeat">
+      <a:schemeClr val="accent1">
+        <a:tint val="40000"/>
+      </a:schemeClr>
+    </dgm:fillClrLst>
+    <dgm:linClrLst meth="repeat">
+      <a:schemeClr val="accent1">
+        <a:shade val="80000"/>
+      </a:schemeClr>
+    </dgm:linClrLst>
+    <dgm:effectClrLst/>
+    <dgm:txLinClrLst/>
+    <dgm:txFillClrLst meth="repeat">
+      <a:schemeClr val="lt1"/>
+    </dgm:txFillClrLst>
+    <dgm:txEffectClrLst/>
+  </dgm:styleLbl>
+  <dgm:styleLbl name="alignImgPlace1">
+    <dgm:fillClrLst meth="repeat">
+      <a:schemeClr val="accent1">
+        <a:tint val="40000"/>
+      </a:schemeClr>
+    </dgm:fillClrLst>
+    <dgm:linClrLst meth="repeat">
+      <a:schemeClr val="accent1">
+        <a:shade val="80000"/>
+      </a:schemeClr>
+    </dgm:linClrLst>
+    <dgm:effectClrLst/>
+    <dgm:txLinClrLst/>
+    <dgm:txFillClrLst meth="repeat">
+      <a:schemeClr val="lt1"/>
+    </dgm:txFillClrLst>
+    <dgm:txEffectClrLst/>
+  </dgm:styleLbl>
+  <dgm:styleLbl name="bgImgPlace1">
+    <dgm:fillClrLst meth="repeat">
+      <a:schemeClr val="accent1">
+        <a:tint val="40000"/>
+      </a:schemeClr>
+    </dgm:fillClrLst>
+    <dgm:linClrLst meth="repeat">
+      <a:schemeClr val="accent1">
+        <a:shade val="80000"/>
+      </a:schemeClr>
+    </dgm:linClrLst>
+    <dgm:effectClrLst/>
+    <dgm:txLinClrLst/>
+    <dgm:txFillClrLst meth="repeat">
+      <a:schemeClr val="lt1"/>
+    </dgm:txFillClrLst>
+    <dgm:txEffectClrLst/>
+  </dgm:styleLbl>
+  <dgm:styleLbl name="sibTrans2D1">
+    <dgm:fillClrLst meth="repeat">
+      <a:schemeClr val="accent1">
+        <a:tint val="60000"/>
+      </a:schemeClr>
+    </dgm:fillClrLst>
+    <dgm:linClrLst meth="repeat">
+      <a:schemeClr val="accent1">
+        <a:tint val="60000"/>
+      </a:schemeClr>
+    </dgm:linClrLst>
+    <dgm:effectClrLst/>
+    <dgm:txLinClrLst/>
+    <dgm:txFillClrLst meth="repeat">
+      <a:schemeClr val="dk1"/>
+    </dgm:txFillClrLst>
+    <dgm:txEffectClrLst/>
+  </dgm:styleLbl>
+  <dgm:styleLbl name="fgSibTrans2D1">
+    <dgm:fillClrLst meth="repeat">
+      <a:schemeClr val="accent1">
+        <a:tint val="60000"/>
+      </a:schemeClr>
+    </dgm:fillClrLst>
+    <dgm:linClrLst meth="repeat">
+      <a:schemeClr val="accent1">
+        <a:tint val="60000"/>
+      </a:schemeClr>
+    </dgm:linClrLst>
+    <dgm:effectClrLst/>
+    <dgm:txLinClrLst/>
+    <dgm:txFillClrLst meth="repeat">
+      <a:schemeClr val="dk1"/>
+    </dgm:txFillClrLst>
+    <dgm:txEffectClrLst/>
+  </dgm:styleLbl>
+  <dgm:styleLbl name="bgSibTrans2D1">
+    <dgm:fillClrLst meth="repeat">
+      <a:schemeClr val="accent1">
+        <a:tint val="60000"/>
+      </a:schemeClr>
+    </dgm:fillClrLst>
+    <dgm:linClrLst meth="repeat">
+      <a:schemeClr val="accent1">
+        <a:tint val="60000"/>
+      </a:schemeClr>
+    </dgm:linClrLst>
+    <dgm:effectClrLst/>
+    <dgm:txLinClrLst/>
+    <dgm:txFillClrLst meth="repeat">
+      <a:schemeClr val="dk1"/>
+    </dgm:txFillClrLst>
+    <dgm:txEffectClrLst/>
+  </dgm:styleLbl>
+  <dgm:styleLbl name="sibTrans1D1">
+    <dgm:fillClrLst meth="repeat">
+      <a:schemeClr val="accent1"/>
+    </dgm:fillClrLst>
+    <dgm:linClrLst meth="repeat">
+      <a:schemeClr val="accent1"/>
+    </dgm:linClrLst>
+    <dgm:effectClrLst/>
+    <dgm:txLinClrLst/>
+    <dgm:txFillClrLst meth="repeat">
+      <a:schemeClr val="tx1"/>
+    </dgm:txFillClrLst>
+    <dgm:txEffectClrLst/>
+  </dgm:styleLbl>
+  <dgm:styleLbl name="callout">
+    <dgm:fillClrLst meth="repeat">
+      <a:schemeClr val="accent1"/>
+    </dgm:fillClrLst>
+    <dgm:linClrLst meth="repeat">
+      <a:schemeClr val="accent1"/>
+    </dgm:linClrLst>
+    <dgm:effectClrLst/>
+    <dgm:txLinClrLst/>
+    <dgm:txFillClrLst meth="repeat">
+      <a:schemeClr val="tx1"/>
+    </dgm:txFillClrLst>
+    <dgm:txEffectClrLst/>
+  </dgm:styleLbl>
+  <dgm:styleLbl name="asst0">
+    <dgm:fillClrLst meth="repeat">
+      <a:schemeClr val="lt1"/>
+    </dgm:fillClrLst>
+    <dgm:linClrLst meth="repeat">
+      <a:schemeClr val="accent1">
+        <a:shade val="80000"/>
+      </a:schemeClr>
+    </dgm:linClrLst>
+    <dgm:effectClrLst/>
+    <dgm:txLinClrLst/>
+    <dgm:txFillClrLst meth="repeat">
+      <a:schemeClr val="dk1"/>
+    </dgm:txFillClrLst>
+    <dgm:txEffectClrLst/>
+  </dgm:styleLbl>
+  <dgm:styleLbl name="asst1">
+    <dgm:fillClrLst meth="repeat">
+      <a:schemeClr val="lt1"/>
+    </dgm:fillClrLst>
+    <dgm:linClrLst meth="repeat">
+      <a:schemeClr val="accent1">
+        <a:shade val="80000"/>
+      </a:schemeClr>
+    </dgm:linClrLst>
+    <dgm:effectClrLst/>
+    <dgm:txLinClrLst/>
+    <dgm:txFillClrLst meth="repeat">
+      <a:schemeClr val="dk1"/>
+    </dgm:txFillClrLst>
+    <dgm:txEffectClrLst/>
+  </dgm:styleLbl>
+  <dgm:styleLbl name="asst2">
+    <dgm:fillClrLst meth="repeat">
+      <a:schemeClr val="lt1"/>
+    </dgm:fillClrLst>
+    <dgm:linClrLst meth="repeat">
+      <a:schemeClr val="accent1">
+        <a:shade val="80000"/>
+      </a:schemeClr>
+    </dgm:linClrLst>
+    <dgm:effectClrLst/>
+    <dgm:txLinClrLst/>
+    <dgm:txFillClrLst meth="repeat">
+      <a:schemeClr val="dk1"/>
+    </dgm:txFillClrLst>
+    <dgm:txEffectClrLst/>
+  </dgm:styleLbl>
+  <dgm:styleLbl name="asst3">
+    <dgm:fillClrLst meth="repeat">
+      <a:schemeClr val="lt1"/>
+    </dgm:fillClrLst>
+    <dgm:linClrLst meth="repeat">
+      <a:schemeClr val="accent1">
+        <a:shade val="80000"/>
+      </a:schemeClr>
+    </dgm:linClrLst>
+    <dgm:effectClrLst/>
+    <dgm:txLinClrLst/>
+    <dgm:txFillClrLst meth="repeat">
+      <a:schemeClr val="dk1"/>
+    </dgm:txFillClrLst>
+    <dgm:txEffectClrLst/>
+  </dgm:styleLbl>
+  <dgm:styleLbl name="asst4">
+    <dgm:fillClrLst meth="repeat">
+      <a:schemeClr val="lt1"/>
+    </dgm:fillClrLst>
+    <dgm:linClrLst meth="repeat">
+      <a:schemeClr val="accent1">
+        <a:shade val="80000"/>
+      </a:schemeClr>
+    </dgm:linClrLst>
+    <dgm:effectClrLst/>
+    <dgm:txLinClrLst/>
+    <dgm:txFillClrLst meth="repeat">
+      <a:schemeClr val="dk1"/>
+    </dgm:txFillClrLst>
+    <dgm:txEffectClrLst/>
+  </dgm:styleLbl>
+  <dgm:styleLbl name="parChTrans2D1">
+    <dgm:fillClrLst meth="repeat">
+      <a:schemeClr val="accent1">
+        <a:tint val="60000"/>
+      </a:schemeClr>
+    </dgm:fillClrLst>
+    <dgm:linClrLst meth="repeat">
+      <a:schemeClr val="accent1">
+        <a:tint val="60000"/>
+      </a:schemeClr>
+    </dgm:linClrLst>
+    <dgm:effectClrLst/>
+    <dgm:txLinClrLst/>
+    <dgm:txFillClrLst/>
+    <dgm:txEffectClrLst/>
+  </dgm:styleLbl>
+  <dgm:styleLbl name="parChTrans2D2">
+    <dgm:fillClrLst meth="repeat">
+      <a:schemeClr val="accent1"/>
+    </dgm:fillClrLst>
+    <dgm:linClrLst meth="repeat">
+      <a:schemeClr val="accent1"/>
+    </dgm:linClrLst>
+    <dgm:effectClrLst/>
+    <dgm:txLinClrLst/>
+    <dgm:txFillClrLst/>
+    <dgm:txEffectClrLst/>
+  </dgm:styleLbl>
+  <dgm:styleLbl name="parChTrans2D3">
+    <dgm:fillClrLst meth="repeat">
+      <a:schemeClr val="accent1"/>
+    </dgm:fillClrLst>
+    <dgm:linClrLst meth="repeat">
+      <a:schemeClr val="accent1"/>
+    </dgm:linClrLst>
+    <dgm:effectClrLst/>
+    <dgm:txLinClrLst/>
+    <dgm:txFillClrLst/>
+    <dgm:txEffectClrLst/>
+  </dgm:styleLbl>
+  <dgm:styleLbl name="parChTrans2D4">
+    <dgm:fillClrLst meth="repeat">
+      <a:schemeClr val="accent1"/>
+    </dgm:fillClrLst>
+    <dgm:linClrLst meth="repeat">
+      <a:schemeClr val="accent1"/>
+    </dgm:linClrLst>
+    <dgm:effectClrLst/>
+    <dgm:txLinClrLst/>
+    <dgm:txFillClrLst meth="repeat">
+      <a:schemeClr val="lt1"/>
+    </dgm:txFillClrLst>
+    <dgm:txEffectClrLst/>
+  </dgm:styleLbl>
+  <dgm:styleLbl name="parChTrans1D1">
+    <dgm:fillClrLst meth="repeat">
+      <a:schemeClr val="accent1"/>
+    </dgm:fillClrLst>
+    <dgm:linClrLst meth="repeat">
+      <a:schemeClr val="accent1">
+        <a:shade val="60000"/>
+      </a:schemeClr>
+    </dgm:linClrLst>
+    <dgm:effectClrLst/>
+    <dgm:txLinClrLst/>
+    <dgm:txFillClrLst meth="repeat">
+      <a:schemeClr val="tx1"/>
+    </dgm:txFillClrLst>
+    <dgm:txEffectClrLst/>
+  </dgm:styleLbl>
+  <dgm:styleLbl name="parChTrans1D2">
+    <dgm:fillClrLst meth="repeat">
+      <a:schemeClr val="accent1"/>
+    </dgm:fillClrLst>
+    <dgm:linClrLst meth="repeat">
+      <a:schemeClr val="accent1">
+        <a:shade val="60000"/>
+      </a:schemeClr>
+    </dgm:linClrLst>
+    <dgm:effectClrLst/>
+    <dgm:txLinClrLst/>
+    <dgm:txFillClrLst meth="repeat">
+      <a:schemeClr val="tx1"/>
+    </dgm:txFillClrLst>
+    <dgm:txEffectClrLst/>
+  </dgm:styleLbl>
+  <dgm:styleLbl name="parChTrans1D3">
+    <dgm:fillClrLst meth="repeat">
+      <a:schemeClr val="accent1"/>
+    </dgm:fillClrLst>
+    <dgm:linClrLst meth="repeat">
+      <a:schemeClr val="accent1">
+        <a:shade val="80000"/>
+      </a:schemeClr>
+    </dgm:linClrLst>
+    <dgm:effectClrLst/>
+    <dgm:txLinClrLst/>
+    <dgm:txFillClrLst meth="repeat">
+      <a:schemeClr val="tx1"/>
+    </dgm:txFillClrLst>
+    <dgm:txEffectClrLst/>
+  </dgm:styleLbl>
+  <dgm:styleLbl name="parChTrans1D4">
+    <dgm:fillClrLst meth="repeat">
+      <a:schemeClr val="accent1"/>
+    </dgm:fillClrLst>
+    <dgm:linClrLst meth="repeat">
+      <a:schemeClr val="accent1">
+        <a:shade val="80000"/>
+      </a:schemeClr>
+    </dgm:linClrLst>
+    <dgm:effectClrLst/>
+    <dgm:txLinClrLst/>
+    <dgm:txFillClrLst meth="repeat">
+      <a:schemeClr val="tx1"/>
+    </dgm:txFillClrLst>
+    <dgm:txEffectClrLst/>
+  </dgm:styleLbl>
+  <dgm:styleLbl name="fgAcc1">
+    <dgm:fillClrLst meth="repeat">
+      <a:schemeClr val="accent1">
+        <a:alpha val="90000"/>
+        <a:tint val="40000"/>
+      </a:schemeClr>
+    </dgm:fillClrLst>
+    <dgm:linClrLst meth="repeat">
+      <a:schemeClr val="accent1"/>
+    </dgm:linClrLst>
+    <dgm:effectClrLst/>
+    <dgm:txLinClrLst/>
+    <dgm:txFillClrLst meth="repeat">
+      <a:schemeClr val="dk1"/>
+    </dgm:txFillClrLst>
+    <dgm:txEffectClrLst/>
+  </dgm:styleLbl>
+  <dgm:styleLbl name="conFgAcc1">
+    <dgm:fillClrLst meth="repeat">
+      <a:schemeClr val="accent1">
+        <a:alpha val="90000"/>
+        <a:tint val="40000"/>
+      </a:schemeClr>
+    </dgm:fillClrLst>
+    <dgm:linClrLst meth="repeat">
+      <a:schemeClr val="accent1"/>
+    </dgm:linClrLst>
+    <dgm:effectClrLst/>
+    <dgm:txLinClrLst/>
+    <dgm:txFillClrLst meth="repeat">
+      <a:schemeClr val="dk1"/>
+    </dgm:txFillClrLst>
+    <dgm:txEffectClrLst/>
+  </dgm:styleLbl>
+  <dgm:styleLbl name="alignAcc1">
+    <dgm:fillClrLst meth="repeat">
+      <a:schemeClr val="accent1">
+        <a:alpha val="90000"/>
+        <a:tint val="40000"/>
+      </a:schemeClr>
+    </dgm:fillClrLst>
+    <dgm:linClrLst meth="repeat">
+      <a:schemeClr val="accent1"/>
+    </dgm:linClrLst>
+    <dgm:effectClrLst/>
+    <dgm:txLinClrLst/>
+    <dgm:txFillClrLst meth="repeat">
+      <a:schemeClr val="dk1"/>
+    </dgm:txFillClrLst>
+    <dgm:txEffectClrLst/>
+  </dgm:styleLbl>
+  <dgm:styleLbl name="trAlignAcc1">
+    <dgm:fillClrLst meth="repeat">
+      <a:schemeClr val="accent1">
+        <a:alpha val="40000"/>
+        <a:tint val="40000"/>
+      </a:schemeClr>
+    </dgm:fillClrLst>
+    <dgm:linClrLst meth="repeat">
+      <a:schemeClr val="accent1"/>
+    </dgm:linClrLst>
+    <dgm:effectClrLst/>
+    <dgm:txLinClrLst/>
+    <dgm:txFillClrLst meth="repeat">
+      <a:schemeClr val="dk1"/>
+    </dgm:txFillClrLst>
+    <dgm:txEffectClrLst/>
+  </dgm:styleLbl>
+  <dgm:styleLbl name="bgAcc1">
+    <dgm:fillClrLst meth="repeat">
+      <a:schemeClr val="accent1">
+        <a:alpha val="90000"/>
+        <a:tint val="40000"/>
+      </a:schemeClr>
+    </dgm:fillClrLst>
+    <dgm:linClrLst meth="repeat">
+      <a:schemeClr val="accent1"/>
+    </dgm:linClrLst>
+    <dgm:effectClrLst/>
+    <dgm:txLinClrLst/>
+    <dgm:txFillClrLst meth="repeat">
+      <a:schemeClr val="dk1"/>
+    </dgm:txFillClrLst>
+    <dgm:txEffectClrLst/>
+  </dgm:styleLbl>
+  <dgm:styleLbl name="solidFgAcc1">
+    <dgm:fillClrLst meth="repeat">
+      <a:schemeClr val="lt1"/>
+    </dgm:fillClrLst>
+    <dgm:linClrLst meth="repeat">
+      <a:schemeClr val="accent1"/>
+    </dgm:linClrLst>
+    <dgm:effectClrLst/>
+    <dgm:txLinClrLst/>
+    <dgm:txFillClrLst meth="repeat">
+      <a:schemeClr val="dk1"/>
+    </dgm:txFillClrLst>
+    <dgm:txEffectClrLst/>
+  </dgm:styleLbl>
+  <dgm:styleLbl name="solidAlignAcc1">
+    <dgm:fillClrLst meth="repeat">
+      <a:schemeClr val="lt1"/>
+    </dgm:fillClrLst>
+    <dgm:linClrLst meth="repeat">
+      <a:schemeClr val="accent1"/>
+    </dgm:linClrLst>
+    <dgm:effectClrLst/>
+    <dgm:txLinClrLst/>
+    <dgm:txFillClrLst meth="repeat">
+      <a:schemeClr val="dk1"/>
+    </dgm:txFillClrLst>
+    <dgm:txEffectClrLst/>
+  </dgm:styleLbl>
+  <dgm:styleLbl name="solidBgAcc1">
+    <dgm:fillClrLst meth="repeat">
+      <a:schemeClr val="lt1"/>
+    </dgm:fillClrLst>
+    <dgm:linClrLst meth="repeat">
+      <a:schemeClr val="accent1"/>
+    </dgm:linClrLst>
+    <dgm:effectClrLst/>
+    <dgm:txLinClrLst/>
+    <dgm:txFillClrLst meth="repeat">
+      <a:schemeClr val="dk1"/>
+    </dgm:txFillClrLst>
+    <dgm:txEffectClrLst/>
+  </dgm:styleLbl>
+  <dgm:styleLbl name="fgAccFollowNode1">
+    <dgm:fillClrLst meth="repeat">
+      <a:schemeClr val="lt1">
+        <a:alpha val="90000"/>
+        <a:tint val="40000"/>
+      </a:schemeClr>
+    </dgm:fillClrLst>
+    <dgm:linClrLst meth="repeat">
+      <a:schemeClr val="accent1">
+        <a:alpha val="90000"/>
+      </a:schemeClr>
+    </dgm:linClrLst>
+    <dgm:effectClrLst/>
+    <dgm:txLinClrLst/>
+    <dgm:txFillClrLst meth="repeat">
+      <a:schemeClr val="dk1"/>
+    </dgm:txFillClrLst>
+    <dgm:txEffectClrLst/>
+  </dgm:styleLbl>
+  <dgm:styleLbl name="alignAccFollowNode1">
+    <dgm:fillClrLst meth="repeat">
+      <a:schemeClr val="lt1">
+        <a:alpha val="90000"/>
+        <a:tint val="40000"/>
+      </a:schemeClr>
+    </dgm:fillClrLst>
+    <dgm:linClrLst meth="repeat">
+      <a:schemeClr val="accent1">
+        <a:alpha val="90000"/>
+      </a:schemeClr>
+    </dgm:linClrLst>
+    <dgm:effectClrLst/>
+    <dgm:txLinClrLst/>
+    <dgm:txFillClrLst meth="repeat">
+      <a:schemeClr val="dk1"/>
+    </dgm:txFillClrLst>
+    <dgm:txEffectClrLst/>
+  </dgm:styleLbl>
+  <dgm:styleLbl name="bgAccFollowNode1">
+    <dgm:fillClrLst meth="repeat">
+      <a:schemeClr val="lt1">
+        <a:alpha val="90000"/>
+        <a:tint val="40000"/>
+      </a:schemeClr>
+    </dgm:fillClrLst>
+    <dgm:linClrLst meth="repeat">
+      <a:schemeClr val="accent1">
+        <a:alpha val="90000"/>
+      </a:schemeClr>
+    </dgm:linClrLst>
+    <dgm:effectClrLst/>
+    <dgm:txLinClrLst/>
+    <dgm:txFillClrLst meth="repeat">
+      <a:schemeClr val="dk1"/>
+    </dgm:txFillClrLst>
+    <dgm:txEffectClrLst/>
+  </dgm:styleLbl>
+  <dgm:styleLbl name="fgAcc0">
+    <dgm:fillClrLst meth="repeat">
+      <a:schemeClr val="accent1">
+        <a:alpha val="90000"/>
+        <a:tint val="40000"/>
+      </a:schemeClr>
+    </dgm:fillClrLst>
+    <dgm:linClrLst meth="repeat">
+      <a:schemeClr val="accent1"/>
+    </dgm:linClrLst>
+    <dgm:effectClrLst/>
+    <dgm:txLinClrLst/>
+    <dgm:txFillClrLst meth="repeat">
+      <a:schemeClr val="dk1"/>
+    </dgm:txFillClrLst>
+    <dgm:txEffectClrLst/>
+  </dgm:styleLbl>
+  <dgm:styleLbl name="fgAcc2">
+    <dgm:fillClrLst meth="repeat">
+      <a:schemeClr val="accent1">
+        <a:alpha val="90000"/>
+        <a:tint val="40000"/>
+      </a:schemeClr>
+    </dgm:fillClrLst>
+    <dgm:linClrLst meth="repeat">
+      <a:schemeClr val="accent1"/>
+    </dgm:linClrLst>
+    <dgm:effectClrLst/>
+    <dgm:txLinClrLst/>
+    <dgm:txFillClrLst meth="repeat">
+      <a:schemeClr val="dk1"/>
+    </dgm:txFillClrLst>
+    <dgm:txEffectClrLst/>
+  </dgm:styleLbl>
+  <dgm:styleLbl name="fgAcc3">
+    <dgm:fillClrLst meth="repeat">
+      <a:schemeClr val="accent1">
+        <a:alpha val="90000"/>
+        <a:tint val="40000"/>
+      </a:schemeClr>
+    </dgm:fillClrLst>
+    <dgm:linClrLst meth="repeat">
+      <a:schemeClr val="accent1"/>
+    </dgm:linClrLst>
+    <dgm:effectClrLst/>
+    <dgm:txLinClrLst/>
+    <dgm:txFillClrLst meth="repeat">
+      <a:schemeClr val="dk1"/>
+    </dgm:txFillClrLst>
+    <dgm:txEffectClrLst/>
+  </dgm:styleLbl>
+  <dgm:styleLbl name="fgAcc4">
+    <dgm:fillClrLst meth="repeat">
+      <a:schemeClr val="accent1">
+        <a:alpha val="90000"/>
+        <a:tint val="40000"/>
+      </a:schemeClr>
+    </dgm:fillClrLst>
+    <dgm:linClrLst meth="repeat">
+      <a:schemeClr val="accent1"/>
+    </dgm:linClrLst>
+    <dgm:effectClrLst/>
+    <dgm:txLinClrLst/>
+    <dgm:txFillClrLst meth="repeat">
+      <a:schemeClr val="dk1"/>
+    </dgm:txFillClrLst>
+    <dgm:txEffectClrLst/>
+  </dgm:styleLbl>
+  <dgm:styleLbl name="bgShp">
+    <dgm:fillClrLst meth="repeat">
+      <a:schemeClr val="accent1">
+        <a:tint val="40000"/>
+      </a:schemeClr>
+    </dgm:fillClrLst>
+    <dgm:linClrLst meth="repeat">
+      <a:schemeClr val="accent1"/>
+    </dgm:linClrLst>
+    <dgm:effectClrLst/>
+    <dgm:txLinClrLst/>
+    <dgm:txFillClrLst meth="repeat">
+      <a:schemeClr val="dk1"/>
+    </dgm:txFillClrLst>
+    <dgm:txEffectClrLst/>
+  </dgm:styleLbl>
+  <dgm:styleLbl name="dkBgShp">
+    <dgm:fillClrLst meth="repeat">
+      <a:schemeClr val="accent1">
+        <a:shade val="80000"/>
+      </a:schemeClr>
+    </dgm:fillClrLst>
+    <dgm:linClrLst meth="repeat">
+      <a:schemeClr val="accent1"/>
+    </dgm:linClrLst>
+    <dgm:effectClrLst/>
+    <dgm:txLinClrLst/>
+    <dgm:txFillClrLst meth="repeat">
+      <a:schemeClr val="lt1"/>
+    </dgm:txFillClrLst>
+    <dgm:txEffectClrLst/>
+  </dgm:styleLbl>
+  <dgm:styleLbl name="trBgShp">
+    <dgm:fillClrLst meth="repeat">
+      <a:schemeClr val="accent1">
+        <a:tint val="50000"/>
+        <a:alpha val="40000"/>
+      </a:schemeClr>
+    </dgm:fillClrLst>
+    <dgm:linClrLst meth="repeat">
+      <a:schemeClr val="accent1"/>
+    </dgm:linClrLst>
+    <dgm:effectClrLst/>
+    <dgm:txLinClrLst/>
+    <dgm:txFillClrLst meth="repeat">
+      <a:schemeClr val="lt1"/>
+    </dgm:txFillClrLst>
+    <dgm:txEffectClrLst/>
+  </dgm:styleLbl>
+  <dgm:styleLbl name="fgShp">
+    <dgm:fillClrLst meth="repeat">
+      <a:schemeClr val="accent1">
+        <a:tint val="60000"/>
+      </a:schemeClr>
+    </dgm:fillClrLst>
+    <dgm:linClrLst meth="repeat">
+      <a:schemeClr val="lt1"/>
+    </dgm:linClrLst>
+    <dgm:effectClrLst/>
+    <dgm:txLinClrLst/>
+    <dgm:txFillClrLst meth="repeat">
+      <a:schemeClr val="dk1"/>
+    </dgm:txFillClrLst>
+    <dgm:txEffectClrLst/>
+  </dgm:styleLbl>
+  <dgm:styleLbl name="revTx">
+    <dgm:fillClrLst meth="repeat">
+      <a:schemeClr val="lt1">
+        <a:alpha val="0"/>
+      </a:schemeClr>
+    </dgm:fillClrLst>
+    <dgm:linClrLst meth="repeat">
+      <a:schemeClr val="dk1">
+        <a:alpha val="0"/>
+      </a:schemeClr>
+    </dgm:linClrLst>
+    <dgm:effectClrLst/>
+    <dgm:txLinClrLst/>
+    <dgm:txFillClrLst meth="repeat">
+      <a:schemeClr val="tx1"/>
+    </dgm:txFillClrLst>
+    <dgm:txEffectClrLst/>
+  </dgm:styleLbl>
+</dgm:colorsDef>
+</file>
+
+<file path=ppt/diagrams/colors2.xml><?xml version="1.0" encoding="utf-8"?>
 <dgm:colorsDef xmlns:dgm="http://schemas.openxmlformats.org/drawingml/2006/diagram" xmlns:a="http://schemas.openxmlformats.org/drawingml/2006/main" uniqueId="urn:microsoft.com/office/officeart/2005/8/colors/accent1_1">
   <dgm:title val=""/>
   <dgm:desc val=""/>
@@ -1163,7 +1972,646 @@
 </dgm:dataModel>
 </file>
 
+<file path=ppt/diagrams/data2.xml><?xml version="1.0" encoding="utf-8"?>
+<dgm:dataModel xmlns:dgm="http://schemas.openxmlformats.org/drawingml/2006/diagram" xmlns:a="http://schemas.openxmlformats.org/drawingml/2006/main">
+  <dgm:ptLst>
+    <dgm:pt modelId="{A68E789E-5166-CD45-A72D-F7057C62E2FC}" type="doc">
+      <dgm:prSet loTypeId="urn:microsoft.com/office/officeart/2005/8/layout/arrow2" loCatId="" qsTypeId="urn:microsoft.com/office/officeart/2005/8/quickstyle/simple1" qsCatId="simple" csTypeId="urn:microsoft.com/office/officeart/2005/8/colors/accent1_1" csCatId="accent1" phldr="1"/>
+      <dgm:spPr/>
+    </dgm:pt>
+    <dgm:pt modelId="{36DAE1B0-D075-5146-9ACD-1FFC17EDD108}">
+      <dgm:prSet phldrT="[Text]" custT="1"/>
+      <dgm:spPr/>
+      <dgm:t>
+        <a:bodyPr/>
+        <a:lstStyle/>
+        <a:p>
+          <a:r>
+            <a:rPr lang="en-US" sz="2800" b="1" dirty="0">
+              <a:solidFill>
+                <a:srgbClr val="104B7C"/>
+              </a:solidFill>
+              <a:latin typeface="Arial" panose="020B0604020202020204" pitchFamily="34" charset="0"/>
+              <a:cs typeface="Arial" panose="020B0604020202020204" pitchFamily="34" charset="0"/>
+            </a:rPr>
+            <a:t>Open Source</a:t>
+          </a:r>
+        </a:p>
+      </dgm:t>
+    </dgm:pt>
+    <dgm:pt modelId="{3E71B4AA-DCFC-5E4A-8C16-6B05C65456BF}" type="parTrans" cxnId="{0718A698-C928-0944-9018-D2331FC32D97}">
+      <dgm:prSet/>
+      <dgm:spPr/>
+      <dgm:t>
+        <a:bodyPr/>
+        <a:lstStyle/>
+        <a:p>
+          <a:endParaRPr lang="en-US" sz="2400">
+            <a:latin typeface="Arial" panose="020B0604020202020204" pitchFamily="34" charset="0"/>
+            <a:cs typeface="Arial" panose="020B0604020202020204" pitchFamily="34" charset="0"/>
+          </a:endParaRPr>
+        </a:p>
+      </dgm:t>
+    </dgm:pt>
+    <dgm:pt modelId="{E158A58E-01E9-0648-80E1-8B8C47E7EA13}" type="sibTrans" cxnId="{0718A698-C928-0944-9018-D2331FC32D97}">
+      <dgm:prSet/>
+      <dgm:spPr/>
+      <dgm:t>
+        <a:bodyPr/>
+        <a:lstStyle/>
+        <a:p>
+          <a:endParaRPr lang="en-US" sz="2400">
+            <a:latin typeface="Arial" panose="020B0604020202020204" pitchFamily="34" charset="0"/>
+            <a:cs typeface="Arial" panose="020B0604020202020204" pitchFamily="34" charset="0"/>
+          </a:endParaRPr>
+        </a:p>
+      </dgm:t>
+    </dgm:pt>
+    <dgm:pt modelId="{72F851ED-68B7-0746-B132-2CC32ADEC8B3}">
+      <dgm:prSet phldrT="[Text]" custT="1"/>
+      <dgm:spPr/>
+      <dgm:t>
+        <a:bodyPr/>
+        <a:lstStyle/>
+        <a:p>
+          <a:r>
+            <a:rPr lang="en-US" sz="2800" b="1" dirty="0">
+              <a:solidFill>
+                <a:srgbClr val="104B7C"/>
+              </a:solidFill>
+              <a:latin typeface="Arial" panose="020B0604020202020204" pitchFamily="34" charset="0"/>
+              <a:cs typeface="Arial" panose="020B0604020202020204" pitchFamily="34" charset="0"/>
+            </a:rPr>
+            <a:t>Open Access</a:t>
+          </a:r>
+        </a:p>
+      </dgm:t>
+    </dgm:pt>
+    <dgm:pt modelId="{C9E08AE5-C355-1640-8309-536AAFB61649}" type="parTrans" cxnId="{ACE37776-6360-5249-8084-59CC2A62D37D}">
+      <dgm:prSet/>
+      <dgm:spPr/>
+      <dgm:t>
+        <a:bodyPr/>
+        <a:lstStyle/>
+        <a:p>
+          <a:endParaRPr lang="en-US" sz="2400">
+            <a:latin typeface="Arial" panose="020B0604020202020204" pitchFamily="34" charset="0"/>
+            <a:cs typeface="Arial" panose="020B0604020202020204" pitchFamily="34" charset="0"/>
+          </a:endParaRPr>
+        </a:p>
+      </dgm:t>
+    </dgm:pt>
+    <dgm:pt modelId="{946D8338-97C6-B34B-8980-36AFEFFED38E}" type="sibTrans" cxnId="{ACE37776-6360-5249-8084-59CC2A62D37D}">
+      <dgm:prSet/>
+      <dgm:spPr/>
+      <dgm:t>
+        <a:bodyPr/>
+        <a:lstStyle/>
+        <a:p>
+          <a:endParaRPr lang="en-US" sz="2400">
+            <a:latin typeface="Arial" panose="020B0604020202020204" pitchFamily="34" charset="0"/>
+            <a:cs typeface="Arial" panose="020B0604020202020204" pitchFamily="34" charset="0"/>
+          </a:endParaRPr>
+        </a:p>
+      </dgm:t>
+    </dgm:pt>
+    <dgm:pt modelId="{4629BC9D-03B8-844F-9860-FCDA1A59250A}">
+      <dgm:prSet phldrT="[Text]" custT="1"/>
+      <dgm:spPr/>
+      <dgm:t>
+        <a:bodyPr/>
+        <a:lstStyle/>
+        <a:p>
+          <a:r>
+            <a:rPr lang="en-US" sz="2800" b="1" dirty="0">
+              <a:solidFill>
+                <a:srgbClr val="104B7C"/>
+              </a:solidFill>
+              <a:latin typeface="Arial" panose="020B0604020202020204" pitchFamily="34" charset="0"/>
+              <a:cs typeface="Arial" panose="020B0604020202020204" pitchFamily="34" charset="0"/>
+            </a:rPr>
+            <a:t>Open Publication</a:t>
+          </a:r>
+        </a:p>
+      </dgm:t>
+    </dgm:pt>
+    <dgm:pt modelId="{7BDCA2BF-470C-4645-9DB2-3379DE1E4783}" type="parTrans" cxnId="{EE4E4058-3B74-364B-B0BF-4CD512CDDAF9}">
+      <dgm:prSet/>
+      <dgm:spPr/>
+      <dgm:t>
+        <a:bodyPr/>
+        <a:lstStyle/>
+        <a:p>
+          <a:endParaRPr lang="en-US" sz="2400">
+            <a:latin typeface="Arial" panose="020B0604020202020204" pitchFamily="34" charset="0"/>
+            <a:cs typeface="Arial" panose="020B0604020202020204" pitchFamily="34" charset="0"/>
+          </a:endParaRPr>
+        </a:p>
+      </dgm:t>
+    </dgm:pt>
+    <dgm:pt modelId="{8C83E593-63E5-9146-9F5F-F9268EA1E90D}" type="sibTrans" cxnId="{EE4E4058-3B74-364B-B0BF-4CD512CDDAF9}">
+      <dgm:prSet/>
+      <dgm:spPr/>
+      <dgm:t>
+        <a:bodyPr/>
+        <a:lstStyle/>
+        <a:p>
+          <a:endParaRPr lang="en-US" sz="2400">
+            <a:latin typeface="Arial" panose="020B0604020202020204" pitchFamily="34" charset="0"/>
+            <a:cs typeface="Arial" panose="020B0604020202020204" pitchFamily="34" charset="0"/>
+          </a:endParaRPr>
+        </a:p>
+      </dgm:t>
+    </dgm:pt>
+    <dgm:pt modelId="{C97E1D16-1175-4042-889B-6E7DDE144AFD}" type="pres">
+      <dgm:prSet presAssocID="{A68E789E-5166-CD45-A72D-F7057C62E2FC}" presName="arrowDiagram" presStyleCnt="0">
+        <dgm:presLayoutVars>
+          <dgm:chMax val="5"/>
+          <dgm:dir/>
+          <dgm:resizeHandles val="exact"/>
+        </dgm:presLayoutVars>
+      </dgm:prSet>
+      <dgm:spPr/>
+    </dgm:pt>
+    <dgm:pt modelId="{D67D6706-BC7D-9644-A547-8032E73B7C99}" type="pres">
+      <dgm:prSet presAssocID="{A68E789E-5166-CD45-A72D-F7057C62E2FC}" presName="arrow" presStyleLbl="bgShp" presStyleIdx="0" presStyleCnt="1"/>
+      <dgm:spPr/>
+    </dgm:pt>
+    <dgm:pt modelId="{87F7229C-A97B-0942-AC6D-5F8A9E075101}" type="pres">
+      <dgm:prSet presAssocID="{A68E789E-5166-CD45-A72D-F7057C62E2FC}" presName="arrowDiagram3" presStyleCnt="0"/>
+      <dgm:spPr/>
+    </dgm:pt>
+    <dgm:pt modelId="{A4BC7131-E5FB-CB46-9FE9-49C1EE532E20}" type="pres">
+      <dgm:prSet presAssocID="{36DAE1B0-D075-5146-9ACD-1FFC17EDD108}" presName="bullet3a" presStyleLbl="node1" presStyleIdx="0" presStyleCnt="3"/>
+      <dgm:spPr/>
+    </dgm:pt>
+    <dgm:pt modelId="{7328B1F9-0CB8-E245-91DD-854C2E64FD5E}" type="pres">
+      <dgm:prSet presAssocID="{36DAE1B0-D075-5146-9ACD-1FFC17EDD108}" presName="textBox3a" presStyleLbl="revTx" presStyleIdx="0" presStyleCnt="3">
+        <dgm:presLayoutVars>
+          <dgm:bulletEnabled val="1"/>
+        </dgm:presLayoutVars>
+      </dgm:prSet>
+      <dgm:spPr/>
+    </dgm:pt>
+    <dgm:pt modelId="{5102348C-82B6-0041-B5DD-08076EEDF3B9}" type="pres">
+      <dgm:prSet presAssocID="{72F851ED-68B7-0746-B132-2CC32ADEC8B3}" presName="bullet3b" presStyleLbl="node1" presStyleIdx="1" presStyleCnt="3"/>
+      <dgm:spPr/>
+    </dgm:pt>
+    <dgm:pt modelId="{253475DF-BD78-0E46-A27F-43A6E3B29066}" type="pres">
+      <dgm:prSet presAssocID="{72F851ED-68B7-0746-B132-2CC32ADEC8B3}" presName="textBox3b" presStyleLbl="revTx" presStyleIdx="1" presStyleCnt="3">
+        <dgm:presLayoutVars>
+          <dgm:bulletEnabled val="1"/>
+        </dgm:presLayoutVars>
+      </dgm:prSet>
+      <dgm:spPr/>
+    </dgm:pt>
+    <dgm:pt modelId="{B1F9F04D-5CDB-3E4C-BA0F-8A7947F2AB7E}" type="pres">
+      <dgm:prSet presAssocID="{4629BC9D-03B8-844F-9860-FCDA1A59250A}" presName="bullet3c" presStyleLbl="node1" presStyleIdx="2" presStyleCnt="3"/>
+      <dgm:spPr/>
+    </dgm:pt>
+    <dgm:pt modelId="{E58A52CF-9928-304D-A348-CFE492238018}" type="pres">
+      <dgm:prSet presAssocID="{4629BC9D-03B8-844F-9860-FCDA1A59250A}" presName="textBox3c" presStyleLbl="revTx" presStyleIdx="2" presStyleCnt="3" custScaleX="122068" custLinFactNeighborX="11655">
+        <dgm:presLayoutVars>
+          <dgm:bulletEnabled val="1"/>
+        </dgm:presLayoutVars>
+      </dgm:prSet>
+      <dgm:spPr/>
+    </dgm:pt>
+  </dgm:ptLst>
+  <dgm:cxnLst>
+    <dgm:cxn modelId="{C2AC6E49-204C-424D-AD01-22A792CF7AF8}" type="presOf" srcId="{A68E789E-5166-CD45-A72D-F7057C62E2FC}" destId="{C97E1D16-1175-4042-889B-6E7DDE144AFD}" srcOrd="0" destOrd="0" presId="urn:microsoft.com/office/officeart/2005/8/layout/arrow2"/>
+    <dgm:cxn modelId="{EE4E4058-3B74-364B-B0BF-4CD512CDDAF9}" srcId="{A68E789E-5166-CD45-A72D-F7057C62E2FC}" destId="{4629BC9D-03B8-844F-9860-FCDA1A59250A}" srcOrd="2" destOrd="0" parTransId="{7BDCA2BF-470C-4645-9DB2-3379DE1E4783}" sibTransId="{8C83E593-63E5-9146-9F5F-F9268EA1E90D}"/>
+    <dgm:cxn modelId="{BFFA525A-CDFE-DC45-826B-9AB79E957AA7}" type="presOf" srcId="{4629BC9D-03B8-844F-9860-FCDA1A59250A}" destId="{E58A52CF-9928-304D-A348-CFE492238018}" srcOrd="0" destOrd="0" presId="urn:microsoft.com/office/officeart/2005/8/layout/arrow2"/>
+    <dgm:cxn modelId="{ACE37776-6360-5249-8084-59CC2A62D37D}" srcId="{A68E789E-5166-CD45-A72D-F7057C62E2FC}" destId="{72F851ED-68B7-0746-B132-2CC32ADEC8B3}" srcOrd="1" destOrd="0" parTransId="{C9E08AE5-C355-1640-8309-536AAFB61649}" sibTransId="{946D8338-97C6-B34B-8980-36AFEFFED38E}"/>
+    <dgm:cxn modelId="{0718A698-C928-0944-9018-D2331FC32D97}" srcId="{A68E789E-5166-CD45-A72D-F7057C62E2FC}" destId="{36DAE1B0-D075-5146-9ACD-1FFC17EDD108}" srcOrd="0" destOrd="0" parTransId="{3E71B4AA-DCFC-5E4A-8C16-6B05C65456BF}" sibTransId="{E158A58E-01E9-0648-80E1-8B8C47E7EA13}"/>
+    <dgm:cxn modelId="{2CB4D6A5-A161-6743-95B5-08A0BD8E7779}" type="presOf" srcId="{36DAE1B0-D075-5146-9ACD-1FFC17EDD108}" destId="{7328B1F9-0CB8-E245-91DD-854C2E64FD5E}" srcOrd="0" destOrd="0" presId="urn:microsoft.com/office/officeart/2005/8/layout/arrow2"/>
+    <dgm:cxn modelId="{262B32C7-277D-D24E-9A8D-FC93F8AFCFBB}" type="presOf" srcId="{72F851ED-68B7-0746-B132-2CC32ADEC8B3}" destId="{253475DF-BD78-0E46-A27F-43A6E3B29066}" srcOrd="0" destOrd="0" presId="urn:microsoft.com/office/officeart/2005/8/layout/arrow2"/>
+    <dgm:cxn modelId="{F5A98A1F-6B17-1A44-9FFB-01853A2C762F}" type="presParOf" srcId="{C97E1D16-1175-4042-889B-6E7DDE144AFD}" destId="{D67D6706-BC7D-9644-A547-8032E73B7C99}" srcOrd="0" destOrd="0" presId="urn:microsoft.com/office/officeart/2005/8/layout/arrow2"/>
+    <dgm:cxn modelId="{900468C2-ED8C-254A-B230-3AF3D7FB275B}" type="presParOf" srcId="{C97E1D16-1175-4042-889B-6E7DDE144AFD}" destId="{87F7229C-A97B-0942-AC6D-5F8A9E075101}" srcOrd="1" destOrd="0" presId="urn:microsoft.com/office/officeart/2005/8/layout/arrow2"/>
+    <dgm:cxn modelId="{A1FFC783-98E1-7C47-BB8A-DAD2E61A5990}" type="presParOf" srcId="{87F7229C-A97B-0942-AC6D-5F8A9E075101}" destId="{A4BC7131-E5FB-CB46-9FE9-49C1EE532E20}" srcOrd="0" destOrd="0" presId="urn:microsoft.com/office/officeart/2005/8/layout/arrow2"/>
+    <dgm:cxn modelId="{91200B03-1A9F-9D42-99E6-7460D131239A}" type="presParOf" srcId="{87F7229C-A97B-0942-AC6D-5F8A9E075101}" destId="{7328B1F9-0CB8-E245-91DD-854C2E64FD5E}" srcOrd="1" destOrd="0" presId="urn:microsoft.com/office/officeart/2005/8/layout/arrow2"/>
+    <dgm:cxn modelId="{11DAAB59-BF83-3B4E-AD12-1908F1599C8C}" type="presParOf" srcId="{87F7229C-A97B-0942-AC6D-5F8A9E075101}" destId="{5102348C-82B6-0041-B5DD-08076EEDF3B9}" srcOrd="2" destOrd="0" presId="urn:microsoft.com/office/officeart/2005/8/layout/arrow2"/>
+    <dgm:cxn modelId="{76ED9A7D-4B2F-5247-BAA8-D89B82159955}" type="presParOf" srcId="{87F7229C-A97B-0942-AC6D-5F8A9E075101}" destId="{253475DF-BD78-0E46-A27F-43A6E3B29066}" srcOrd="3" destOrd="0" presId="urn:microsoft.com/office/officeart/2005/8/layout/arrow2"/>
+    <dgm:cxn modelId="{039DA426-696F-E843-A673-D67974BEB698}" type="presParOf" srcId="{87F7229C-A97B-0942-AC6D-5F8A9E075101}" destId="{B1F9F04D-5CDB-3E4C-BA0F-8A7947F2AB7E}" srcOrd="4" destOrd="0" presId="urn:microsoft.com/office/officeart/2005/8/layout/arrow2"/>
+    <dgm:cxn modelId="{018954C4-A96E-CC40-BF53-5A47BC72BE67}" type="presParOf" srcId="{87F7229C-A97B-0942-AC6D-5F8A9E075101}" destId="{E58A52CF-9928-304D-A348-CFE492238018}" srcOrd="5" destOrd="0" presId="urn:microsoft.com/office/officeart/2005/8/layout/arrow2"/>
+  </dgm:cxnLst>
+  <dgm:bg/>
+  <dgm:whole/>
+  <dgm:extLst>
+    <a:ext uri="http://schemas.microsoft.com/office/drawing/2008/diagram">
+      <dsp:dataModelExt xmlns:dsp="http://schemas.microsoft.com/office/drawing/2008/diagram" relId="rId6" minVer="http://schemas.openxmlformats.org/drawingml/2006/diagram"/>
+    </a:ext>
+  </dgm:extLst>
+</dgm:dataModel>
+</file>
+
 <file path=ppt/diagrams/drawing1.xml><?xml version="1.0" encoding="utf-8"?>
+<dsp:drawing xmlns:dgm="http://schemas.openxmlformats.org/drawingml/2006/diagram" xmlns:dsp="http://schemas.microsoft.com/office/drawing/2008/diagram" xmlns:a="http://schemas.openxmlformats.org/drawingml/2006/main">
+  <dsp:spTree>
+    <dsp:nvGrpSpPr>
+      <dsp:cNvPr id="0" name=""/>
+      <dsp:cNvGrpSpPr/>
+    </dsp:nvGrpSpPr>
+    <dsp:grpSpPr/>
+    <dsp:sp modelId="{D67D6706-BC7D-9644-A547-8032E73B7C99}">
+      <dsp:nvSpPr>
+        <dsp:cNvPr id="0" name=""/>
+        <dsp:cNvSpPr/>
+      </dsp:nvSpPr>
+      <dsp:spPr>
+        <a:xfrm>
+          <a:off x="0" y="169333"/>
+          <a:ext cx="8128000" cy="5079999"/>
+        </a:xfrm>
+        <a:prstGeom prst="swooshArrow">
+          <a:avLst>
+            <a:gd name="adj1" fmla="val 25000"/>
+            <a:gd name="adj2" fmla="val 25000"/>
+          </a:avLst>
+        </a:prstGeom>
+        <a:solidFill>
+          <a:schemeClr val="accent1">
+            <a:tint val="40000"/>
+            <a:hueOff val="0"/>
+            <a:satOff val="0"/>
+            <a:lumOff val="0"/>
+            <a:alphaOff val="0"/>
+          </a:schemeClr>
+        </a:solidFill>
+        <a:ln>
+          <a:noFill/>
+        </a:ln>
+        <a:effectLst/>
+      </dsp:spPr>
+      <dsp:style>
+        <a:lnRef idx="0">
+          <a:scrgbClr r="0" g="0" b="0"/>
+        </a:lnRef>
+        <a:fillRef idx="1">
+          <a:scrgbClr r="0" g="0" b="0"/>
+        </a:fillRef>
+        <a:effectRef idx="0">
+          <a:scrgbClr r="0" g="0" b="0"/>
+        </a:effectRef>
+        <a:fontRef idx="minor"/>
+      </dsp:style>
+    </dsp:sp>
+    <dsp:sp modelId="{A4BC7131-E5FB-CB46-9FE9-49C1EE532E20}">
+      <dsp:nvSpPr>
+        <dsp:cNvPr id="0" name=""/>
+        <dsp:cNvSpPr/>
+      </dsp:nvSpPr>
+      <dsp:spPr>
+        <a:xfrm>
+          <a:off x="1032256" y="3675549"/>
+          <a:ext cx="211328" cy="211328"/>
+        </a:xfrm>
+        <a:prstGeom prst="ellipse">
+          <a:avLst/>
+        </a:prstGeom>
+        <a:solidFill>
+          <a:schemeClr val="lt1">
+            <a:hueOff val="0"/>
+            <a:satOff val="0"/>
+            <a:lumOff val="0"/>
+            <a:alphaOff val="0"/>
+          </a:schemeClr>
+        </a:solidFill>
+        <a:ln w="12700" cap="flat" cmpd="sng" algn="ctr">
+          <a:solidFill>
+            <a:schemeClr val="accent1">
+              <a:shade val="80000"/>
+              <a:hueOff val="0"/>
+              <a:satOff val="0"/>
+              <a:lumOff val="0"/>
+              <a:alphaOff val="0"/>
+            </a:schemeClr>
+          </a:solidFill>
+          <a:prstDash val="solid"/>
+          <a:miter lim="800000"/>
+        </a:ln>
+        <a:effectLst/>
+      </dsp:spPr>
+      <dsp:style>
+        <a:lnRef idx="2">
+          <a:scrgbClr r="0" g="0" b="0"/>
+        </a:lnRef>
+        <a:fillRef idx="1">
+          <a:scrgbClr r="0" g="0" b="0"/>
+        </a:fillRef>
+        <a:effectRef idx="0">
+          <a:scrgbClr r="0" g="0" b="0"/>
+        </a:effectRef>
+        <a:fontRef idx="minor">
+          <a:schemeClr val="lt1"/>
+        </a:fontRef>
+      </dsp:style>
+    </dsp:sp>
+    <dsp:sp modelId="{7328B1F9-0CB8-E245-91DD-854C2E64FD5E}">
+      <dsp:nvSpPr>
+        <dsp:cNvPr id="0" name=""/>
+        <dsp:cNvSpPr/>
+      </dsp:nvSpPr>
+      <dsp:spPr>
+        <a:xfrm>
+          <a:off x="1137920" y="3781213"/>
+          <a:ext cx="1893824" cy="1468120"/>
+        </a:xfrm>
+        <a:prstGeom prst="rect">
+          <a:avLst/>
+        </a:prstGeom>
+        <a:noFill/>
+        <a:ln>
+          <a:noFill/>
+        </a:ln>
+        <a:effectLst/>
+      </dsp:spPr>
+      <dsp:style>
+        <a:lnRef idx="0">
+          <a:scrgbClr r="0" g="0" b="0"/>
+        </a:lnRef>
+        <a:fillRef idx="0">
+          <a:scrgbClr r="0" g="0" b="0"/>
+        </a:fillRef>
+        <a:effectRef idx="0">
+          <a:scrgbClr r="0" g="0" b="0"/>
+        </a:effectRef>
+        <a:fontRef idx="minor"/>
+      </dsp:style>
+      <dsp:txBody>
+        <a:bodyPr spcFirstLastPara="0" vert="horz" wrap="square" lIns="111978" tIns="0" rIns="0" bIns="0" numCol="1" spcCol="1270" anchor="t" anchorCtr="0">
+          <a:noAutofit/>
+        </a:bodyPr>
+        <a:lstStyle/>
+        <a:p>
+          <a:pPr marL="0" lvl="0" indent="0" algn="l" defTabSz="1244600">
+            <a:lnSpc>
+              <a:spcPct val="90000"/>
+            </a:lnSpc>
+            <a:spcBef>
+              <a:spcPct val="0"/>
+            </a:spcBef>
+            <a:spcAft>
+              <a:spcPct val="35000"/>
+            </a:spcAft>
+            <a:buNone/>
+          </a:pPr>
+          <a:r>
+            <a:rPr lang="en-US" sz="2800" b="1" kern="1200" dirty="0">
+              <a:solidFill>
+                <a:srgbClr val="104B7C"/>
+              </a:solidFill>
+              <a:latin typeface="Arial" panose="020B0604020202020204" pitchFamily="34" charset="0"/>
+              <a:cs typeface="Arial" panose="020B0604020202020204" pitchFamily="34" charset="0"/>
+            </a:rPr>
+            <a:t>Open Source</a:t>
+          </a:r>
+        </a:p>
+      </dsp:txBody>
+      <dsp:txXfrm>
+        <a:off x="1137920" y="3781213"/>
+        <a:ext cx="1893824" cy="1468120"/>
+      </dsp:txXfrm>
+    </dsp:sp>
+    <dsp:sp modelId="{5102348C-82B6-0041-B5DD-08076EEDF3B9}">
+      <dsp:nvSpPr>
+        <dsp:cNvPr id="0" name=""/>
+        <dsp:cNvSpPr/>
+      </dsp:nvSpPr>
+      <dsp:spPr>
+        <a:xfrm>
+          <a:off x="2897632" y="2294805"/>
+          <a:ext cx="382016" cy="382016"/>
+        </a:xfrm>
+        <a:prstGeom prst="ellipse">
+          <a:avLst/>
+        </a:prstGeom>
+        <a:solidFill>
+          <a:schemeClr val="lt1">
+            <a:hueOff val="0"/>
+            <a:satOff val="0"/>
+            <a:lumOff val="0"/>
+            <a:alphaOff val="0"/>
+          </a:schemeClr>
+        </a:solidFill>
+        <a:ln w="12700" cap="flat" cmpd="sng" algn="ctr">
+          <a:solidFill>
+            <a:schemeClr val="accent1">
+              <a:shade val="80000"/>
+              <a:hueOff val="0"/>
+              <a:satOff val="0"/>
+              <a:lumOff val="0"/>
+              <a:alphaOff val="0"/>
+            </a:schemeClr>
+          </a:solidFill>
+          <a:prstDash val="solid"/>
+          <a:miter lim="800000"/>
+        </a:ln>
+        <a:effectLst/>
+      </dsp:spPr>
+      <dsp:style>
+        <a:lnRef idx="2">
+          <a:scrgbClr r="0" g="0" b="0"/>
+        </a:lnRef>
+        <a:fillRef idx="1">
+          <a:scrgbClr r="0" g="0" b="0"/>
+        </a:fillRef>
+        <a:effectRef idx="0">
+          <a:scrgbClr r="0" g="0" b="0"/>
+        </a:effectRef>
+        <a:fontRef idx="minor">
+          <a:schemeClr val="lt1"/>
+        </a:fontRef>
+      </dsp:style>
+    </dsp:sp>
+    <dsp:sp modelId="{253475DF-BD78-0E46-A27F-43A6E3B29066}">
+      <dsp:nvSpPr>
+        <dsp:cNvPr id="0" name=""/>
+        <dsp:cNvSpPr/>
+      </dsp:nvSpPr>
+      <dsp:spPr>
+        <a:xfrm>
+          <a:off x="3088640" y="2485813"/>
+          <a:ext cx="1950720" cy="2763519"/>
+        </a:xfrm>
+        <a:prstGeom prst="rect">
+          <a:avLst/>
+        </a:prstGeom>
+        <a:noFill/>
+        <a:ln>
+          <a:noFill/>
+        </a:ln>
+        <a:effectLst/>
+      </dsp:spPr>
+      <dsp:style>
+        <a:lnRef idx="0">
+          <a:scrgbClr r="0" g="0" b="0"/>
+        </a:lnRef>
+        <a:fillRef idx="0">
+          <a:scrgbClr r="0" g="0" b="0"/>
+        </a:fillRef>
+        <a:effectRef idx="0">
+          <a:scrgbClr r="0" g="0" b="0"/>
+        </a:effectRef>
+        <a:fontRef idx="minor"/>
+      </dsp:style>
+      <dsp:txBody>
+        <a:bodyPr spcFirstLastPara="0" vert="horz" wrap="square" lIns="202422" tIns="0" rIns="0" bIns="0" numCol="1" spcCol="1270" anchor="t" anchorCtr="0">
+          <a:noAutofit/>
+        </a:bodyPr>
+        <a:lstStyle/>
+        <a:p>
+          <a:pPr marL="0" lvl="0" indent="0" algn="l" defTabSz="1244600">
+            <a:lnSpc>
+              <a:spcPct val="90000"/>
+            </a:lnSpc>
+            <a:spcBef>
+              <a:spcPct val="0"/>
+            </a:spcBef>
+            <a:spcAft>
+              <a:spcPct val="35000"/>
+            </a:spcAft>
+            <a:buNone/>
+          </a:pPr>
+          <a:r>
+            <a:rPr lang="en-US" sz="2800" b="1" kern="1200" dirty="0">
+              <a:solidFill>
+                <a:srgbClr val="104B7C"/>
+              </a:solidFill>
+              <a:latin typeface="Arial" panose="020B0604020202020204" pitchFamily="34" charset="0"/>
+              <a:cs typeface="Arial" panose="020B0604020202020204" pitchFamily="34" charset="0"/>
+            </a:rPr>
+            <a:t>Open Access</a:t>
+          </a:r>
+        </a:p>
+      </dsp:txBody>
+      <dsp:txXfrm>
+        <a:off x="3088640" y="2485813"/>
+        <a:ext cx="1950720" cy="2763519"/>
+      </dsp:txXfrm>
+    </dsp:sp>
+    <dsp:sp modelId="{B1F9F04D-5CDB-3E4C-BA0F-8A7947F2AB7E}">
+      <dsp:nvSpPr>
+        <dsp:cNvPr id="0" name=""/>
+        <dsp:cNvSpPr/>
+      </dsp:nvSpPr>
+      <dsp:spPr>
+        <a:xfrm>
+          <a:off x="5140960" y="1454573"/>
+          <a:ext cx="528320" cy="528320"/>
+        </a:xfrm>
+        <a:prstGeom prst="ellipse">
+          <a:avLst/>
+        </a:prstGeom>
+        <a:solidFill>
+          <a:schemeClr val="lt1">
+            <a:hueOff val="0"/>
+            <a:satOff val="0"/>
+            <a:lumOff val="0"/>
+            <a:alphaOff val="0"/>
+          </a:schemeClr>
+        </a:solidFill>
+        <a:ln w="12700" cap="flat" cmpd="sng" algn="ctr">
+          <a:solidFill>
+            <a:schemeClr val="accent1">
+              <a:shade val="80000"/>
+              <a:hueOff val="0"/>
+              <a:satOff val="0"/>
+              <a:lumOff val="0"/>
+              <a:alphaOff val="0"/>
+            </a:schemeClr>
+          </a:solidFill>
+          <a:prstDash val="solid"/>
+          <a:miter lim="800000"/>
+        </a:ln>
+        <a:effectLst/>
+      </dsp:spPr>
+      <dsp:style>
+        <a:lnRef idx="2">
+          <a:scrgbClr r="0" g="0" b="0"/>
+        </a:lnRef>
+        <a:fillRef idx="1">
+          <a:scrgbClr r="0" g="0" b="0"/>
+        </a:fillRef>
+        <a:effectRef idx="0">
+          <a:scrgbClr r="0" g="0" b="0"/>
+        </a:effectRef>
+        <a:fontRef idx="minor">
+          <a:schemeClr val="lt1"/>
+        </a:fontRef>
+      </dsp:style>
+    </dsp:sp>
+    <dsp:sp modelId="{E58A52CF-9928-304D-A348-CFE492238018}">
+      <dsp:nvSpPr>
+        <dsp:cNvPr id="0" name=""/>
+        <dsp:cNvSpPr/>
+      </dsp:nvSpPr>
+      <dsp:spPr>
+        <a:xfrm>
+          <a:off x="5417233" y="1718733"/>
+          <a:ext cx="2381204" cy="3530600"/>
+        </a:xfrm>
+        <a:prstGeom prst="rect">
+          <a:avLst/>
+        </a:prstGeom>
+        <a:noFill/>
+        <a:ln>
+          <a:noFill/>
+        </a:ln>
+        <a:effectLst/>
+      </dsp:spPr>
+      <dsp:style>
+        <a:lnRef idx="0">
+          <a:scrgbClr r="0" g="0" b="0"/>
+        </a:lnRef>
+        <a:fillRef idx="0">
+          <a:scrgbClr r="0" g="0" b="0"/>
+        </a:fillRef>
+        <a:effectRef idx="0">
+          <a:scrgbClr r="0" g="0" b="0"/>
+        </a:effectRef>
+        <a:fontRef idx="minor"/>
+      </dsp:style>
+      <dsp:txBody>
+        <a:bodyPr spcFirstLastPara="0" vert="horz" wrap="square" lIns="279946" tIns="0" rIns="0" bIns="0" numCol="1" spcCol="1270" anchor="t" anchorCtr="0">
+          <a:noAutofit/>
+        </a:bodyPr>
+        <a:lstStyle/>
+        <a:p>
+          <a:pPr marL="0" lvl="0" indent="0" algn="l" defTabSz="1244600">
+            <a:lnSpc>
+              <a:spcPct val="90000"/>
+            </a:lnSpc>
+            <a:spcBef>
+              <a:spcPct val="0"/>
+            </a:spcBef>
+            <a:spcAft>
+              <a:spcPct val="35000"/>
+            </a:spcAft>
+            <a:buNone/>
+          </a:pPr>
+          <a:r>
+            <a:rPr lang="en-US" sz="2800" b="1" kern="1200" dirty="0">
+              <a:solidFill>
+                <a:srgbClr val="104B7C"/>
+              </a:solidFill>
+              <a:latin typeface="Arial" panose="020B0604020202020204" pitchFamily="34" charset="0"/>
+              <a:cs typeface="Arial" panose="020B0604020202020204" pitchFamily="34" charset="0"/>
+            </a:rPr>
+            <a:t>Open Publication</a:t>
+          </a:r>
+        </a:p>
+      </dsp:txBody>
+      <dsp:txXfrm>
+        <a:off x="5417233" y="1718733"/>
+        <a:ext cx="2381204" cy="3530600"/>
+      </dsp:txXfrm>
+    </dsp:sp>
+  </dsp:spTree>
+</dsp:drawing>
+</file>
+
+<file path=ppt/diagrams/drawing2.xml><?xml version="1.0" encoding="utf-8"?>
 <dsp:drawing xmlns:dgm="http://schemas.openxmlformats.org/drawingml/2006/diagram" xmlns:dsp="http://schemas.microsoft.com/office/drawing/2008/diagram" xmlns:a="http://schemas.openxmlformats.org/drawingml/2006/main">
   <dsp:spTree>
     <dsp:nvGrpSpPr>
@@ -3214,7 +4662,2686 @@
 </dgm:layoutDef>
 </file>
 
+<file path=ppt/diagrams/layout2.xml><?xml version="1.0" encoding="utf-8"?>
+<dgm:layoutDef xmlns:dgm="http://schemas.openxmlformats.org/drawingml/2006/diagram" xmlns:a="http://schemas.openxmlformats.org/drawingml/2006/main" uniqueId="urn:microsoft.com/office/officeart/2005/8/layout/arrow2">
+  <dgm:title val=""/>
+  <dgm:desc val=""/>
+  <dgm:catLst>
+    <dgm:cat type="process" pri="23000"/>
+  </dgm:catLst>
+  <dgm:sampData useDef="1">
+    <dgm:dataModel>
+      <dgm:ptLst/>
+      <dgm:bg/>
+      <dgm:whole/>
+    </dgm:dataModel>
+  </dgm:sampData>
+  <dgm:styleData>
+    <dgm:dataModel>
+      <dgm:ptLst>
+        <dgm:pt modelId="0" type="doc"/>
+        <dgm:pt modelId="1"/>
+        <dgm:pt modelId="2"/>
+      </dgm:ptLst>
+      <dgm:cxnLst>
+        <dgm:cxn modelId="3" srcId="0" destId="1" srcOrd="0" destOrd="0"/>
+        <dgm:cxn modelId="4" srcId="0" destId="2" srcOrd="1" destOrd="0"/>
+      </dgm:cxnLst>
+      <dgm:bg/>
+      <dgm:whole/>
+    </dgm:dataModel>
+  </dgm:styleData>
+  <dgm:clrData>
+    <dgm:dataModel>
+      <dgm:ptLst>
+        <dgm:pt modelId="0" type="doc"/>
+        <dgm:pt modelId="1"/>
+        <dgm:pt modelId="2"/>
+        <dgm:pt modelId="3"/>
+        <dgm:pt modelId="4"/>
+      </dgm:ptLst>
+      <dgm:cxnLst>
+        <dgm:cxn modelId="5" srcId="0" destId="1" srcOrd="0" destOrd="0"/>
+        <dgm:cxn modelId="6" srcId="0" destId="2" srcOrd="1" destOrd="0"/>
+        <dgm:cxn modelId="7" srcId="0" destId="3" srcOrd="2" destOrd="0"/>
+        <dgm:cxn modelId="8" srcId="0" destId="4" srcOrd="3" destOrd="0"/>
+      </dgm:cxnLst>
+      <dgm:bg/>
+      <dgm:whole/>
+    </dgm:dataModel>
+  </dgm:clrData>
+  <dgm:layoutNode name="arrowDiagram">
+    <dgm:varLst>
+      <dgm:chMax val="5"/>
+      <dgm:dir/>
+      <dgm:resizeHandles val="exact"/>
+    </dgm:varLst>
+    <dgm:alg type="composite">
+      <dgm:param type="ar" val="1.6"/>
+    </dgm:alg>
+    <dgm:shape xmlns:r="http://schemas.openxmlformats.org/officeDocument/2006/relationships" r:blip="">
+      <dgm:adjLst/>
+    </dgm:shape>
+    <dgm:presOf/>
+    <dgm:constrLst>
+      <dgm:constr type="l" for="ch" forName="arrow"/>
+      <dgm:constr type="t" for="ch" forName="arrow"/>
+      <dgm:constr type="w" for="ch" forName="arrow" refType="w"/>
+      <dgm:constr type="h" for="ch" forName="arrow" refType="h"/>
+      <dgm:constr type="ctrX" for="ch" forName="arrowDiagram1" refType="w" fact="0.5"/>
+      <dgm:constr type="ctrY" for="ch" forName="arrowDiagram1" refType="h" fact="0.5"/>
+      <dgm:constr type="w" for="ch" forName="arrowDiagram1" refType="w"/>
+      <dgm:constr type="h" for="ch" forName="arrowDiagram1" refType="h"/>
+      <dgm:constr type="ctrX" for="ch" forName="arrowDiagram2" refType="w" fact="0.5"/>
+      <dgm:constr type="ctrY" for="ch" forName="arrowDiagram2" refType="h" fact="0.5"/>
+      <dgm:constr type="w" for="ch" forName="arrowDiagram2" refType="w"/>
+      <dgm:constr type="h" for="ch" forName="arrowDiagram2" refType="h"/>
+      <dgm:constr type="ctrX" for="ch" forName="arrowDiagram3" refType="w" fact="0.5"/>
+      <dgm:constr type="ctrY" for="ch" forName="arrowDiagram3" refType="h" fact="0.5"/>
+      <dgm:constr type="w" for="ch" forName="arrowDiagram3" refType="w"/>
+      <dgm:constr type="h" for="ch" forName="arrowDiagram3" refType="h"/>
+      <dgm:constr type="ctrX" for="ch" forName="arrowDiagram4" refType="w" fact="0.5"/>
+      <dgm:constr type="ctrY" for="ch" forName="arrowDiagram4" refType="h" fact="0.5"/>
+      <dgm:constr type="w" for="ch" forName="arrowDiagram4" refType="w"/>
+      <dgm:constr type="h" for="ch" forName="arrowDiagram4" refType="h"/>
+      <dgm:constr type="ctrX" for="ch" forName="arrowDiagram5" refType="w" fact="0.5"/>
+      <dgm:constr type="ctrY" for="ch" forName="arrowDiagram5" refType="h" fact="0.5"/>
+      <dgm:constr type="w" for="ch" forName="arrowDiagram5" refType="w"/>
+      <dgm:constr type="h" for="ch" forName="arrowDiagram5" refType="h"/>
+    </dgm:constrLst>
+    <dgm:ruleLst/>
+    <dgm:choose name="Name0">
+      <dgm:if name="Name1" axis="ch" ptType="node" func="cnt" op="gte" val="1">
+        <dgm:layoutNode name="arrow" styleLbl="bgShp">
+          <dgm:alg type="sp"/>
+          <dgm:shape xmlns:r="http://schemas.openxmlformats.org/officeDocument/2006/relationships" type="swooshArrow" r:blip="">
+            <dgm:adjLst>
+              <dgm:adj idx="2" val="0.25"/>
+            </dgm:adjLst>
+          </dgm:shape>
+          <dgm:presOf/>
+          <dgm:constrLst/>
+          <dgm:ruleLst/>
+        </dgm:layoutNode>
+        <dgm:choose name="Name2">
+          <dgm:if name="Name3" axis="ch" ptType="node" func="cnt" op="lt" val="1"/>
+          <dgm:if name="Name4" axis="ch" ptType="node" func="cnt" op="equ" val="1">
+            <dgm:layoutNode name="arrowDiagram1">
+              <dgm:varLst>
+                <dgm:bulletEnabled val="1"/>
+              </dgm:varLst>
+              <dgm:alg type="composite">
+                <dgm:param type="vertAlign" val="none"/>
+                <dgm:param type="horzAlign" val="none"/>
+              </dgm:alg>
+              <dgm:shape xmlns:r="http://schemas.openxmlformats.org/officeDocument/2006/relationships" r:blip="">
+                <dgm:adjLst/>
+              </dgm:shape>
+              <dgm:presOf/>
+              <dgm:constrLst>
+                <dgm:constr type="ctrX" for="ch" forName="bullet1" refType="w" fact="0.8"/>
+                <dgm:constr type="ctrY" for="ch" forName="bullet1" refType="h" fact="0.262"/>
+                <dgm:constr type="w" for="ch" forName="bullet1" refType="w" fact="0.074"/>
+                <dgm:constr type="h" for="ch" forName="bullet1" refType="w" refFor="ch" refForName="bullet1"/>
+                <dgm:constr type="r" for="ch" forName="textBox1" refType="ctrX" refFor="ch" refForName="bullet1"/>
+                <dgm:constr type="t" for="ch" forName="textBox1" refType="ctrY" refFor="ch" refForName="bullet1"/>
+                <dgm:constr type="w" for="ch" forName="textBox1" refType="w" fact="0.4"/>
+                <dgm:constr type="h" for="ch" forName="textBox1" refType="h" fact="0.738"/>
+                <dgm:constr type="userA" refType="h" refFor="ch" refForName="bullet1" fact="0.53"/>
+                <dgm:constr type="rMarg" for="ch" forName="textBox1" refType="userA" fact="2.834"/>
+                <dgm:constr type="primFontSz" for="ch" ptType="node" op="equ" val="65"/>
+              </dgm:constrLst>
+              <dgm:ruleLst/>
+              <dgm:forEach name="Name5" axis="ch" ptType="node" cnt="1">
+                <dgm:layoutNode name="bullet1" styleLbl="node1">
+                  <dgm:alg type="sp"/>
+                  <dgm:shape xmlns:r="http://schemas.openxmlformats.org/officeDocument/2006/relationships" type="ellipse" r:blip="">
+                    <dgm:adjLst/>
+                  </dgm:shape>
+                  <dgm:presOf/>
+                  <dgm:constrLst/>
+                  <dgm:ruleLst/>
+                </dgm:layoutNode>
+                <dgm:layoutNode name="textBox1" styleLbl="revTx">
+                  <dgm:varLst>
+                    <dgm:bulletEnabled val="1"/>
+                  </dgm:varLst>
+                  <dgm:alg type="tx">
+                    <dgm:param type="txAnchorVert" val="t"/>
+                    <dgm:param type="parTxLTRAlign" val="r"/>
+                    <dgm:param type="parTxRTLAlign" val="r"/>
+                  </dgm:alg>
+                  <dgm:shape xmlns:r="http://schemas.openxmlformats.org/officeDocument/2006/relationships" type="round2DiagRect" r:blip="">
+                    <dgm:adjLst/>
+                  </dgm:shape>
+                  <dgm:presOf axis="desOrSelf" ptType="node"/>
+                  <dgm:constrLst>
+                    <dgm:constr type="lMarg"/>
+                    <dgm:constr type="tMarg"/>
+                    <dgm:constr type="bMarg"/>
+                  </dgm:constrLst>
+                  <dgm:ruleLst>
+                    <dgm:rule type="primFontSz" val="5" fact="NaN" max="NaN"/>
+                  </dgm:ruleLst>
+                </dgm:layoutNode>
+              </dgm:forEach>
+            </dgm:layoutNode>
+          </dgm:if>
+          <dgm:if name="Name6" axis="ch" ptType="node" func="cnt" op="equ" val="2">
+            <dgm:layoutNode name="arrowDiagram2">
+              <dgm:alg type="composite">
+                <dgm:param type="vertAlign" val="none"/>
+                <dgm:param type="horzAlign" val="none"/>
+              </dgm:alg>
+              <dgm:shape xmlns:r="http://schemas.openxmlformats.org/officeDocument/2006/relationships" r:blip="">
+                <dgm:adjLst/>
+              </dgm:shape>
+              <dgm:presOf/>
+              <dgm:choose name="Name7">
+                <dgm:if name="Name8" func="var" arg="dir" op="equ" val="norm">
+                  <dgm:constrLst>
+                    <dgm:constr type="ctrX" for="ch" forName="bullet2a" refType="w" fact="0.25"/>
+                    <dgm:constr type="ctrY" for="ch" forName="bullet2a" refType="h" fact="0.573"/>
+                    <dgm:constr type="w" for="ch" forName="bullet2a" refType="w" fact="0.035"/>
+                    <dgm:constr type="h" for="ch" forName="bullet2a" refType="w" refFor="ch" refForName="bullet2a"/>
+                    <dgm:constr type="l" for="ch" forName="textBox2a" refType="ctrX" refFor="ch" refForName="bullet2a"/>
+                    <dgm:constr type="t" for="ch" forName="textBox2a" refType="ctrY" refFor="ch" refForName="bullet2a"/>
+                    <dgm:constr type="w" for="ch" forName="textBox2a" refType="w" fact="0.325"/>
+                    <dgm:constr type="h" for="ch" forName="textBox2a" refType="h" fact="0.427"/>
+                    <dgm:constr type="userA" refType="h" refFor="ch" refForName="bullet2a" fact="0.53"/>
+                    <dgm:constr type="lMarg" for="ch" forName="textBox2a" refType="userA" fact="2.834"/>
+                    <dgm:constr type="ctrX" for="ch" forName="bullet2b" refType="w" fact="0.585"/>
+                    <dgm:constr type="ctrY" for="ch" forName="bullet2b" refType="h" fact="0.338"/>
+                    <dgm:constr type="w" for="ch" forName="bullet2b" refType="w" fact="0.06"/>
+                    <dgm:constr type="h" for="ch" forName="bullet2b" refType="w" refFor="ch" refForName="bullet2b"/>
+                    <dgm:constr type="l" for="ch" forName="textBox2b" refType="ctrX" refFor="ch" refForName="bullet2b"/>
+                    <dgm:constr type="t" for="ch" forName="textBox2b" refType="ctrY" refFor="ch" refForName="bullet2b"/>
+                    <dgm:constr type="w" for="ch" forName="textBox2b" refType="w" fact="0.325"/>
+                    <dgm:constr type="h" for="ch" forName="textBox2b" refType="h" fact="0.662"/>
+                    <dgm:constr type="userB" refType="h" refFor="ch" refForName="bullet2b" fact="0.53"/>
+                    <dgm:constr type="lMarg" for="ch" forName="textBox2b" refType="userB" fact="2.834"/>
+                    <dgm:constr type="primFontSz" for="ch" ptType="node" op="equ" val="65"/>
+                  </dgm:constrLst>
+                </dgm:if>
+                <dgm:else name="Name9">
+                  <dgm:constrLst>
+                    <dgm:constr type="ctrX" for="ch" forName="bullet2a" refType="w" fact="0.25"/>
+                    <dgm:constr type="ctrY" for="ch" forName="bullet2a" refType="h" fact="0.573"/>
+                    <dgm:constr type="w" for="ch" forName="bullet2a" refType="w" fact="0.035"/>
+                    <dgm:constr type="h" for="ch" forName="bullet2a" refType="w" refFor="ch" refForName="bullet2a"/>
+                    <dgm:constr type="r" for="ch" forName="textBox2a" refType="ctrX" refFor="ch" refForName="bullet2a"/>
+                    <dgm:constr type="b" for="ch" forName="textBox2a" refType="ctrY" refFor="ch" refForName="bullet2a"/>
+                    <dgm:constr type="w" for="ch" forName="textBox2a" refType="w" fact="0.25"/>
+                    <dgm:constr type="h" for="ch" forName="textBox2a" refType="h" fact="0.573"/>
+                    <dgm:constr type="userA" refType="h" refFor="ch" refForName="bullet2a" fact="0.53"/>
+                    <dgm:constr type="rMarg" for="ch" forName="textBox2a" refType="userA" fact="2.834"/>
+                    <dgm:constr type="ctrX" for="ch" forName="bullet2b" refType="w" fact="0.585"/>
+                    <dgm:constr type="ctrY" for="ch" forName="bullet2b" refType="h" fact="0.338"/>
+                    <dgm:constr type="w" for="ch" forName="bullet2b" refType="w" fact="0.06"/>
+                    <dgm:constr type="h" for="ch" forName="bullet2b" refType="w" refFor="ch" refForName="bullet2b"/>
+                    <dgm:constr type="r" for="ch" forName="textBox2b" refType="ctrX" refFor="ch" refForName="bullet2b"/>
+                    <dgm:constr type="b" for="ch" forName="textBox2b" refType="ctrY" refFor="ch" refForName="bullet2b"/>
+                    <dgm:constr type="w" for="ch" forName="textBox2b" refType="w" fact="0.28"/>
+                    <dgm:constr type="h" for="ch" forName="textBox2b" refType="h" fact="0.338"/>
+                    <dgm:constr type="userB" refType="h" refFor="ch" refForName="bullet2b" fact="0.53"/>
+                    <dgm:constr type="rMarg" for="ch" forName="textBox2b" refType="userB" fact="2.834"/>
+                    <dgm:constr type="primFontSz" for="ch" ptType="node" op="equ" val="65"/>
+                  </dgm:constrLst>
+                </dgm:else>
+              </dgm:choose>
+              <dgm:ruleLst/>
+              <dgm:forEach name="Name10" axis="ch" ptType="node" cnt="1">
+                <dgm:layoutNode name="bullet2a" styleLbl="node1">
+                  <dgm:alg type="sp"/>
+                  <dgm:shape xmlns:r="http://schemas.openxmlformats.org/officeDocument/2006/relationships" type="ellipse" r:blip="">
+                    <dgm:adjLst/>
+                  </dgm:shape>
+                  <dgm:presOf/>
+                  <dgm:constrLst/>
+                  <dgm:ruleLst/>
+                </dgm:layoutNode>
+                <dgm:layoutNode name="textBox2a" styleLbl="revTx">
+                  <dgm:varLst>
+                    <dgm:bulletEnabled val="1"/>
+                  </dgm:varLst>
+                  <dgm:choose name="Name11">
+                    <dgm:if name="Name12" func="var" arg="dir" op="equ" val="norm">
+                      <dgm:choose name="Name13">
+                        <dgm:if name="Name14" axis="root des" ptType="all node" func="maxDepth" op="gt" val="1">
+                          <dgm:alg type="tx">
+                            <dgm:param type="txAnchorVert" val="t"/>
+                            <dgm:param type="parTxLTRAlign" val="l"/>
+                            <dgm:param type="parTxRTLAlign" val="r"/>
+                          </dgm:alg>
+                        </dgm:if>
+                        <dgm:else name="Name15">
+                          <dgm:alg type="tx">
+                            <dgm:param type="txAnchorVert" val="t"/>
+                            <dgm:param type="parTxLTRAlign" val="l"/>
+                            <dgm:param type="parTxRTLAlign" val="l"/>
+                          </dgm:alg>
+                        </dgm:else>
+                      </dgm:choose>
+                    </dgm:if>
+                    <dgm:else name="Name16">
+                      <dgm:choose name="Name17">
+                        <dgm:if name="Name18" axis="root des" ptType="all node" func="maxDepth" op="gt" val="1">
+                          <dgm:alg type="tx">
+                            <dgm:param type="txAnchorVert" val="b"/>
+                            <dgm:param type="txAnchorVertCh" val="b"/>
+                            <dgm:param type="parTxLTRAlign" val="l"/>
+                            <dgm:param type="parTxRTLAlign" val="r"/>
+                          </dgm:alg>
+                        </dgm:if>
+                        <dgm:else name="Name19">
+                          <dgm:alg type="tx">
+                            <dgm:param type="txAnchorVert" val="b"/>
+                            <dgm:param type="parTxLTRAlign" val="r"/>
+                            <dgm:param type="parTxRTLAlign" val="r"/>
+                          </dgm:alg>
+                        </dgm:else>
+                      </dgm:choose>
+                    </dgm:else>
+                  </dgm:choose>
+                  <dgm:shape xmlns:r="http://schemas.openxmlformats.org/officeDocument/2006/relationships" type="rect" r:blip="">
+                    <dgm:adjLst/>
+                  </dgm:shape>
+                  <dgm:presOf axis="desOrSelf" ptType="node"/>
+                  <dgm:choose name="Name20">
+                    <dgm:if name="Name21" func="var" arg="dir" op="equ" val="norm">
+                      <dgm:constrLst>
+                        <dgm:constr type="rMarg"/>
+                        <dgm:constr type="tMarg"/>
+                        <dgm:constr type="bMarg"/>
+                      </dgm:constrLst>
+                    </dgm:if>
+                    <dgm:else name="Name22">
+                      <dgm:constrLst>
+                        <dgm:constr type="lMarg"/>
+                        <dgm:constr type="tMarg"/>
+                        <dgm:constr type="bMarg"/>
+                      </dgm:constrLst>
+                    </dgm:else>
+                  </dgm:choose>
+                  <dgm:ruleLst>
+                    <dgm:rule type="primFontSz" val="5" fact="NaN" max="NaN"/>
+                  </dgm:ruleLst>
+                </dgm:layoutNode>
+              </dgm:forEach>
+              <dgm:forEach name="Name23" axis="ch" ptType="node" st="2" cnt="1">
+                <dgm:layoutNode name="bullet2b" styleLbl="node1">
+                  <dgm:alg type="sp"/>
+                  <dgm:shape xmlns:r="http://schemas.openxmlformats.org/officeDocument/2006/relationships" type="ellipse" r:blip="">
+                    <dgm:adjLst/>
+                  </dgm:shape>
+                  <dgm:presOf/>
+                  <dgm:constrLst/>
+                  <dgm:ruleLst/>
+                </dgm:layoutNode>
+                <dgm:layoutNode name="textBox2b" styleLbl="revTx">
+                  <dgm:varLst>
+                    <dgm:bulletEnabled val="1"/>
+                  </dgm:varLst>
+                  <dgm:choose name="Name24">
+                    <dgm:if name="Name25" func="var" arg="dir" op="equ" val="norm">
+                      <dgm:choose name="Name26">
+                        <dgm:if name="Name27" axis="root des" ptType="all node" func="maxDepth" op="gt" val="1">
+                          <dgm:alg type="tx">
+                            <dgm:param type="txAnchorVert" val="t"/>
+                            <dgm:param type="parTxLTRAlign" val="l"/>
+                            <dgm:param type="parTxRTLAlign" val="r"/>
+                          </dgm:alg>
+                        </dgm:if>
+                        <dgm:else name="Name28">
+                          <dgm:alg type="tx">
+                            <dgm:param type="txAnchorVert" val="t"/>
+                            <dgm:param type="parTxLTRAlign" val="l"/>
+                            <dgm:param type="parTxRTLAlign" val="l"/>
+                          </dgm:alg>
+                        </dgm:else>
+                      </dgm:choose>
+                    </dgm:if>
+                    <dgm:else name="Name29">
+                      <dgm:choose name="Name30">
+                        <dgm:if name="Name31" axis="root des" ptType="all node" func="maxDepth" op="gt" val="1">
+                          <dgm:alg type="tx">
+                            <dgm:param type="txAnchorVert" val="b"/>
+                            <dgm:param type="txAnchorVertCh" val="b"/>
+                            <dgm:param type="parTxLTRAlign" val="l"/>
+                            <dgm:param type="parTxRTLAlign" val="r"/>
+                          </dgm:alg>
+                        </dgm:if>
+                        <dgm:else name="Name32">
+                          <dgm:alg type="tx">
+                            <dgm:param type="txAnchorVert" val="b"/>
+                            <dgm:param type="parTxLTRAlign" val="r"/>
+                            <dgm:param type="parTxRTLAlign" val="r"/>
+                          </dgm:alg>
+                        </dgm:else>
+                      </dgm:choose>
+                    </dgm:else>
+                  </dgm:choose>
+                  <dgm:shape xmlns:r="http://schemas.openxmlformats.org/officeDocument/2006/relationships" type="rect" r:blip="">
+                    <dgm:adjLst/>
+                  </dgm:shape>
+                  <dgm:presOf axis="desOrSelf" ptType="node"/>
+                  <dgm:choose name="Name33">
+                    <dgm:if name="Name34" func="var" arg="dir" op="equ" val="norm">
+                      <dgm:constrLst>
+                        <dgm:constr type="rMarg"/>
+                        <dgm:constr type="tMarg"/>
+                        <dgm:constr type="bMarg"/>
+                      </dgm:constrLst>
+                    </dgm:if>
+                    <dgm:else name="Name35">
+                      <dgm:constrLst>
+                        <dgm:constr type="lMarg"/>
+                        <dgm:constr type="tMarg"/>
+                        <dgm:constr type="bMarg"/>
+                      </dgm:constrLst>
+                    </dgm:else>
+                  </dgm:choose>
+                  <dgm:ruleLst>
+                    <dgm:rule type="primFontSz" val="5" fact="NaN" max="NaN"/>
+                  </dgm:ruleLst>
+                </dgm:layoutNode>
+              </dgm:forEach>
+            </dgm:layoutNode>
+          </dgm:if>
+          <dgm:if name="Name36" axis="ch" ptType="node" func="cnt" op="equ" val="3">
+            <dgm:layoutNode name="arrowDiagram3">
+              <dgm:alg type="composite">
+                <dgm:param type="vertAlign" val="none"/>
+                <dgm:param type="horzAlign" val="none"/>
+              </dgm:alg>
+              <dgm:shape xmlns:r="http://schemas.openxmlformats.org/officeDocument/2006/relationships" r:blip="">
+                <dgm:adjLst/>
+              </dgm:shape>
+              <dgm:presOf/>
+              <dgm:choose name="Name37">
+                <dgm:if name="Name38" func="var" arg="dir" op="equ" val="norm">
+                  <dgm:constrLst>
+                    <dgm:constr type="ctrX" for="ch" forName="bullet3a" refType="w" fact="0.14"/>
+                    <dgm:constr type="ctrY" for="ch" forName="bullet3a" refType="h" fact="0.711"/>
+                    <dgm:constr type="w" for="ch" forName="bullet3a" refType="w" fact="0.026"/>
+                    <dgm:constr type="h" for="ch" forName="bullet3a" refType="w" refFor="ch" refForName="bullet3a"/>
+                    <dgm:constr type="l" for="ch" forName="textBox3a" refType="ctrX" refFor="ch" refForName="bullet3a"/>
+                    <dgm:constr type="t" for="ch" forName="textBox3a" refType="ctrY" refFor="ch" refForName="bullet3a"/>
+                    <dgm:constr type="w" for="ch" forName="textBox3a" refType="w" fact="0.233"/>
+                    <dgm:constr type="h" for="ch" forName="textBox3a" refType="h" fact="0.289"/>
+                    <dgm:constr type="userA" refType="h" refFor="ch" refForName="bullet3a" fact="0.53"/>
+                    <dgm:constr type="lMarg" for="ch" forName="textBox3a" refType="userA" fact="2.834"/>
+                    <dgm:constr type="ctrX" for="ch" forName="bullet3b" refType="w" fact="0.38"/>
+                    <dgm:constr type="ctrY" for="ch" forName="bullet3b" refType="h" fact="0.456"/>
+                    <dgm:constr type="w" for="ch" forName="bullet3b" refType="w" fact="0.047"/>
+                    <dgm:constr type="h" for="ch" forName="bullet3b" refType="w" refFor="ch" refForName="bullet3b"/>
+                    <dgm:constr type="l" for="ch" forName="textBox3b" refType="ctrX" refFor="ch" refForName="bullet3b"/>
+                    <dgm:constr type="t" for="ch" forName="textBox3b" refType="ctrY" refFor="ch" refForName="bullet3b"/>
+                    <dgm:constr type="w" for="ch" forName="textBox3b" refType="w" fact="0.24"/>
+                    <dgm:constr type="h" for="ch" forName="textBox3b" refType="h" fact="0.544"/>
+                    <dgm:constr type="userB" refType="h" refFor="ch" refForName="bullet3b" fact="0.53"/>
+                    <dgm:constr type="lMarg" for="ch" forName="textBox3b" refType="userB" fact="2.834"/>
+                    <dgm:constr type="ctrX" for="ch" forName="bullet3c" refType="w" fact="0.665"/>
+                    <dgm:constr type="ctrY" for="ch" forName="bullet3c" refType="h" fact="0.305"/>
+                    <dgm:constr type="w" for="ch" forName="bullet3c" refType="w" fact="0.065"/>
+                    <dgm:constr type="h" for="ch" forName="bullet3c" refType="w" refFor="ch" refForName="bullet3c"/>
+                    <dgm:constr type="l" for="ch" forName="textBox3c" refType="ctrX" refFor="ch" refForName="bullet3c"/>
+                    <dgm:constr type="t" for="ch" forName="textBox3c" refType="ctrY" refFor="ch" refForName="bullet3c"/>
+                    <dgm:constr type="w" for="ch" forName="textBox3c" refType="w" fact="0.24"/>
+                    <dgm:constr type="h" for="ch" forName="textBox3c" refType="h" fact="0.695"/>
+                    <dgm:constr type="userC" refType="h" refFor="ch" refForName="bullet3c" fact="0.53"/>
+                    <dgm:constr type="lMarg" for="ch" forName="textBox3c" refType="userC" fact="2.834"/>
+                    <dgm:constr type="primFontSz" for="ch" ptType="node" op="equ" val="65"/>
+                  </dgm:constrLst>
+                </dgm:if>
+                <dgm:else name="Name39">
+                  <dgm:constrLst>
+                    <dgm:constr type="ctrX" for="ch" forName="bullet3a" refType="w" fact="0.14"/>
+                    <dgm:constr type="ctrY" for="ch" forName="bullet3a" refType="h" fact="0.711"/>
+                    <dgm:constr type="w" for="ch" forName="bullet3a" refType="w" fact="0.026"/>
+                    <dgm:constr type="h" for="ch" forName="bullet3a" refType="w" refFor="ch" refForName="bullet3a"/>
+                    <dgm:constr type="r" for="ch" forName="textBox3a" refType="ctrX" refFor="ch" refForName="bullet3a"/>
+                    <dgm:constr type="b" for="ch" forName="textBox3a" refType="ctrY" refFor="ch" refForName="bullet3a"/>
+                    <dgm:constr type="w" for="ch" forName="textBox3a" refType="w" fact="0.14"/>
+                    <dgm:constr type="h" for="ch" forName="textBox3a" refType="h" fact="0.711"/>
+                    <dgm:constr type="userA" refType="h" refFor="ch" refForName="bullet3a" fact="0.53"/>
+                    <dgm:constr type="rMarg" for="ch" forName="textBox3a" refType="userA" fact="2.834"/>
+                    <dgm:constr type="ctrX" for="ch" forName="bullet3b" refType="w" fact="0.38"/>
+                    <dgm:constr type="ctrY" for="ch" forName="bullet3b" refType="h" fact="0.456"/>
+                    <dgm:constr type="w" for="ch" forName="bullet3b" refType="w" fact="0.047"/>
+                    <dgm:constr type="h" for="ch" forName="bullet3b" refType="w" refFor="ch" refForName="bullet3b"/>
+                    <dgm:constr type="r" for="ch" forName="textBox3b" refType="ctrX" refFor="ch" refForName="bullet3b"/>
+                    <dgm:constr type="b" for="ch" forName="textBox3b" refType="ctrY" refFor="ch" refForName="bullet3b"/>
+                    <dgm:constr type="w" for="ch" forName="textBox3b" refType="w" fact="0.24"/>
+                    <dgm:constr type="h" for="ch" forName="textBox3b" refType="h" fact="0.456"/>
+                    <dgm:constr type="userB" refType="h" refFor="ch" refForName="bullet3b" fact="0.53"/>
+                    <dgm:constr type="rMarg" for="ch" forName="textBox3b" refType="userB" fact="2.834"/>
+                    <dgm:constr type="ctrX" for="ch" forName="bullet3c" refType="w" fact="0.665"/>
+                    <dgm:constr type="ctrY" for="ch" forName="bullet3c" refType="h" fact="0.305"/>
+                    <dgm:constr type="w" for="ch" forName="bullet3c" refType="w" fact="0.065"/>
+                    <dgm:constr type="h" for="ch" forName="bullet3c" refType="w" refFor="ch" refForName="bullet3c"/>
+                    <dgm:constr type="r" for="ch" forName="textBox3c" refType="ctrX" refFor="ch" refForName="bullet3c"/>
+                    <dgm:constr type="b" for="ch" forName="textBox3c" refType="ctrY" refFor="ch" refForName="bullet3c"/>
+                    <dgm:constr type="w" for="ch" forName="textBox3c" refType="w" fact="0.24"/>
+                    <dgm:constr type="h" for="ch" forName="textBox3c" refType="h" fact="0.305"/>
+                    <dgm:constr type="userC" refType="h" refFor="ch" refForName="bullet3c" fact="0.53"/>
+                    <dgm:constr type="rMarg" for="ch" forName="textBox3c" refType="userC" fact="2.834"/>
+                    <dgm:constr type="primFontSz" for="ch" ptType="node" op="equ" val="65"/>
+                  </dgm:constrLst>
+                </dgm:else>
+              </dgm:choose>
+              <dgm:ruleLst/>
+              <dgm:forEach name="Name40" axis="ch" ptType="node" cnt="1">
+                <dgm:layoutNode name="bullet3a" styleLbl="node1">
+                  <dgm:alg type="sp"/>
+                  <dgm:shape xmlns:r="http://schemas.openxmlformats.org/officeDocument/2006/relationships" type="ellipse" r:blip="">
+                    <dgm:adjLst/>
+                  </dgm:shape>
+                  <dgm:presOf/>
+                  <dgm:constrLst/>
+                  <dgm:ruleLst/>
+                </dgm:layoutNode>
+                <dgm:layoutNode name="textBox3a" styleLbl="revTx">
+                  <dgm:varLst>
+                    <dgm:bulletEnabled val="1"/>
+                  </dgm:varLst>
+                  <dgm:choose name="Name41">
+                    <dgm:if name="Name42" func="var" arg="dir" op="equ" val="norm">
+                      <dgm:choose name="Name43">
+                        <dgm:if name="Name44" axis="root des" ptType="all node" func="maxDepth" op="gt" val="1">
+                          <dgm:alg type="tx">
+                            <dgm:param type="txAnchorVert" val="t"/>
+                            <dgm:param type="parTxLTRAlign" val="l"/>
+                            <dgm:param type="parTxRTLAlign" val="r"/>
+                          </dgm:alg>
+                        </dgm:if>
+                        <dgm:else name="Name45">
+                          <dgm:alg type="tx">
+                            <dgm:param type="txAnchorVert" val="t"/>
+                            <dgm:param type="parTxLTRAlign" val="l"/>
+                            <dgm:param type="parTxRTLAlign" val="l"/>
+                          </dgm:alg>
+                        </dgm:else>
+                      </dgm:choose>
+                    </dgm:if>
+                    <dgm:else name="Name46">
+                      <dgm:choose name="Name47">
+                        <dgm:if name="Name48" axis="root des" ptType="all node" func="maxDepth" op="gt" val="1">
+                          <dgm:alg type="tx">
+                            <dgm:param type="txAnchorVert" val="b"/>
+                            <dgm:param type="txAnchorVertCh" val="b"/>
+                            <dgm:param type="parTxLTRAlign" val="l"/>
+                            <dgm:param type="parTxRTLAlign" val="r"/>
+                          </dgm:alg>
+                        </dgm:if>
+                        <dgm:else name="Name49">
+                          <dgm:alg type="tx">
+                            <dgm:param type="txAnchorVert" val="b"/>
+                            <dgm:param type="parTxLTRAlign" val="r"/>
+                            <dgm:param type="parTxRTLAlign" val="r"/>
+                          </dgm:alg>
+                        </dgm:else>
+                      </dgm:choose>
+                    </dgm:else>
+                  </dgm:choose>
+                  <dgm:shape xmlns:r="http://schemas.openxmlformats.org/officeDocument/2006/relationships" type="rect" r:blip="">
+                    <dgm:adjLst/>
+                  </dgm:shape>
+                  <dgm:presOf axis="desOrSelf" ptType="node"/>
+                  <dgm:choose name="Name50">
+                    <dgm:if name="Name51" func="var" arg="dir" op="equ" val="norm">
+                      <dgm:constrLst>
+                        <dgm:constr type="rMarg"/>
+                        <dgm:constr type="tMarg"/>
+                        <dgm:constr type="bMarg"/>
+                      </dgm:constrLst>
+                    </dgm:if>
+                    <dgm:else name="Name52">
+                      <dgm:constrLst>
+                        <dgm:constr type="lMarg"/>
+                        <dgm:constr type="tMarg"/>
+                        <dgm:constr type="bMarg"/>
+                      </dgm:constrLst>
+                    </dgm:else>
+                  </dgm:choose>
+                  <dgm:ruleLst>
+                    <dgm:rule type="primFontSz" val="5" fact="NaN" max="NaN"/>
+                  </dgm:ruleLst>
+                </dgm:layoutNode>
+              </dgm:forEach>
+              <dgm:forEach name="Name53" axis="ch" ptType="node" st="2" cnt="1">
+                <dgm:layoutNode name="bullet3b" styleLbl="node1">
+                  <dgm:alg type="sp"/>
+                  <dgm:shape xmlns:r="http://schemas.openxmlformats.org/officeDocument/2006/relationships" type="ellipse" r:blip="">
+                    <dgm:adjLst/>
+                  </dgm:shape>
+                  <dgm:presOf/>
+                  <dgm:constrLst/>
+                  <dgm:ruleLst/>
+                </dgm:layoutNode>
+                <dgm:layoutNode name="textBox3b" styleLbl="revTx">
+                  <dgm:varLst>
+                    <dgm:bulletEnabled val="1"/>
+                  </dgm:varLst>
+                  <dgm:choose name="Name54">
+                    <dgm:if name="Name55" func="var" arg="dir" op="equ" val="norm">
+                      <dgm:choose name="Name56">
+                        <dgm:if name="Name57" axis="root des" ptType="all node" func="maxDepth" op="gt" val="1">
+                          <dgm:alg type="tx">
+                            <dgm:param type="txAnchorVert" val="t"/>
+                            <dgm:param type="parTxLTRAlign" val="l"/>
+                            <dgm:param type="parTxRTLAlign" val="r"/>
+                          </dgm:alg>
+                        </dgm:if>
+                        <dgm:else name="Name58">
+                          <dgm:alg type="tx">
+                            <dgm:param type="txAnchorVert" val="t"/>
+                            <dgm:param type="parTxLTRAlign" val="l"/>
+                            <dgm:param type="parTxRTLAlign" val="l"/>
+                          </dgm:alg>
+                        </dgm:else>
+                      </dgm:choose>
+                    </dgm:if>
+                    <dgm:else name="Name59">
+                      <dgm:choose name="Name60">
+                        <dgm:if name="Name61" axis="root des" ptType="all node" func="maxDepth" op="gt" val="1">
+                          <dgm:alg type="tx">
+                            <dgm:param type="txAnchorVert" val="b"/>
+                            <dgm:param type="txAnchorVertCh" val="b"/>
+                            <dgm:param type="parTxLTRAlign" val="l"/>
+                            <dgm:param type="parTxRTLAlign" val="r"/>
+                          </dgm:alg>
+                        </dgm:if>
+                        <dgm:else name="Name62">
+                          <dgm:alg type="tx">
+                            <dgm:param type="txAnchorVert" val="b"/>
+                            <dgm:param type="parTxLTRAlign" val="r"/>
+                            <dgm:param type="parTxRTLAlign" val="r"/>
+                          </dgm:alg>
+                        </dgm:else>
+                      </dgm:choose>
+                    </dgm:else>
+                  </dgm:choose>
+                  <dgm:shape xmlns:r="http://schemas.openxmlformats.org/officeDocument/2006/relationships" type="rect" r:blip="">
+                    <dgm:adjLst/>
+                  </dgm:shape>
+                  <dgm:presOf axis="desOrSelf" ptType="node"/>
+                  <dgm:choose name="Name63">
+                    <dgm:if name="Name64" func="var" arg="dir" op="equ" val="norm">
+                      <dgm:constrLst>
+                        <dgm:constr type="rMarg"/>
+                        <dgm:constr type="tMarg"/>
+                        <dgm:constr type="bMarg"/>
+                      </dgm:constrLst>
+                    </dgm:if>
+                    <dgm:else name="Name65">
+                      <dgm:constrLst>
+                        <dgm:constr type="lMarg"/>
+                        <dgm:constr type="tMarg"/>
+                        <dgm:constr type="bMarg"/>
+                      </dgm:constrLst>
+                    </dgm:else>
+                  </dgm:choose>
+                  <dgm:ruleLst>
+                    <dgm:rule type="primFontSz" val="5" fact="NaN" max="NaN"/>
+                  </dgm:ruleLst>
+                </dgm:layoutNode>
+              </dgm:forEach>
+              <dgm:forEach name="Name66" axis="ch" ptType="node" st="3" cnt="1">
+                <dgm:layoutNode name="bullet3c" styleLbl="node1">
+                  <dgm:alg type="sp"/>
+                  <dgm:shape xmlns:r="http://schemas.openxmlformats.org/officeDocument/2006/relationships" type="ellipse" r:blip="">
+                    <dgm:adjLst/>
+                  </dgm:shape>
+                  <dgm:presOf/>
+                  <dgm:constrLst/>
+                  <dgm:ruleLst/>
+                </dgm:layoutNode>
+                <dgm:layoutNode name="textBox3c" styleLbl="revTx">
+                  <dgm:varLst>
+                    <dgm:bulletEnabled val="1"/>
+                  </dgm:varLst>
+                  <dgm:choose name="Name67">
+                    <dgm:if name="Name68" func="var" arg="dir" op="equ" val="norm">
+                      <dgm:choose name="Name69">
+                        <dgm:if name="Name70" axis="root des" ptType="all node" func="maxDepth" op="gt" val="1">
+                          <dgm:alg type="tx">
+                            <dgm:param type="txAnchorVert" val="t"/>
+                            <dgm:param type="parTxLTRAlign" val="l"/>
+                            <dgm:param type="parTxRTLAlign" val="r"/>
+                          </dgm:alg>
+                        </dgm:if>
+                        <dgm:else name="Name71">
+                          <dgm:alg type="tx">
+                            <dgm:param type="txAnchorVert" val="t"/>
+                            <dgm:param type="parTxLTRAlign" val="l"/>
+                            <dgm:param type="parTxRTLAlign" val="l"/>
+                          </dgm:alg>
+                        </dgm:else>
+                      </dgm:choose>
+                    </dgm:if>
+                    <dgm:else name="Name72">
+                      <dgm:choose name="Name73">
+                        <dgm:if name="Name74" axis="root des" ptType="all node" func="maxDepth" op="gt" val="1">
+                          <dgm:alg type="tx">
+                            <dgm:param type="txAnchorVert" val="b"/>
+                            <dgm:param type="txAnchorVertCh" val="b"/>
+                            <dgm:param type="parTxLTRAlign" val="l"/>
+                            <dgm:param type="parTxRTLAlign" val="r"/>
+                          </dgm:alg>
+                        </dgm:if>
+                        <dgm:else name="Name75">
+                          <dgm:alg type="tx">
+                            <dgm:param type="txAnchorVert" val="b"/>
+                            <dgm:param type="parTxLTRAlign" val="r"/>
+                            <dgm:param type="parTxRTLAlign" val="r"/>
+                          </dgm:alg>
+                        </dgm:else>
+                      </dgm:choose>
+                    </dgm:else>
+                  </dgm:choose>
+                  <dgm:shape xmlns:r="http://schemas.openxmlformats.org/officeDocument/2006/relationships" type="rect" r:blip="">
+                    <dgm:adjLst/>
+                  </dgm:shape>
+                  <dgm:presOf axis="desOrSelf" ptType="node"/>
+                  <dgm:choose name="Name76">
+                    <dgm:if name="Name77" func="var" arg="dir" op="equ" val="norm">
+                      <dgm:constrLst>
+                        <dgm:constr type="rMarg"/>
+                        <dgm:constr type="tMarg"/>
+                        <dgm:constr type="bMarg"/>
+                      </dgm:constrLst>
+                    </dgm:if>
+                    <dgm:else name="Name78">
+                      <dgm:constrLst>
+                        <dgm:constr type="lMarg"/>
+                        <dgm:constr type="tMarg"/>
+                        <dgm:constr type="bMarg"/>
+                      </dgm:constrLst>
+                    </dgm:else>
+                  </dgm:choose>
+                  <dgm:ruleLst>
+                    <dgm:rule type="primFontSz" val="5" fact="NaN" max="NaN"/>
+                  </dgm:ruleLst>
+                </dgm:layoutNode>
+              </dgm:forEach>
+            </dgm:layoutNode>
+          </dgm:if>
+          <dgm:if name="Name79" axis="ch" ptType="node" func="cnt" op="equ" val="4">
+            <dgm:layoutNode name="arrowDiagram4">
+              <dgm:alg type="composite">
+                <dgm:param type="vertAlign" val="none"/>
+                <dgm:param type="horzAlign" val="none"/>
+              </dgm:alg>
+              <dgm:shape xmlns:r="http://schemas.openxmlformats.org/officeDocument/2006/relationships" r:blip="">
+                <dgm:adjLst/>
+              </dgm:shape>
+              <dgm:presOf/>
+              <dgm:choose name="Name80">
+                <dgm:if name="Name81" func="var" arg="dir" op="equ" val="norm">
+                  <dgm:constrLst>
+                    <dgm:constr type="ctrX" for="ch" forName="bullet4a" refType="w" fact="0.11"/>
+                    <dgm:constr type="ctrY" for="ch" forName="bullet4a" refType="h" fact="0.762"/>
+                    <dgm:constr type="w" for="ch" forName="bullet4a" refType="w" fact="0.023"/>
+                    <dgm:constr type="h" for="ch" forName="bullet4a" refType="w" refFor="ch" refForName="bullet4a"/>
+                    <dgm:constr type="l" for="ch" forName="textBox4a" refType="ctrX" refFor="ch" refForName="bullet4a"/>
+                    <dgm:constr type="t" for="ch" forName="textBox4a" refType="ctrY" refFor="ch" refForName="bullet4a"/>
+                    <dgm:constr type="w" for="ch" forName="textBox4a" refType="w" fact="0.171"/>
+                    <dgm:constr type="h" for="ch" forName="textBox4a" refType="h" fact="0.238"/>
+                    <dgm:constr type="userA" refType="h" refFor="ch" refForName="bullet4a" fact="0.53"/>
+                    <dgm:constr type="lMarg" for="ch" forName="textBox4a" refType="userA" fact="2.834"/>
+                    <dgm:constr type="ctrX" for="ch" forName="bullet4b" refType="w" fact="0.281"/>
+                    <dgm:constr type="ctrY" for="ch" forName="bullet4b" refType="h" fact="0.543"/>
+                    <dgm:constr type="w" for="ch" forName="bullet4b" refType="w" fact="0.04"/>
+                    <dgm:constr type="h" for="ch" forName="bullet4b" refType="w" refFor="ch" refForName="bullet4b"/>
+                    <dgm:constr type="l" for="ch" forName="textBox4b" refType="ctrX" refFor="ch" refForName="bullet4b"/>
+                    <dgm:constr type="t" for="ch" forName="textBox4b" refType="ctrY" refFor="ch" refForName="bullet4b"/>
+                    <dgm:constr type="w" for="ch" forName="textBox4b" refType="w" fact="0.21"/>
+                    <dgm:constr type="h" for="ch" forName="textBox4b" refType="h" fact="0.457"/>
+                    <dgm:constr type="userB" refType="h" refFor="ch" refForName="bullet4b" fact="0.53"/>
+                    <dgm:constr type="lMarg" for="ch" forName="textBox4b" refType="userB" fact="2.834"/>
+                    <dgm:constr type="ctrX" for="ch" forName="bullet4c" refType="w" fact="0.495"/>
+                    <dgm:constr type="ctrY" for="ch" forName="bullet4c" refType="h" fact="0.382"/>
+                    <dgm:constr type="w" for="ch" forName="bullet4c" refType="w" fact="0.053"/>
+                    <dgm:constr type="h" for="ch" forName="bullet4c" refType="w" refFor="ch" refForName="bullet4c"/>
+                    <dgm:constr type="l" for="ch" forName="textBox4c" refType="ctrX" refFor="ch" refForName="bullet4c"/>
+                    <dgm:constr type="t" for="ch" forName="textBox4c" refType="ctrY" refFor="ch" refForName="bullet4c"/>
+                    <dgm:constr type="w" for="ch" forName="textBox4c" refType="w" fact="0.21"/>
+                    <dgm:constr type="h" for="ch" forName="textBox4c" refType="h" fact="0.618"/>
+                    <dgm:constr type="userC" refType="h" refFor="ch" refForName="bullet4c" fact="0.53"/>
+                    <dgm:constr type="lMarg" for="ch" forName="textBox4c" refType="userC" fact="2.834"/>
+                    <dgm:constr type="ctrX" for="ch" forName="bullet4d" refType="w" fact="0.73"/>
+                    <dgm:constr type="ctrY" for="ch" forName="bullet4d" refType="h" fact="0.283"/>
+                    <dgm:constr type="w" for="ch" forName="bullet4d" refType="w" fact="0.071"/>
+                    <dgm:constr type="h" for="ch" forName="bullet4d" refType="w" refFor="ch" refForName="bullet4d"/>
+                    <dgm:constr type="l" for="ch" forName="textBox4d" refType="ctrX" refFor="ch" refForName="bullet4d"/>
+                    <dgm:constr type="t" for="ch" forName="textBox4d" refType="ctrY" refFor="ch" refForName="bullet4d"/>
+                    <dgm:constr type="w" for="ch" forName="textBox4d" refType="w" fact="0.21"/>
+                    <dgm:constr type="h" for="ch" forName="textBox4d" refType="h" fact="0.717"/>
+                    <dgm:constr type="userD" refType="h" refFor="ch" refForName="bullet4d" fact="0.53"/>
+                    <dgm:constr type="lMarg" for="ch" forName="textBox4d" refType="userD" fact="2.834"/>
+                    <dgm:constr type="primFontSz" for="ch" ptType="node" op="equ" val="65"/>
+                  </dgm:constrLst>
+                </dgm:if>
+                <dgm:else name="Name82">
+                  <dgm:constrLst>
+                    <dgm:constr type="ctrX" for="ch" forName="bullet4a" refType="w" fact="0.11"/>
+                    <dgm:constr type="ctrY" for="ch" forName="bullet4a" refType="h" fact="0.762"/>
+                    <dgm:constr type="w" for="ch" forName="bullet4a" refType="w" fact="0.023"/>
+                    <dgm:constr type="h" for="ch" forName="bullet4a" refType="w" refFor="ch" refForName="bullet4a"/>
+                    <dgm:constr type="r" for="ch" forName="textBox4a" refType="ctrX" refFor="ch" refForName="bullet4a"/>
+                    <dgm:constr type="b" for="ch" forName="textBox4a" refType="ctrY" refFor="ch" refForName="bullet4a"/>
+                    <dgm:constr type="w" for="ch" forName="textBox4a" refType="w" fact="0.11"/>
+                    <dgm:constr type="h" for="ch" forName="textBox4a" refType="h" fact="0.762"/>
+                    <dgm:constr type="userA" refType="h" refFor="ch" refForName="bullet4a" fact="0.53"/>
+                    <dgm:constr type="rMarg" for="ch" forName="textBox4a" refType="userA" fact="2.834"/>
+                    <dgm:constr type="ctrX" for="ch" forName="bullet4b" refType="w" fact="0.281"/>
+                    <dgm:constr type="ctrY" for="ch" forName="bullet4b" refType="h" fact="0.543"/>
+                    <dgm:constr type="w" for="ch" forName="bullet4b" refType="w" fact="0.04"/>
+                    <dgm:constr type="h" for="ch" forName="bullet4b" refType="w" refFor="ch" refForName="bullet4b"/>
+                    <dgm:constr type="r" for="ch" forName="textBox4b" refType="ctrX" refFor="ch" refForName="bullet4b"/>
+                    <dgm:constr type="b" for="ch" forName="textBox4b" refType="ctrY" refFor="ch" refForName="bullet4b"/>
+                    <dgm:constr type="w" for="ch" forName="textBox4b" refType="w" fact="0.171"/>
+                    <dgm:constr type="h" for="ch" forName="textBox4b" refType="h" fact="0.543"/>
+                    <dgm:constr type="userB" refType="h" refFor="ch" refForName="bullet4b" fact="0.53"/>
+                    <dgm:constr type="rMarg" for="ch" forName="textBox4b" refType="userB" fact="2.834"/>
+                    <dgm:constr type="ctrX" for="ch" forName="bullet4c" refType="w" fact="0.495"/>
+                    <dgm:constr type="ctrY" for="ch" forName="bullet4c" refType="h" fact="0.382"/>
+                    <dgm:constr type="w" for="ch" forName="bullet4c" refType="w" fact="0.053"/>
+                    <dgm:constr type="h" for="ch" forName="bullet4c" refType="w" refFor="ch" refForName="bullet4c"/>
+                    <dgm:constr type="r" for="ch" forName="textBox4c" refType="ctrX" refFor="ch" refForName="bullet4c"/>
+                    <dgm:constr type="b" for="ch" forName="textBox4c" refType="ctrY" refFor="ch" refForName="bullet4c"/>
+                    <dgm:constr type="w" for="ch" forName="textBox4c" refType="w" fact="0.21"/>
+                    <dgm:constr type="h" for="ch" forName="textBox4c" refType="h" fact="0.382"/>
+                    <dgm:constr type="userC" refType="h" refFor="ch" refForName="bullet4c" fact="0.53"/>
+                    <dgm:constr type="rMarg" for="ch" forName="textBox4c" refType="userC" fact="2.834"/>
+                    <dgm:constr type="ctrX" for="ch" forName="bullet4d" refType="w" fact="0.73"/>
+                    <dgm:constr type="ctrY" for="ch" forName="bullet4d" refType="h" fact="0.283"/>
+                    <dgm:constr type="w" for="ch" forName="bullet4d" refType="w" fact="0.071"/>
+                    <dgm:constr type="h" for="ch" forName="bullet4d" refType="w" refFor="ch" refForName="bullet4d"/>
+                    <dgm:constr type="r" for="ch" forName="textBox4d" refType="ctrX" refFor="ch" refForName="bullet4d"/>
+                    <dgm:constr type="b" for="ch" forName="textBox4d" refType="ctrY" refFor="ch" refForName="bullet4d"/>
+                    <dgm:constr type="w" for="ch" forName="textBox4d" refType="w" fact="0.21"/>
+                    <dgm:constr type="h" for="ch" forName="textBox4d" refType="h" fact="0.283"/>
+                    <dgm:constr type="userD" refType="h" refFor="ch" refForName="bullet4d" fact="0.53"/>
+                    <dgm:constr type="rMarg" for="ch" forName="textBox4d" refType="userD" fact="2.834"/>
+                    <dgm:constr type="primFontSz" for="ch" ptType="node" op="equ" val="65"/>
+                  </dgm:constrLst>
+                </dgm:else>
+              </dgm:choose>
+              <dgm:ruleLst/>
+              <dgm:forEach name="Name83" axis="ch" ptType="node" cnt="1">
+                <dgm:layoutNode name="bullet4a" styleLbl="node1">
+                  <dgm:alg type="sp"/>
+                  <dgm:shape xmlns:r="http://schemas.openxmlformats.org/officeDocument/2006/relationships" type="ellipse" r:blip="">
+                    <dgm:adjLst/>
+                  </dgm:shape>
+                  <dgm:presOf/>
+                  <dgm:constrLst/>
+                  <dgm:ruleLst/>
+                </dgm:layoutNode>
+                <dgm:layoutNode name="textBox4a" styleLbl="revTx">
+                  <dgm:varLst>
+                    <dgm:bulletEnabled val="1"/>
+                  </dgm:varLst>
+                  <dgm:choose name="Name84">
+                    <dgm:if name="Name85" func="var" arg="dir" op="equ" val="norm">
+                      <dgm:choose name="Name86">
+                        <dgm:if name="Name87" axis="root des" ptType="all node" func="maxDepth" op="gt" val="1">
+                          <dgm:alg type="tx">
+                            <dgm:param type="txAnchorVert" val="t"/>
+                            <dgm:param type="parTxLTRAlign" val="l"/>
+                            <dgm:param type="parTxRTLAlign" val="r"/>
+                          </dgm:alg>
+                        </dgm:if>
+                        <dgm:else name="Name88">
+                          <dgm:alg type="tx">
+                            <dgm:param type="txAnchorVert" val="t"/>
+                            <dgm:param type="parTxLTRAlign" val="l"/>
+                            <dgm:param type="parTxRTLAlign" val="l"/>
+                          </dgm:alg>
+                        </dgm:else>
+                      </dgm:choose>
+                    </dgm:if>
+                    <dgm:else name="Name89">
+                      <dgm:choose name="Name90">
+                        <dgm:if name="Name91" axis="root des" ptType="all node" func="maxDepth" op="gt" val="1">
+                          <dgm:alg type="tx">
+                            <dgm:param type="txAnchorVert" val="b"/>
+                            <dgm:param type="txAnchorVertCh" val="b"/>
+                            <dgm:param type="parTxLTRAlign" val="l"/>
+                            <dgm:param type="parTxRTLAlign" val="r"/>
+                          </dgm:alg>
+                        </dgm:if>
+                        <dgm:else name="Name92">
+                          <dgm:alg type="tx">
+                            <dgm:param type="txAnchorVert" val="b"/>
+                            <dgm:param type="parTxLTRAlign" val="r"/>
+                            <dgm:param type="parTxRTLAlign" val="r"/>
+                          </dgm:alg>
+                        </dgm:else>
+                      </dgm:choose>
+                    </dgm:else>
+                  </dgm:choose>
+                  <dgm:shape xmlns:r="http://schemas.openxmlformats.org/officeDocument/2006/relationships" type="rect" r:blip="">
+                    <dgm:adjLst/>
+                  </dgm:shape>
+                  <dgm:presOf axis="desOrSelf" ptType="node"/>
+                  <dgm:choose name="Name93">
+                    <dgm:if name="Name94" func="var" arg="dir" op="equ" val="norm">
+                      <dgm:constrLst>
+                        <dgm:constr type="rMarg"/>
+                        <dgm:constr type="tMarg"/>
+                        <dgm:constr type="bMarg"/>
+                      </dgm:constrLst>
+                    </dgm:if>
+                    <dgm:else name="Name95">
+                      <dgm:constrLst>
+                        <dgm:constr type="lMarg"/>
+                        <dgm:constr type="tMarg"/>
+                        <dgm:constr type="bMarg"/>
+                      </dgm:constrLst>
+                    </dgm:else>
+                  </dgm:choose>
+                  <dgm:ruleLst>
+                    <dgm:rule type="primFontSz" val="5" fact="NaN" max="NaN"/>
+                  </dgm:ruleLst>
+                </dgm:layoutNode>
+              </dgm:forEach>
+              <dgm:forEach name="Name96" axis="ch" ptType="node" st="2" cnt="1">
+                <dgm:layoutNode name="bullet4b" styleLbl="node1">
+                  <dgm:alg type="sp"/>
+                  <dgm:shape xmlns:r="http://schemas.openxmlformats.org/officeDocument/2006/relationships" type="ellipse" r:blip="">
+                    <dgm:adjLst/>
+                  </dgm:shape>
+                  <dgm:presOf/>
+                  <dgm:constrLst/>
+                  <dgm:ruleLst/>
+                </dgm:layoutNode>
+                <dgm:layoutNode name="textBox4b" styleLbl="revTx">
+                  <dgm:varLst>
+                    <dgm:bulletEnabled val="1"/>
+                  </dgm:varLst>
+                  <dgm:choose name="Name97">
+                    <dgm:if name="Name98" func="var" arg="dir" op="equ" val="norm">
+                      <dgm:choose name="Name99">
+                        <dgm:if name="Name100" axis="root des" ptType="all node" func="maxDepth" op="gt" val="1">
+                          <dgm:alg type="tx">
+                            <dgm:param type="txAnchorVert" val="t"/>
+                            <dgm:param type="parTxLTRAlign" val="l"/>
+                            <dgm:param type="parTxRTLAlign" val="r"/>
+                          </dgm:alg>
+                        </dgm:if>
+                        <dgm:else name="Name101">
+                          <dgm:alg type="tx">
+                            <dgm:param type="txAnchorVert" val="t"/>
+                            <dgm:param type="parTxLTRAlign" val="l"/>
+                            <dgm:param type="parTxRTLAlign" val="l"/>
+                          </dgm:alg>
+                        </dgm:else>
+                      </dgm:choose>
+                    </dgm:if>
+                    <dgm:else name="Name102">
+                      <dgm:choose name="Name103">
+                        <dgm:if name="Name104" axis="root des" ptType="all node" func="maxDepth" op="gt" val="1">
+                          <dgm:alg type="tx">
+                            <dgm:param type="txAnchorVert" val="b"/>
+                            <dgm:param type="txAnchorVertCh" val="b"/>
+                            <dgm:param type="parTxLTRAlign" val="l"/>
+                            <dgm:param type="parTxRTLAlign" val="r"/>
+                          </dgm:alg>
+                        </dgm:if>
+                        <dgm:else name="Name105">
+                          <dgm:alg type="tx">
+                            <dgm:param type="txAnchorVert" val="b"/>
+                            <dgm:param type="parTxLTRAlign" val="r"/>
+                            <dgm:param type="parTxRTLAlign" val="r"/>
+                          </dgm:alg>
+                        </dgm:else>
+                      </dgm:choose>
+                    </dgm:else>
+                  </dgm:choose>
+                  <dgm:shape xmlns:r="http://schemas.openxmlformats.org/officeDocument/2006/relationships" type="rect" r:blip="">
+                    <dgm:adjLst/>
+                  </dgm:shape>
+                  <dgm:presOf axis="desOrSelf" ptType="node"/>
+                  <dgm:choose name="Name106">
+                    <dgm:if name="Name107" func="var" arg="dir" op="equ" val="norm">
+                      <dgm:constrLst>
+                        <dgm:constr type="rMarg"/>
+                        <dgm:constr type="tMarg"/>
+                        <dgm:constr type="bMarg"/>
+                      </dgm:constrLst>
+                    </dgm:if>
+                    <dgm:else name="Name108">
+                      <dgm:constrLst>
+                        <dgm:constr type="lMarg"/>
+                        <dgm:constr type="tMarg"/>
+                        <dgm:constr type="bMarg"/>
+                      </dgm:constrLst>
+                    </dgm:else>
+                  </dgm:choose>
+                  <dgm:ruleLst>
+                    <dgm:rule type="primFontSz" val="5" fact="NaN" max="NaN"/>
+                  </dgm:ruleLst>
+                </dgm:layoutNode>
+              </dgm:forEach>
+              <dgm:forEach name="Name109" axis="ch" ptType="node" st="3" cnt="1">
+                <dgm:layoutNode name="bullet4c" styleLbl="node1">
+                  <dgm:alg type="sp"/>
+                  <dgm:shape xmlns:r="http://schemas.openxmlformats.org/officeDocument/2006/relationships" type="ellipse" r:blip="">
+                    <dgm:adjLst/>
+                  </dgm:shape>
+                  <dgm:presOf/>
+                  <dgm:constrLst/>
+                  <dgm:ruleLst/>
+                </dgm:layoutNode>
+                <dgm:layoutNode name="textBox4c" styleLbl="revTx">
+                  <dgm:varLst>
+                    <dgm:bulletEnabled val="1"/>
+                  </dgm:varLst>
+                  <dgm:choose name="Name110">
+                    <dgm:if name="Name111" func="var" arg="dir" op="equ" val="norm">
+                      <dgm:choose name="Name112">
+                        <dgm:if name="Name113" axis="root des" ptType="all node" func="maxDepth" op="gt" val="1">
+                          <dgm:alg type="tx">
+                            <dgm:param type="txAnchorVert" val="t"/>
+                            <dgm:param type="parTxLTRAlign" val="l"/>
+                            <dgm:param type="parTxRTLAlign" val="r"/>
+                          </dgm:alg>
+                        </dgm:if>
+                        <dgm:else name="Name114">
+                          <dgm:alg type="tx">
+                            <dgm:param type="txAnchorVert" val="t"/>
+                            <dgm:param type="parTxLTRAlign" val="l"/>
+                            <dgm:param type="parTxRTLAlign" val="l"/>
+                          </dgm:alg>
+                        </dgm:else>
+                      </dgm:choose>
+                    </dgm:if>
+                    <dgm:else name="Name115">
+                      <dgm:choose name="Name116">
+                        <dgm:if name="Name117" axis="root des" ptType="all node" func="maxDepth" op="gt" val="1">
+                          <dgm:alg type="tx">
+                            <dgm:param type="txAnchorVert" val="b"/>
+                            <dgm:param type="txAnchorVertCh" val="b"/>
+                            <dgm:param type="parTxLTRAlign" val="l"/>
+                            <dgm:param type="parTxRTLAlign" val="r"/>
+                          </dgm:alg>
+                        </dgm:if>
+                        <dgm:else name="Name118">
+                          <dgm:alg type="tx">
+                            <dgm:param type="txAnchorVert" val="b"/>
+                            <dgm:param type="parTxLTRAlign" val="r"/>
+                            <dgm:param type="parTxRTLAlign" val="r"/>
+                          </dgm:alg>
+                        </dgm:else>
+                      </dgm:choose>
+                    </dgm:else>
+                  </dgm:choose>
+                  <dgm:shape xmlns:r="http://schemas.openxmlformats.org/officeDocument/2006/relationships" type="rect" r:blip="">
+                    <dgm:adjLst/>
+                  </dgm:shape>
+                  <dgm:presOf axis="desOrSelf" ptType="node"/>
+                  <dgm:choose name="Name119">
+                    <dgm:if name="Name120" func="var" arg="dir" op="equ" val="norm">
+                      <dgm:constrLst>
+                        <dgm:constr type="rMarg"/>
+                        <dgm:constr type="tMarg"/>
+                        <dgm:constr type="bMarg"/>
+                      </dgm:constrLst>
+                    </dgm:if>
+                    <dgm:else name="Name121">
+                      <dgm:constrLst>
+                        <dgm:constr type="lMarg"/>
+                        <dgm:constr type="tMarg"/>
+                        <dgm:constr type="bMarg"/>
+                      </dgm:constrLst>
+                    </dgm:else>
+                  </dgm:choose>
+                  <dgm:ruleLst>
+                    <dgm:rule type="primFontSz" val="5" fact="NaN" max="NaN"/>
+                  </dgm:ruleLst>
+                </dgm:layoutNode>
+              </dgm:forEach>
+              <dgm:forEach name="Name122" axis="ch" ptType="node" st="4" cnt="1">
+                <dgm:layoutNode name="bullet4d" styleLbl="node1">
+                  <dgm:alg type="sp"/>
+                  <dgm:shape xmlns:r="http://schemas.openxmlformats.org/officeDocument/2006/relationships" type="ellipse" r:blip="">
+                    <dgm:adjLst/>
+                  </dgm:shape>
+                  <dgm:presOf/>
+                  <dgm:constrLst/>
+                  <dgm:ruleLst/>
+                </dgm:layoutNode>
+                <dgm:layoutNode name="textBox4d" styleLbl="revTx">
+                  <dgm:varLst>
+                    <dgm:bulletEnabled val="1"/>
+                  </dgm:varLst>
+                  <dgm:choose name="Name123">
+                    <dgm:if name="Name124" func="var" arg="dir" op="equ" val="norm">
+                      <dgm:choose name="Name125">
+                        <dgm:if name="Name126" axis="root des" ptType="all node" func="maxDepth" op="gt" val="1">
+                          <dgm:alg type="tx">
+                            <dgm:param type="txAnchorVert" val="t"/>
+                            <dgm:param type="parTxLTRAlign" val="l"/>
+                            <dgm:param type="parTxRTLAlign" val="r"/>
+                          </dgm:alg>
+                        </dgm:if>
+                        <dgm:else name="Name127">
+                          <dgm:alg type="tx">
+                            <dgm:param type="txAnchorVert" val="t"/>
+                            <dgm:param type="parTxLTRAlign" val="l"/>
+                            <dgm:param type="parTxRTLAlign" val="l"/>
+                          </dgm:alg>
+                        </dgm:else>
+                      </dgm:choose>
+                    </dgm:if>
+                    <dgm:else name="Name128">
+                      <dgm:choose name="Name129">
+                        <dgm:if name="Name130" axis="root des" ptType="all node" func="maxDepth" op="gt" val="1">
+                          <dgm:alg type="tx">
+                            <dgm:param type="txAnchorVert" val="b"/>
+                            <dgm:param type="txAnchorVertCh" val="b"/>
+                            <dgm:param type="parTxLTRAlign" val="l"/>
+                            <dgm:param type="parTxRTLAlign" val="r"/>
+                          </dgm:alg>
+                        </dgm:if>
+                        <dgm:else name="Name131">
+                          <dgm:alg type="tx">
+                            <dgm:param type="txAnchorVert" val="b"/>
+                            <dgm:param type="parTxLTRAlign" val="r"/>
+                            <dgm:param type="parTxRTLAlign" val="r"/>
+                          </dgm:alg>
+                        </dgm:else>
+                      </dgm:choose>
+                    </dgm:else>
+                  </dgm:choose>
+                  <dgm:shape xmlns:r="http://schemas.openxmlformats.org/officeDocument/2006/relationships" type="rect" r:blip="">
+                    <dgm:adjLst/>
+                  </dgm:shape>
+                  <dgm:presOf axis="desOrSelf" ptType="node"/>
+                  <dgm:choose name="Name132">
+                    <dgm:if name="Name133" func="var" arg="dir" op="equ" val="norm">
+                      <dgm:constrLst>
+                        <dgm:constr type="rMarg"/>
+                        <dgm:constr type="tMarg"/>
+                        <dgm:constr type="bMarg"/>
+                      </dgm:constrLst>
+                    </dgm:if>
+                    <dgm:else name="Name134">
+                      <dgm:constrLst>
+                        <dgm:constr type="lMarg"/>
+                        <dgm:constr type="tMarg"/>
+                        <dgm:constr type="bMarg"/>
+                      </dgm:constrLst>
+                    </dgm:else>
+                  </dgm:choose>
+                  <dgm:ruleLst>
+                    <dgm:rule type="primFontSz" val="5" fact="NaN" max="NaN"/>
+                  </dgm:ruleLst>
+                </dgm:layoutNode>
+              </dgm:forEach>
+            </dgm:layoutNode>
+          </dgm:if>
+          <dgm:else name="Name135">
+            <dgm:layoutNode name="arrowDiagram5">
+              <dgm:alg type="composite">
+                <dgm:param type="vertAlign" val="none"/>
+                <dgm:param type="horzAlign" val="none"/>
+              </dgm:alg>
+              <dgm:shape xmlns:r="http://schemas.openxmlformats.org/officeDocument/2006/relationships" r:blip="">
+                <dgm:adjLst/>
+              </dgm:shape>
+              <dgm:presOf/>
+              <dgm:choose name="Name136">
+                <dgm:if name="Name137" func="var" arg="dir" op="equ" val="norm">
+                  <dgm:constrLst>
+                    <dgm:constr type="ctrX" for="ch" forName="bullet5a" refType="w" fact="0.11"/>
+                    <dgm:constr type="ctrY" for="ch" forName="bullet5a" refType="h" fact="0.762"/>
+                    <dgm:constr type="w" for="ch" forName="bullet5a" refType="w" fact="0.023"/>
+                    <dgm:constr type="h" for="ch" forName="bullet5a" refType="w" refFor="ch" refForName="bullet5a"/>
+                    <dgm:constr type="l" for="ch" forName="textBox5a" refType="ctrX" refFor="ch" refForName="bullet5a"/>
+                    <dgm:constr type="t" for="ch" forName="textBox5a" refType="ctrY" refFor="ch" refForName="bullet5a"/>
+                    <dgm:constr type="w" for="ch" forName="textBox5a" refType="w" fact="0.131"/>
+                    <dgm:constr type="h" for="ch" forName="textBox5a" refType="h" fact="0.238"/>
+                    <dgm:constr type="userA" refType="h" refFor="ch" refForName="bullet5a" fact="0.53"/>
+                    <dgm:constr type="lMarg" for="ch" forName="textBox5a" refType="userA" fact="2.834"/>
+                    <dgm:constr type="ctrX" for="ch" forName="bullet5b" refType="w" fact="0.241"/>
+                    <dgm:constr type="ctrY" for="ch" forName="bullet5b" refType="h" fact="0.581"/>
+                    <dgm:constr type="w" for="ch" forName="bullet5b" refType="w" fact="0.036"/>
+                    <dgm:constr type="h" for="ch" forName="bullet5b" refType="w" refFor="ch" refForName="bullet5b"/>
+                    <dgm:constr type="l" for="ch" forName="textBox5b" refType="ctrX" refFor="ch" refForName="bullet5b"/>
+                    <dgm:constr type="t" for="ch" forName="textBox5b" refType="ctrY" refFor="ch" refForName="bullet5b"/>
+                    <dgm:constr type="w" for="ch" forName="textBox5b" refType="w" fact="0.166"/>
+                    <dgm:constr type="h" for="ch" forName="textBox5b" refType="h" fact="0.419"/>
+                    <dgm:constr type="userB" refType="h" refFor="ch" refForName="bullet5b" fact="0.53"/>
+                    <dgm:constr type="lMarg" for="ch" forName="textBox5b" refType="userB" fact="2.834"/>
+                    <dgm:constr type="ctrX" for="ch" forName="bullet5c" refType="w" fact="0.407"/>
+                    <dgm:constr type="ctrY" for="ch" forName="bullet5c" refType="h" fact="0.438"/>
+                    <dgm:constr type="w" for="ch" forName="bullet5c" refType="w" fact="0.048"/>
+                    <dgm:constr type="h" for="ch" forName="bullet5c" refType="w" refFor="ch" refForName="bullet5c"/>
+                    <dgm:constr type="l" for="ch" forName="textBox5c" refType="ctrX" refFor="ch" refForName="bullet5c"/>
+                    <dgm:constr type="t" for="ch" forName="textBox5c" refType="ctrY" refFor="ch" refForName="bullet5c"/>
+                    <dgm:constr type="w" for="ch" forName="textBox5c" refType="w" fact="0.193"/>
+                    <dgm:constr type="h" for="ch" forName="textBox5c" refType="h" fact="0.562"/>
+                    <dgm:constr type="userC" refType="h" refFor="ch" refForName="bullet5c" fact="0.53"/>
+                    <dgm:constr type="lMarg" for="ch" forName="textBox5c" refType="userC" fact="2.834"/>
+                    <dgm:constr type="ctrX" for="ch" forName="bullet5d" refType="w" fact="0.6"/>
+                    <dgm:constr type="ctrY" for="ch" forName="bullet5d" refType="h" fact="0.33"/>
+                    <dgm:constr type="w" for="ch" forName="bullet5d" refType="w" fact="0.062"/>
+                    <dgm:constr type="h" for="ch" forName="bullet5d" refType="w" refFor="ch" refForName="bullet5d"/>
+                    <dgm:constr type="l" for="ch" forName="textBox5d" refType="ctrX" refFor="ch" refForName="bullet5d"/>
+                    <dgm:constr type="t" for="ch" forName="textBox5d" refType="ctrY" refFor="ch" refForName="bullet5d"/>
+                    <dgm:constr type="w" for="ch" forName="textBox5d" refType="w" fact="0.2"/>
+                    <dgm:constr type="h" for="ch" forName="textBox5d" refType="h" fact="0.67"/>
+                    <dgm:constr type="userD" refType="h" refFor="ch" refForName="bullet5d" fact="0.53"/>
+                    <dgm:constr type="lMarg" for="ch" forName="textBox5d" refType="userD" fact="2.834"/>
+                    <dgm:constr type="ctrX" for="ch" forName="bullet5e" refType="w" fact="0.8"/>
+                    <dgm:constr type="ctrY" for="ch" forName="bullet5e" refType="h" fact="0.264"/>
+                    <dgm:constr type="w" for="ch" forName="bullet5e" refType="w" fact="0.079"/>
+                    <dgm:constr type="h" for="ch" forName="bullet5e" refType="w" refFor="ch" refForName="bullet5e"/>
+                    <dgm:constr type="l" for="ch" forName="textBox5e" refType="ctrX" refFor="ch" refForName="bullet5e"/>
+                    <dgm:constr type="t" for="ch" forName="textBox5e" refType="ctrY" refFor="ch" refForName="bullet5e"/>
+                    <dgm:constr type="w" for="ch" forName="textBox5e" refType="w" fact="0.2"/>
+                    <dgm:constr type="h" for="ch" forName="textBox5e" refType="h" fact="0.736"/>
+                    <dgm:constr type="userE" refType="h" refFor="ch" refForName="bullet5e" fact="0.53"/>
+                    <dgm:constr type="lMarg" for="ch" forName="textBox5e" refType="userE" fact="2.834"/>
+                    <dgm:constr type="primFontSz" for="ch" ptType="node" op="equ" val="65"/>
+                  </dgm:constrLst>
+                </dgm:if>
+                <dgm:else name="Name138">
+                  <dgm:constrLst>
+                    <dgm:constr type="ctrX" for="ch" forName="bullet5a" refType="w" fact="0.11"/>
+                    <dgm:constr type="ctrY" for="ch" forName="bullet5a" refType="h" fact="0.762"/>
+                    <dgm:constr type="w" for="ch" forName="bullet5a" refType="w" fact="0.023"/>
+                    <dgm:constr type="h" for="ch" forName="bullet5a" refType="w" refFor="ch" refForName="bullet5a"/>
+                    <dgm:constr type="r" for="ch" forName="textBox5a" refType="ctrX" refFor="ch" refForName="bullet5a"/>
+                    <dgm:constr type="b" for="ch" forName="textBox5a" refType="ctrY" refFor="ch" refForName="bullet5a"/>
+                    <dgm:constr type="w" for="ch" forName="textBox5a" refType="w" fact="0.11"/>
+                    <dgm:constr type="h" for="ch" forName="textBox5a" refType="h" fact="0.762"/>
+                    <dgm:constr type="userA" refType="h" refFor="ch" refForName="bullet5a" fact="0.53"/>
+                    <dgm:constr type="rMarg" for="ch" forName="textBox5a" refType="userA" fact="2.834"/>
+                    <dgm:constr type="ctrX" for="ch" forName="bullet5b" refType="w" fact="0.241"/>
+                    <dgm:constr type="ctrY" for="ch" forName="bullet5b" refType="h" fact="0.581"/>
+                    <dgm:constr type="w" for="ch" forName="bullet5b" refType="w" fact="0.036"/>
+                    <dgm:constr type="h" for="ch" forName="bullet5b" refType="w" refFor="ch" refForName="bullet5b"/>
+                    <dgm:constr type="r" for="ch" forName="textBox5b" refType="ctrX" refFor="ch" refForName="bullet5b"/>
+                    <dgm:constr type="b" for="ch" forName="textBox5b" refType="ctrY" refFor="ch" refForName="bullet5b"/>
+                    <dgm:constr type="w" for="ch" forName="textBox5b" refType="w" fact="0.131"/>
+                    <dgm:constr type="h" for="ch" forName="textBox5b" refType="h" fact="0.581"/>
+                    <dgm:constr type="userB" refType="h" refFor="ch" refForName="bullet5b" fact="0.53"/>
+                    <dgm:constr type="rMarg" for="ch" forName="textBox5b" refType="userB" fact="2.834"/>
+                    <dgm:constr type="ctrX" for="ch" forName="bullet5c" refType="w" fact="0.407"/>
+                    <dgm:constr type="ctrY" for="ch" forName="bullet5c" refType="h" fact="0.438"/>
+                    <dgm:constr type="w" for="ch" forName="bullet5c" refType="w" fact="0.048"/>
+                    <dgm:constr type="h" for="ch" forName="bullet5c" refType="w" refFor="ch" refForName="bullet5c"/>
+                    <dgm:constr type="r" for="ch" forName="textBox5c" refType="ctrX" refFor="ch" refForName="bullet5c"/>
+                    <dgm:constr type="b" for="ch" forName="textBox5c" refType="ctrY" refFor="ch" refForName="bullet5c"/>
+                    <dgm:constr type="w" for="ch" forName="textBox5c" refType="w" fact="0.166"/>
+                    <dgm:constr type="h" for="ch" forName="textBox5c" refType="h" fact="0.438"/>
+                    <dgm:constr type="userC" refType="h" refFor="ch" refForName="bullet5c" fact="0.53"/>
+                    <dgm:constr type="rMarg" for="ch" forName="textBox5c" refType="userC" fact="2.834"/>
+                    <dgm:constr type="ctrX" for="ch" forName="bullet5d" refType="w" fact="0.6"/>
+                    <dgm:constr type="ctrY" for="ch" forName="bullet5d" refType="h" fact="0.33"/>
+                    <dgm:constr type="w" for="ch" forName="bullet5d" refType="w" fact="0.062"/>
+                    <dgm:constr type="h" for="ch" forName="bullet5d" refType="w" refFor="ch" refForName="bullet5d"/>
+                    <dgm:constr type="r" for="ch" forName="textBox5d" refType="ctrX" refFor="ch" refForName="bullet5d"/>
+                    <dgm:constr type="b" for="ch" forName="textBox5d" refType="ctrY" refFor="ch" refForName="bullet5d"/>
+                    <dgm:constr type="w" for="ch" forName="textBox5d" refType="w" fact="0.193"/>
+                    <dgm:constr type="h" for="ch" forName="textBox5d" refType="h" fact="0.33"/>
+                    <dgm:constr type="userD" refType="h" refFor="ch" refForName="bullet5d" fact="0.53"/>
+                    <dgm:constr type="rMarg" for="ch" forName="textBox5d" refType="userD" fact="2.834"/>
+                    <dgm:constr type="ctrX" for="ch" forName="bullet5e" refType="w" fact="0.8"/>
+                    <dgm:constr type="ctrY" for="ch" forName="bullet5e" refType="h" fact="0.264"/>
+                    <dgm:constr type="w" for="ch" forName="bullet5e" refType="w" fact="0.079"/>
+                    <dgm:constr type="h" for="ch" forName="bullet5e" refType="w" refFor="ch" refForName="bullet5e"/>
+                    <dgm:constr type="r" for="ch" forName="textBox5e" refType="ctrX" refFor="ch" refForName="bullet5e"/>
+                    <dgm:constr type="b" for="ch" forName="textBox5e" refType="ctrY" refFor="ch" refForName="bullet5e"/>
+                    <dgm:constr type="w" for="ch" forName="textBox5e" refType="w" fact="0.2"/>
+                    <dgm:constr type="h" for="ch" forName="textBox5e" refType="h" fact="0.264"/>
+                    <dgm:constr type="userE" refType="h" refFor="ch" refForName="bullet5e" fact="0.53"/>
+                    <dgm:constr type="rMarg" for="ch" forName="textBox5e" refType="userE" fact="2.834"/>
+                    <dgm:constr type="primFontSz" for="ch" ptType="node" op="equ" val="65"/>
+                  </dgm:constrLst>
+                </dgm:else>
+              </dgm:choose>
+              <dgm:ruleLst/>
+              <dgm:forEach name="Name139" axis="ch" ptType="node" cnt="1">
+                <dgm:layoutNode name="bullet5a" styleLbl="node1">
+                  <dgm:alg type="sp"/>
+                  <dgm:shape xmlns:r="http://schemas.openxmlformats.org/officeDocument/2006/relationships" type="ellipse" r:blip="">
+                    <dgm:adjLst/>
+                  </dgm:shape>
+                  <dgm:presOf/>
+                  <dgm:constrLst/>
+                  <dgm:ruleLst/>
+                </dgm:layoutNode>
+                <dgm:layoutNode name="textBox5a" styleLbl="revTx">
+                  <dgm:varLst>
+                    <dgm:bulletEnabled val="1"/>
+                  </dgm:varLst>
+                  <dgm:choose name="Name140">
+                    <dgm:if name="Name141" func="var" arg="dir" op="equ" val="norm">
+                      <dgm:choose name="Name142">
+                        <dgm:if name="Name143" axis="root des" ptType="all node" func="maxDepth" op="gt" val="1">
+                          <dgm:alg type="tx">
+                            <dgm:param type="txAnchorVert" val="t"/>
+                            <dgm:param type="parTxLTRAlign" val="l"/>
+                            <dgm:param type="parTxRTLAlign" val="r"/>
+                          </dgm:alg>
+                        </dgm:if>
+                        <dgm:else name="Name144">
+                          <dgm:alg type="tx">
+                            <dgm:param type="txAnchorVert" val="t"/>
+                            <dgm:param type="parTxLTRAlign" val="l"/>
+                            <dgm:param type="parTxRTLAlign" val="l"/>
+                          </dgm:alg>
+                        </dgm:else>
+                      </dgm:choose>
+                    </dgm:if>
+                    <dgm:else name="Name145">
+                      <dgm:choose name="Name146">
+                        <dgm:if name="Name147" axis="root des" ptType="all node" func="maxDepth" op="gt" val="1">
+                          <dgm:alg type="tx">
+                            <dgm:param type="txAnchorVert" val="b"/>
+                            <dgm:param type="txAnchorVertCh" val="b"/>
+                            <dgm:param type="parTxLTRAlign" val="l"/>
+                            <dgm:param type="parTxRTLAlign" val="r"/>
+                          </dgm:alg>
+                        </dgm:if>
+                        <dgm:else name="Name148">
+                          <dgm:alg type="tx">
+                            <dgm:param type="txAnchorVert" val="b"/>
+                            <dgm:param type="parTxLTRAlign" val="r"/>
+                            <dgm:param type="parTxRTLAlign" val="r"/>
+                          </dgm:alg>
+                        </dgm:else>
+                      </dgm:choose>
+                    </dgm:else>
+                  </dgm:choose>
+                  <dgm:shape xmlns:r="http://schemas.openxmlformats.org/officeDocument/2006/relationships" type="rect" r:blip="">
+                    <dgm:adjLst/>
+                  </dgm:shape>
+                  <dgm:presOf axis="desOrSelf" ptType="node"/>
+                  <dgm:choose name="Name149">
+                    <dgm:if name="Name150" func="var" arg="dir" op="equ" val="norm">
+                      <dgm:constrLst>
+                        <dgm:constr type="rMarg"/>
+                        <dgm:constr type="tMarg"/>
+                        <dgm:constr type="bMarg"/>
+                      </dgm:constrLst>
+                    </dgm:if>
+                    <dgm:else name="Name151">
+                      <dgm:constrLst>
+                        <dgm:constr type="lMarg"/>
+                        <dgm:constr type="tMarg"/>
+                        <dgm:constr type="bMarg"/>
+                      </dgm:constrLst>
+                    </dgm:else>
+                  </dgm:choose>
+                  <dgm:ruleLst>
+                    <dgm:rule type="primFontSz" val="5" fact="NaN" max="NaN"/>
+                  </dgm:ruleLst>
+                </dgm:layoutNode>
+              </dgm:forEach>
+              <dgm:forEach name="Name152" axis="ch" ptType="node" st="2" cnt="1">
+                <dgm:layoutNode name="bullet5b" styleLbl="node1">
+                  <dgm:alg type="sp"/>
+                  <dgm:shape xmlns:r="http://schemas.openxmlformats.org/officeDocument/2006/relationships" type="ellipse" r:blip="">
+                    <dgm:adjLst/>
+                  </dgm:shape>
+                  <dgm:presOf/>
+                  <dgm:constrLst/>
+                  <dgm:ruleLst/>
+                </dgm:layoutNode>
+                <dgm:layoutNode name="textBox5b" styleLbl="revTx">
+                  <dgm:varLst>
+                    <dgm:bulletEnabled val="1"/>
+                  </dgm:varLst>
+                  <dgm:choose name="Name153">
+                    <dgm:if name="Name154" func="var" arg="dir" op="equ" val="norm">
+                      <dgm:choose name="Name155">
+                        <dgm:if name="Name156" axis="root des" ptType="all node" func="maxDepth" op="gt" val="1">
+                          <dgm:alg type="tx">
+                            <dgm:param type="txAnchorVert" val="t"/>
+                            <dgm:param type="parTxLTRAlign" val="l"/>
+                            <dgm:param type="parTxRTLAlign" val="r"/>
+                          </dgm:alg>
+                        </dgm:if>
+                        <dgm:else name="Name157">
+                          <dgm:alg type="tx">
+                            <dgm:param type="txAnchorVert" val="t"/>
+                            <dgm:param type="parTxLTRAlign" val="l"/>
+                            <dgm:param type="parTxRTLAlign" val="l"/>
+                          </dgm:alg>
+                        </dgm:else>
+                      </dgm:choose>
+                    </dgm:if>
+                    <dgm:else name="Name158">
+                      <dgm:choose name="Name159">
+                        <dgm:if name="Name160" axis="root des" ptType="all node" func="maxDepth" op="gt" val="1">
+                          <dgm:alg type="tx">
+                            <dgm:param type="txAnchorVert" val="b"/>
+                            <dgm:param type="txAnchorVertCh" val="b"/>
+                            <dgm:param type="parTxLTRAlign" val="l"/>
+                            <dgm:param type="parTxRTLAlign" val="r"/>
+                          </dgm:alg>
+                        </dgm:if>
+                        <dgm:else name="Name161">
+                          <dgm:alg type="tx">
+                            <dgm:param type="txAnchorVert" val="b"/>
+                            <dgm:param type="parTxLTRAlign" val="r"/>
+                            <dgm:param type="parTxRTLAlign" val="r"/>
+                          </dgm:alg>
+                        </dgm:else>
+                      </dgm:choose>
+                    </dgm:else>
+                  </dgm:choose>
+                  <dgm:shape xmlns:r="http://schemas.openxmlformats.org/officeDocument/2006/relationships" type="rect" r:blip="">
+                    <dgm:adjLst/>
+                  </dgm:shape>
+                  <dgm:presOf axis="desOrSelf" ptType="node"/>
+                  <dgm:choose name="Name162">
+                    <dgm:if name="Name163" func="var" arg="dir" op="equ" val="norm">
+                      <dgm:constrLst>
+                        <dgm:constr type="rMarg"/>
+                        <dgm:constr type="tMarg"/>
+                        <dgm:constr type="bMarg"/>
+                      </dgm:constrLst>
+                    </dgm:if>
+                    <dgm:else name="Name164">
+                      <dgm:constrLst>
+                        <dgm:constr type="lMarg"/>
+                        <dgm:constr type="tMarg"/>
+                        <dgm:constr type="bMarg"/>
+                      </dgm:constrLst>
+                    </dgm:else>
+                  </dgm:choose>
+                  <dgm:ruleLst>
+                    <dgm:rule type="primFontSz" val="5" fact="NaN" max="NaN"/>
+                  </dgm:ruleLst>
+                </dgm:layoutNode>
+              </dgm:forEach>
+              <dgm:forEach name="Name165" axis="ch" ptType="node" st="3" cnt="1">
+                <dgm:layoutNode name="bullet5c" styleLbl="node1">
+                  <dgm:alg type="sp"/>
+                  <dgm:shape xmlns:r="http://schemas.openxmlformats.org/officeDocument/2006/relationships" type="ellipse" r:blip="">
+                    <dgm:adjLst/>
+                  </dgm:shape>
+                  <dgm:presOf/>
+                  <dgm:constrLst/>
+                  <dgm:ruleLst/>
+                </dgm:layoutNode>
+                <dgm:layoutNode name="textBox5c" styleLbl="revTx">
+                  <dgm:varLst>
+                    <dgm:bulletEnabled val="1"/>
+                  </dgm:varLst>
+                  <dgm:choose name="Name166">
+                    <dgm:if name="Name167" func="var" arg="dir" op="equ" val="norm">
+                      <dgm:choose name="Name168">
+                        <dgm:if name="Name169" axis="root des" ptType="all node" func="maxDepth" op="gt" val="1">
+                          <dgm:alg type="tx">
+                            <dgm:param type="txAnchorVert" val="t"/>
+                            <dgm:param type="parTxLTRAlign" val="l"/>
+                            <dgm:param type="parTxRTLAlign" val="r"/>
+                          </dgm:alg>
+                        </dgm:if>
+                        <dgm:else name="Name170">
+                          <dgm:alg type="tx">
+                            <dgm:param type="txAnchorVert" val="t"/>
+                            <dgm:param type="parTxLTRAlign" val="l"/>
+                            <dgm:param type="parTxRTLAlign" val="l"/>
+                          </dgm:alg>
+                        </dgm:else>
+                      </dgm:choose>
+                    </dgm:if>
+                    <dgm:else name="Name171">
+                      <dgm:choose name="Name172">
+                        <dgm:if name="Name173" axis="root des" ptType="all node" func="maxDepth" op="gt" val="1">
+                          <dgm:alg type="tx">
+                            <dgm:param type="txAnchorVert" val="b"/>
+                            <dgm:param type="txAnchorVertCh" val="b"/>
+                            <dgm:param type="parTxLTRAlign" val="l"/>
+                            <dgm:param type="parTxRTLAlign" val="r"/>
+                          </dgm:alg>
+                        </dgm:if>
+                        <dgm:else name="Name174">
+                          <dgm:alg type="tx">
+                            <dgm:param type="txAnchorVert" val="b"/>
+                            <dgm:param type="parTxLTRAlign" val="r"/>
+                            <dgm:param type="parTxRTLAlign" val="r"/>
+                          </dgm:alg>
+                        </dgm:else>
+                      </dgm:choose>
+                    </dgm:else>
+                  </dgm:choose>
+                  <dgm:shape xmlns:r="http://schemas.openxmlformats.org/officeDocument/2006/relationships" type="rect" r:blip="">
+                    <dgm:adjLst/>
+                  </dgm:shape>
+                  <dgm:presOf axis="desOrSelf" ptType="node"/>
+                  <dgm:choose name="Name175">
+                    <dgm:if name="Name176" func="var" arg="dir" op="equ" val="norm">
+                      <dgm:constrLst>
+                        <dgm:constr type="rMarg"/>
+                        <dgm:constr type="tMarg"/>
+                        <dgm:constr type="bMarg"/>
+                      </dgm:constrLst>
+                    </dgm:if>
+                    <dgm:else name="Name177">
+                      <dgm:constrLst>
+                        <dgm:constr type="lMarg"/>
+                        <dgm:constr type="tMarg"/>
+                        <dgm:constr type="bMarg"/>
+                      </dgm:constrLst>
+                    </dgm:else>
+                  </dgm:choose>
+                  <dgm:ruleLst>
+                    <dgm:rule type="primFontSz" val="5" fact="NaN" max="NaN"/>
+                  </dgm:ruleLst>
+                </dgm:layoutNode>
+              </dgm:forEach>
+              <dgm:forEach name="Name178" axis="ch" ptType="node" st="4" cnt="1">
+                <dgm:layoutNode name="bullet5d" styleLbl="node1">
+                  <dgm:alg type="sp"/>
+                  <dgm:shape xmlns:r="http://schemas.openxmlformats.org/officeDocument/2006/relationships" type="ellipse" r:blip="">
+                    <dgm:adjLst/>
+                  </dgm:shape>
+                  <dgm:presOf/>
+                  <dgm:constrLst/>
+                  <dgm:ruleLst/>
+                </dgm:layoutNode>
+                <dgm:layoutNode name="textBox5d" styleLbl="revTx">
+                  <dgm:varLst>
+                    <dgm:bulletEnabled val="1"/>
+                  </dgm:varLst>
+                  <dgm:choose name="Name179">
+                    <dgm:if name="Name180" func="var" arg="dir" op="equ" val="norm">
+                      <dgm:choose name="Name181">
+                        <dgm:if name="Name182" axis="root des" ptType="all node" func="maxDepth" op="gt" val="1">
+                          <dgm:alg type="tx">
+                            <dgm:param type="txAnchorVert" val="t"/>
+                            <dgm:param type="parTxLTRAlign" val="l"/>
+                            <dgm:param type="parTxRTLAlign" val="r"/>
+                          </dgm:alg>
+                        </dgm:if>
+                        <dgm:else name="Name183">
+                          <dgm:alg type="tx">
+                            <dgm:param type="txAnchorVert" val="t"/>
+                            <dgm:param type="parTxLTRAlign" val="l"/>
+                            <dgm:param type="parTxRTLAlign" val="l"/>
+                          </dgm:alg>
+                        </dgm:else>
+                      </dgm:choose>
+                    </dgm:if>
+                    <dgm:else name="Name184">
+                      <dgm:choose name="Name185">
+                        <dgm:if name="Name186" axis="root des" ptType="all node" func="maxDepth" op="gt" val="1">
+                          <dgm:alg type="tx">
+                            <dgm:param type="txAnchorVert" val="b"/>
+                            <dgm:param type="txAnchorVertCh" val="b"/>
+                            <dgm:param type="parTxLTRAlign" val="l"/>
+                            <dgm:param type="parTxRTLAlign" val="r"/>
+                          </dgm:alg>
+                        </dgm:if>
+                        <dgm:else name="Name187">
+                          <dgm:alg type="tx">
+                            <dgm:param type="txAnchorVert" val="b"/>
+                            <dgm:param type="parTxLTRAlign" val="r"/>
+                            <dgm:param type="parTxRTLAlign" val="r"/>
+                          </dgm:alg>
+                        </dgm:else>
+                      </dgm:choose>
+                    </dgm:else>
+                  </dgm:choose>
+                  <dgm:shape xmlns:r="http://schemas.openxmlformats.org/officeDocument/2006/relationships" type="rect" r:blip="">
+                    <dgm:adjLst/>
+                  </dgm:shape>
+                  <dgm:presOf axis="desOrSelf" ptType="node"/>
+                  <dgm:choose name="Name188">
+                    <dgm:if name="Name189" func="var" arg="dir" op="equ" val="norm">
+                      <dgm:constrLst>
+                        <dgm:constr type="rMarg"/>
+                        <dgm:constr type="tMarg"/>
+                        <dgm:constr type="bMarg"/>
+                      </dgm:constrLst>
+                    </dgm:if>
+                    <dgm:else name="Name190">
+                      <dgm:constrLst>
+                        <dgm:constr type="lMarg"/>
+                        <dgm:constr type="tMarg"/>
+                        <dgm:constr type="bMarg"/>
+                      </dgm:constrLst>
+                    </dgm:else>
+                  </dgm:choose>
+                  <dgm:ruleLst>
+                    <dgm:rule type="primFontSz" val="5" fact="NaN" max="NaN"/>
+                  </dgm:ruleLst>
+                </dgm:layoutNode>
+              </dgm:forEach>
+              <dgm:forEach name="Name191" axis="ch" ptType="node" st="5" cnt="1">
+                <dgm:layoutNode name="bullet5e" styleLbl="node1">
+                  <dgm:alg type="sp"/>
+                  <dgm:shape xmlns:r="http://schemas.openxmlformats.org/officeDocument/2006/relationships" type="ellipse" r:blip="">
+                    <dgm:adjLst/>
+                  </dgm:shape>
+                  <dgm:presOf/>
+                  <dgm:constrLst/>
+                  <dgm:ruleLst/>
+                </dgm:layoutNode>
+                <dgm:layoutNode name="textBox5e" styleLbl="revTx">
+                  <dgm:varLst>
+                    <dgm:bulletEnabled val="1"/>
+                  </dgm:varLst>
+                  <dgm:choose name="Name192">
+                    <dgm:if name="Name193" func="var" arg="dir" op="equ" val="norm">
+                      <dgm:choose name="Name194">
+                        <dgm:if name="Name195" axis="root des" ptType="all node" func="maxDepth" op="gt" val="1">
+                          <dgm:alg type="tx">
+                            <dgm:param type="txAnchorVert" val="t"/>
+                            <dgm:param type="parTxLTRAlign" val="l"/>
+                            <dgm:param type="parTxRTLAlign" val="r"/>
+                          </dgm:alg>
+                        </dgm:if>
+                        <dgm:else name="Name196">
+                          <dgm:alg type="tx">
+                            <dgm:param type="txAnchorVert" val="t"/>
+                            <dgm:param type="parTxLTRAlign" val="l"/>
+                            <dgm:param type="parTxRTLAlign" val="l"/>
+                          </dgm:alg>
+                        </dgm:else>
+                      </dgm:choose>
+                    </dgm:if>
+                    <dgm:else name="Name197">
+                      <dgm:choose name="Name198">
+                        <dgm:if name="Name199" axis="root des" ptType="all node" func="maxDepth" op="gt" val="1">
+                          <dgm:alg type="tx">
+                            <dgm:param type="txAnchorVert" val="b"/>
+                            <dgm:param type="txAnchorVertCh" val="b"/>
+                            <dgm:param type="parTxLTRAlign" val="l"/>
+                            <dgm:param type="parTxRTLAlign" val="r"/>
+                          </dgm:alg>
+                        </dgm:if>
+                        <dgm:else name="Name200">
+                          <dgm:alg type="tx">
+                            <dgm:param type="txAnchorVert" val="b"/>
+                            <dgm:param type="parTxLTRAlign" val="r"/>
+                            <dgm:param type="parTxRTLAlign" val="r"/>
+                          </dgm:alg>
+                        </dgm:else>
+                      </dgm:choose>
+                    </dgm:else>
+                  </dgm:choose>
+                  <dgm:shape xmlns:r="http://schemas.openxmlformats.org/officeDocument/2006/relationships" type="rect" r:blip="">
+                    <dgm:adjLst/>
+                  </dgm:shape>
+                  <dgm:presOf axis="desOrSelf" ptType="node"/>
+                  <dgm:choose name="Name201">
+                    <dgm:if name="Name202" func="var" arg="dir" op="equ" val="norm">
+                      <dgm:constrLst>
+                        <dgm:constr type="rMarg"/>
+                        <dgm:constr type="tMarg"/>
+                        <dgm:constr type="bMarg"/>
+                      </dgm:constrLst>
+                    </dgm:if>
+                    <dgm:else name="Name203">
+                      <dgm:constrLst>
+                        <dgm:constr type="lMarg"/>
+                        <dgm:constr type="tMarg"/>
+                        <dgm:constr type="bMarg"/>
+                      </dgm:constrLst>
+                    </dgm:else>
+                  </dgm:choose>
+                  <dgm:ruleLst>
+                    <dgm:rule type="primFontSz" val="5" fact="NaN" max="NaN"/>
+                  </dgm:ruleLst>
+                </dgm:layoutNode>
+              </dgm:forEach>
+            </dgm:layoutNode>
+          </dgm:else>
+        </dgm:choose>
+      </dgm:if>
+      <dgm:else name="Name204"/>
+    </dgm:choose>
+  </dgm:layoutNode>
+</dgm:layoutDef>
+</file>
+
 <file path=ppt/diagrams/quickStyle1.xml><?xml version="1.0" encoding="utf-8"?>
+<dgm:styleDef xmlns:dgm="http://schemas.openxmlformats.org/drawingml/2006/diagram" xmlns:a="http://schemas.openxmlformats.org/drawingml/2006/main" uniqueId="urn:microsoft.com/office/officeart/2005/8/quickstyle/simple1">
+  <dgm:title val=""/>
+  <dgm:desc val=""/>
+  <dgm:catLst>
+    <dgm:cat type="simple" pri="10100"/>
+  </dgm:catLst>
+  <dgm:scene3d>
+    <a:camera prst="orthographicFront"/>
+    <a:lightRig rig="threePt" dir="t"/>
+  </dgm:scene3d>
+  <dgm:styleLbl name="node0">
+    <dgm:scene3d>
+      <a:camera prst="orthographicFront"/>
+      <a:lightRig rig="threePt" dir="t"/>
+    </dgm:scene3d>
+    <dgm:sp3d/>
+    <dgm:txPr/>
+    <dgm:style>
+      <a:lnRef idx="2">
+        <a:scrgbClr r="0" g="0" b="0"/>
+      </a:lnRef>
+      <a:fillRef idx="1">
+        <a:scrgbClr r="0" g="0" b="0"/>
+      </a:fillRef>
+      <a:effectRef idx="0">
+        <a:scrgbClr r="0" g="0" b="0"/>
+      </a:effectRef>
+      <a:fontRef idx="minor">
+        <a:schemeClr val="lt1"/>
+      </a:fontRef>
+    </dgm:style>
+  </dgm:styleLbl>
+  <dgm:styleLbl name="lnNode1">
+    <dgm:scene3d>
+      <a:camera prst="orthographicFront"/>
+      <a:lightRig rig="threePt" dir="t"/>
+    </dgm:scene3d>
+    <dgm:sp3d/>
+    <dgm:txPr/>
+    <dgm:style>
+      <a:lnRef idx="2">
+        <a:scrgbClr r="0" g="0" b="0"/>
+      </a:lnRef>
+      <a:fillRef idx="1">
+        <a:scrgbClr r="0" g="0" b="0"/>
+      </a:fillRef>
+      <a:effectRef idx="0">
+        <a:scrgbClr r="0" g="0" b="0"/>
+      </a:effectRef>
+      <a:fontRef idx="minor">
+        <a:schemeClr val="lt1"/>
+      </a:fontRef>
+    </dgm:style>
+  </dgm:styleLbl>
+  <dgm:styleLbl name="vennNode1">
+    <dgm:scene3d>
+      <a:camera prst="orthographicFront"/>
+      <a:lightRig rig="threePt" dir="t"/>
+    </dgm:scene3d>
+    <dgm:sp3d/>
+    <dgm:txPr/>
+    <dgm:style>
+      <a:lnRef idx="2">
+        <a:scrgbClr r="0" g="0" b="0"/>
+      </a:lnRef>
+      <a:fillRef idx="1">
+        <a:scrgbClr r="0" g="0" b="0"/>
+      </a:fillRef>
+      <a:effectRef idx="0">
+        <a:scrgbClr r="0" g="0" b="0"/>
+      </a:effectRef>
+      <a:fontRef idx="minor">
+        <a:schemeClr val="tx1"/>
+      </a:fontRef>
+    </dgm:style>
+  </dgm:styleLbl>
+  <dgm:styleLbl name="alignNode1">
+    <dgm:scene3d>
+      <a:camera prst="orthographicFront"/>
+      <a:lightRig rig="threePt" dir="t"/>
+    </dgm:scene3d>
+    <dgm:sp3d/>
+    <dgm:txPr/>
+    <dgm:style>
+      <a:lnRef idx="2">
+        <a:scrgbClr r="0" g="0" b="0"/>
+      </a:lnRef>
+      <a:fillRef idx="1">
+        <a:scrgbClr r="0" g="0" b="0"/>
+      </a:fillRef>
+      <a:effectRef idx="0">
+        <a:scrgbClr r="0" g="0" b="0"/>
+      </a:effectRef>
+      <a:fontRef idx="minor">
+        <a:schemeClr val="lt1"/>
+      </a:fontRef>
+    </dgm:style>
+  </dgm:styleLbl>
+  <dgm:styleLbl name="node1">
+    <dgm:scene3d>
+      <a:camera prst="orthographicFront"/>
+      <a:lightRig rig="threePt" dir="t"/>
+    </dgm:scene3d>
+    <dgm:sp3d/>
+    <dgm:txPr/>
+    <dgm:style>
+      <a:lnRef idx="2">
+        <a:scrgbClr r="0" g="0" b="0"/>
+      </a:lnRef>
+      <a:fillRef idx="1">
+        <a:scrgbClr r="0" g="0" b="0"/>
+      </a:fillRef>
+      <a:effectRef idx="0">
+        <a:scrgbClr r="0" g="0" b="0"/>
+      </a:effectRef>
+      <a:fontRef idx="minor">
+        <a:schemeClr val="lt1"/>
+      </a:fontRef>
+    </dgm:style>
+  </dgm:styleLbl>
+  <dgm:styleLbl name="node2">
+    <dgm:scene3d>
+      <a:camera prst="orthographicFront"/>
+      <a:lightRig rig="threePt" dir="t"/>
+    </dgm:scene3d>
+    <dgm:sp3d/>
+    <dgm:txPr/>
+    <dgm:style>
+      <a:lnRef idx="2">
+        <a:scrgbClr r="0" g="0" b="0"/>
+      </a:lnRef>
+      <a:fillRef idx="1">
+        <a:scrgbClr r="0" g="0" b="0"/>
+      </a:fillRef>
+      <a:effectRef idx="0">
+        <a:scrgbClr r="0" g="0" b="0"/>
+      </a:effectRef>
+      <a:fontRef idx="minor">
+        <a:schemeClr val="lt1"/>
+      </a:fontRef>
+    </dgm:style>
+  </dgm:styleLbl>
+  <dgm:styleLbl name="node3">
+    <dgm:scene3d>
+      <a:camera prst="orthographicFront"/>
+      <a:lightRig rig="threePt" dir="t"/>
+    </dgm:scene3d>
+    <dgm:sp3d/>
+    <dgm:txPr/>
+    <dgm:style>
+      <a:lnRef idx="2">
+        <a:scrgbClr r="0" g="0" b="0"/>
+      </a:lnRef>
+      <a:fillRef idx="1">
+        <a:scrgbClr r="0" g="0" b="0"/>
+      </a:fillRef>
+      <a:effectRef idx="0">
+        <a:scrgbClr r="0" g="0" b="0"/>
+      </a:effectRef>
+      <a:fontRef idx="minor">
+        <a:schemeClr val="lt1"/>
+      </a:fontRef>
+    </dgm:style>
+  </dgm:styleLbl>
+  <dgm:styleLbl name="node4">
+    <dgm:scene3d>
+      <a:camera prst="orthographicFront"/>
+      <a:lightRig rig="threePt" dir="t"/>
+    </dgm:scene3d>
+    <dgm:sp3d/>
+    <dgm:txPr/>
+    <dgm:style>
+      <a:lnRef idx="2">
+        <a:scrgbClr r="0" g="0" b="0"/>
+      </a:lnRef>
+      <a:fillRef idx="1">
+        <a:scrgbClr r="0" g="0" b="0"/>
+      </a:fillRef>
+      <a:effectRef idx="0">
+        <a:scrgbClr r="0" g="0" b="0"/>
+      </a:effectRef>
+      <a:fontRef idx="minor">
+        <a:schemeClr val="lt1"/>
+      </a:fontRef>
+    </dgm:style>
+  </dgm:styleLbl>
+  <dgm:styleLbl name="fgImgPlace1">
+    <dgm:scene3d>
+      <a:camera prst="orthographicFront"/>
+      <a:lightRig rig="threePt" dir="t"/>
+    </dgm:scene3d>
+    <dgm:sp3d/>
+    <dgm:txPr/>
+    <dgm:style>
+      <a:lnRef idx="2">
+        <a:scrgbClr r="0" g="0" b="0"/>
+      </a:lnRef>
+      <a:fillRef idx="1">
+        <a:scrgbClr r="0" g="0" b="0"/>
+      </a:fillRef>
+      <a:effectRef idx="0">
+        <a:scrgbClr r="0" g="0" b="0"/>
+      </a:effectRef>
+      <a:fontRef idx="minor"/>
+    </dgm:style>
+  </dgm:styleLbl>
+  <dgm:styleLbl name="alignImgPlace1">
+    <dgm:scene3d>
+      <a:camera prst="orthographicFront"/>
+      <a:lightRig rig="threePt" dir="t"/>
+    </dgm:scene3d>
+    <dgm:sp3d/>
+    <dgm:txPr/>
+    <dgm:style>
+      <a:lnRef idx="2">
+        <a:scrgbClr r="0" g="0" b="0"/>
+      </a:lnRef>
+      <a:fillRef idx="1">
+        <a:scrgbClr r="0" g="0" b="0"/>
+      </a:fillRef>
+      <a:effectRef idx="0">
+        <a:scrgbClr r="0" g="0" b="0"/>
+      </a:effectRef>
+      <a:fontRef idx="minor"/>
+    </dgm:style>
+  </dgm:styleLbl>
+  <dgm:styleLbl name="bgImgPlace1">
+    <dgm:scene3d>
+      <a:camera prst="orthographicFront"/>
+      <a:lightRig rig="threePt" dir="t"/>
+    </dgm:scene3d>
+    <dgm:sp3d/>
+    <dgm:txPr/>
+    <dgm:style>
+      <a:lnRef idx="2">
+        <a:scrgbClr r="0" g="0" b="0"/>
+      </a:lnRef>
+      <a:fillRef idx="1">
+        <a:scrgbClr r="0" g="0" b="0"/>
+      </a:fillRef>
+      <a:effectRef idx="0">
+        <a:scrgbClr r="0" g="0" b="0"/>
+      </a:effectRef>
+      <a:fontRef idx="minor"/>
+    </dgm:style>
+  </dgm:styleLbl>
+  <dgm:styleLbl name="sibTrans2D1">
+    <dgm:scene3d>
+      <a:camera prst="orthographicFront"/>
+      <a:lightRig rig="threePt" dir="t"/>
+    </dgm:scene3d>
+    <dgm:sp3d/>
+    <dgm:txPr/>
+    <dgm:style>
+      <a:lnRef idx="0">
+        <a:scrgbClr r="0" g="0" b="0"/>
+      </a:lnRef>
+      <a:fillRef idx="1">
+        <a:scrgbClr r="0" g="0" b="0"/>
+      </a:fillRef>
+      <a:effectRef idx="0">
+        <a:scrgbClr r="0" g="0" b="0"/>
+      </a:effectRef>
+      <a:fontRef idx="minor">
+        <a:schemeClr val="lt1"/>
+      </a:fontRef>
+    </dgm:style>
+  </dgm:styleLbl>
+  <dgm:styleLbl name="fgSibTrans2D1">
+    <dgm:scene3d>
+      <a:camera prst="orthographicFront"/>
+      <a:lightRig rig="threePt" dir="t"/>
+    </dgm:scene3d>
+    <dgm:sp3d/>
+    <dgm:txPr/>
+    <dgm:style>
+      <a:lnRef idx="0">
+        <a:scrgbClr r="0" g="0" b="0"/>
+      </a:lnRef>
+      <a:fillRef idx="1">
+        <a:scrgbClr r="0" g="0" b="0"/>
+      </a:fillRef>
+      <a:effectRef idx="0">
+        <a:scrgbClr r="0" g="0" b="0"/>
+      </a:effectRef>
+      <a:fontRef idx="minor">
+        <a:schemeClr val="lt1"/>
+      </a:fontRef>
+    </dgm:style>
+  </dgm:styleLbl>
+  <dgm:styleLbl name="bgSibTrans2D1">
+    <dgm:scene3d>
+      <a:camera prst="orthographicFront"/>
+      <a:lightRig rig="threePt" dir="t"/>
+    </dgm:scene3d>
+    <dgm:sp3d/>
+    <dgm:txPr/>
+    <dgm:style>
+      <a:lnRef idx="0">
+        <a:scrgbClr r="0" g="0" b="0"/>
+      </a:lnRef>
+      <a:fillRef idx="1">
+        <a:scrgbClr r="0" g="0" b="0"/>
+      </a:fillRef>
+      <a:effectRef idx="0">
+        <a:scrgbClr r="0" g="0" b="0"/>
+      </a:effectRef>
+      <a:fontRef idx="minor">
+        <a:schemeClr val="lt1"/>
+      </a:fontRef>
+    </dgm:style>
+  </dgm:styleLbl>
+  <dgm:styleLbl name="sibTrans1D1">
+    <dgm:scene3d>
+      <a:camera prst="orthographicFront"/>
+      <a:lightRig rig="threePt" dir="t"/>
+    </dgm:scene3d>
+    <dgm:sp3d/>
+    <dgm:txPr/>
+    <dgm:style>
+      <a:lnRef idx="1">
+        <a:scrgbClr r="0" g="0" b="0"/>
+      </a:lnRef>
+      <a:fillRef idx="0">
+        <a:scrgbClr r="0" g="0" b="0"/>
+      </a:fillRef>
+      <a:effectRef idx="0">
+        <a:scrgbClr r="0" g="0" b="0"/>
+      </a:effectRef>
+      <a:fontRef idx="minor"/>
+    </dgm:style>
+  </dgm:styleLbl>
+  <dgm:styleLbl name="callout">
+    <dgm:scene3d>
+      <a:camera prst="orthographicFront"/>
+      <a:lightRig rig="threePt" dir="t"/>
+    </dgm:scene3d>
+    <dgm:sp3d/>
+    <dgm:txPr/>
+    <dgm:style>
+      <a:lnRef idx="2">
+        <a:scrgbClr r="0" g="0" b="0"/>
+      </a:lnRef>
+      <a:fillRef idx="1">
+        <a:scrgbClr r="0" g="0" b="0"/>
+      </a:fillRef>
+      <a:effectRef idx="0">
+        <a:scrgbClr r="0" g="0" b="0"/>
+      </a:effectRef>
+      <a:fontRef idx="minor"/>
+    </dgm:style>
+  </dgm:styleLbl>
+  <dgm:styleLbl name="asst0">
+    <dgm:scene3d>
+      <a:camera prst="orthographicFront"/>
+      <a:lightRig rig="threePt" dir="t"/>
+    </dgm:scene3d>
+    <dgm:sp3d/>
+    <dgm:txPr/>
+    <dgm:style>
+      <a:lnRef idx="2">
+        <a:scrgbClr r="0" g="0" b="0"/>
+      </a:lnRef>
+      <a:fillRef idx="1">
+        <a:scrgbClr r="0" g="0" b="0"/>
+      </a:fillRef>
+      <a:effectRef idx="0">
+        <a:scrgbClr r="0" g="0" b="0"/>
+      </a:effectRef>
+      <a:fontRef idx="minor">
+        <a:schemeClr val="lt1"/>
+      </a:fontRef>
+    </dgm:style>
+  </dgm:styleLbl>
+  <dgm:styleLbl name="asst1">
+    <dgm:scene3d>
+      <a:camera prst="orthographicFront"/>
+      <a:lightRig rig="threePt" dir="t"/>
+    </dgm:scene3d>
+    <dgm:sp3d/>
+    <dgm:txPr/>
+    <dgm:style>
+      <a:lnRef idx="2">
+        <a:scrgbClr r="0" g="0" b="0"/>
+      </a:lnRef>
+      <a:fillRef idx="1">
+        <a:scrgbClr r="0" g="0" b="0"/>
+      </a:fillRef>
+      <a:effectRef idx="0">
+        <a:scrgbClr r="0" g="0" b="0"/>
+      </a:effectRef>
+      <a:fontRef idx="minor">
+        <a:schemeClr val="lt1"/>
+      </a:fontRef>
+    </dgm:style>
+  </dgm:styleLbl>
+  <dgm:styleLbl name="asst2">
+    <dgm:scene3d>
+      <a:camera prst="orthographicFront"/>
+      <a:lightRig rig="threePt" dir="t"/>
+    </dgm:scene3d>
+    <dgm:sp3d/>
+    <dgm:txPr/>
+    <dgm:style>
+      <a:lnRef idx="2">
+        <a:scrgbClr r="0" g="0" b="0"/>
+      </a:lnRef>
+      <a:fillRef idx="1">
+        <a:scrgbClr r="0" g="0" b="0"/>
+      </a:fillRef>
+      <a:effectRef idx="0">
+        <a:scrgbClr r="0" g="0" b="0"/>
+      </a:effectRef>
+      <a:fontRef idx="minor">
+        <a:schemeClr val="lt1"/>
+      </a:fontRef>
+    </dgm:style>
+  </dgm:styleLbl>
+  <dgm:styleLbl name="asst3">
+    <dgm:scene3d>
+      <a:camera prst="orthographicFront"/>
+      <a:lightRig rig="threePt" dir="t"/>
+    </dgm:scene3d>
+    <dgm:sp3d/>
+    <dgm:txPr/>
+    <dgm:style>
+      <a:lnRef idx="2">
+        <a:scrgbClr r="0" g="0" b="0"/>
+      </a:lnRef>
+      <a:fillRef idx="1">
+        <a:scrgbClr r="0" g="0" b="0"/>
+      </a:fillRef>
+      <a:effectRef idx="0">
+        <a:scrgbClr r="0" g="0" b="0"/>
+      </a:effectRef>
+      <a:fontRef idx="minor">
+        <a:schemeClr val="lt1"/>
+      </a:fontRef>
+    </dgm:style>
+  </dgm:styleLbl>
+  <dgm:styleLbl name="asst4">
+    <dgm:scene3d>
+      <a:camera prst="orthographicFront"/>
+      <a:lightRig rig="threePt" dir="t"/>
+    </dgm:scene3d>
+    <dgm:sp3d/>
+    <dgm:txPr/>
+    <dgm:style>
+      <a:lnRef idx="2">
+        <a:scrgbClr r="0" g="0" b="0"/>
+      </a:lnRef>
+      <a:fillRef idx="1">
+        <a:scrgbClr r="0" g="0" b="0"/>
+      </a:fillRef>
+      <a:effectRef idx="0">
+        <a:scrgbClr r="0" g="0" b="0"/>
+      </a:effectRef>
+      <a:fontRef idx="minor">
+        <a:schemeClr val="lt1"/>
+      </a:fontRef>
+    </dgm:style>
+  </dgm:styleLbl>
+  <dgm:styleLbl name="parChTrans2D1">
+    <dgm:scene3d>
+      <a:camera prst="orthographicFront"/>
+      <a:lightRig rig="threePt" dir="t"/>
+    </dgm:scene3d>
+    <dgm:sp3d/>
+    <dgm:txPr/>
+    <dgm:style>
+      <a:lnRef idx="2">
+        <a:scrgbClr r="0" g="0" b="0"/>
+      </a:lnRef>
+      <a:fillRef idx="1">
+        <a:scrgbClr r="0" g="0" b="0"/>
+      </a:fillRef>
+      <a:effectRef idx="0">
+        <a:scrgbClr r="0" g="0" b="0"/>
+      </a:effectRef>
+      <a:fontRef idx="minor">
+        <a:schemeClr val="lt1"/>
+      </a:fontRef>
+    </dgm:style>
+  </dgm:styleLbl>
+  <dgm:styleLbl name="parChTrans2D2">
+    <dgm:scene3d>
+      <a:camera prst="orthographicFront"/>
+      <a:lightRig rig="threePt" dir="t"/>
+    </dgm:scene3d>
+    <dgm:sp3d/>
+    <dgm:txPr/>
+    <dgm:style>
+      <a:lnRef idx="2">
+        <a:scrgbClr r="0" g="0" b="0"/>
+      </a:lnRef>
+      <a:fillRef idx="1">
+        <a:scrgbClr r="0" g="0" b="0"/>
+      </a:fillRef>
+      <a:effectRef idx="0">
+        <a:scrgbClr r="0" g="0" b="0"/>
+      </a:effectRef>
+      <a:fontRef idx="minor">
+        <a:schemeClr val="lt1"/>
+      </a:fontRef>
+    </dgm:style>
+  </dgm:styleLbl>
+  <dgm:styleLbl name="parChTrans2D3">
+    <dgm:scene3d>
+      <a:camera prst="orthographicFront"/>
+      <a:lightRig rig="threePt" dir="t"/>
+    </dgm:scene3d>
+    <dgm:sp3d/>
+    <dgm:txPr/>
+    <dgm:style>
+      <a:lnRef idx="2">
+        <a:scrgbClr r="0" g="0" b="0"/>
+      </a:lnRef>
+      <a:fillRef idx="1">
+        <a:scrgbClr r="0" g="0" b="0"/>
+      </a:fillRef>
+      <a:effectRef idx="0">
+        <a:scrgbClr r="0" g="0" b="0"/>
+      </a:effectRef>
+      <a:fontRef idx="minor">
+        <a:schemeClr val="lt1"/>
+      </a:fontRef>
+    </dgm:style>
+  </dgm:styleLbl>
+  <dgm:styleLbl name="parChTrans2D4">
+    <dgm:scene3d>
+      <a:camera prst="orthographicFront"/>
+      <a:lightRig rig="threePt" dir="t"/>
+    </dgm:scene3d>
+    <dgm:sp3d/>
+    <dgm:txPr/>
+    <dgm:style>
+      <a:lnRef idx="2">
+        <a:scrgbClr r="0" g="0" b="0"/>
+      </a:lnRef>
+      <a:fillRef idx="1">
+        <a:scrgbClr r="0" g="0" b="0"/>
+      </a:fillRef>
+      <a:effectRef idx="0">
+        <a:scrgbClr r="0" g="0" b="0"/>
+      </a:effectRef>
+      <a:fontRef idx="minor">
+        <a:schemeClr val="lt1"/>
+      </a:fontRef>
+    </dgm:style>
+  </dgm:styleLbl>
+  <dgm:styleLbl name="parChTrans1D1">
+    <dgm:scene3d>
+      <a:camera prst="orthographicFront"/>
+      <a:lightRig rig="threePt" dir="t"/>
+    </dgm:scene3d>
+    <dgm:sp3d/>
+    <dgm:txPr/>
+    <dgm:style>
+      <a:lnRef idx="2">
+        <a:scrgbClr r="0" g="0" b="0"/>
+      </a:lnRef>
+      <a:fillRef idx="0">
+        <a:scrgbClr r="0" g="0" b="0"/>
+      </a:fillRef>
+      <a:effectRef idx="0">
+        <a:scrgbClr r="0" g="0" b="0"/>
+      </a:effectRef>
+      <a:fontRef idx="minor"/>
+    </dgm:style>
+  </dgm:styleLbl>
+  <dgm:styleLbl name="parChTrans1D2">
+    <dgm:scene3d>
+      <a:camera prst="orthographicFront"/>
+      <a:lightRig rig="threePt" dir="t"/>
+    </dgm:scene3d>
+    <dgm:sp3d/>
+    <dgm:txPr/>
+    <dgm:style>
+      <a:lnRef idx="2">
+        <a:scrgbClr r="0" g="0" b="0"/>
+      </a:lnRef>
+      <a:fillRef idx="0">
+        <a:scrgbClr r="0" g="0" b="0"/>
+      </a:fillRef>
+      <a:effectRef idx="0">
+        <a:scrgbClr r="0" g="0" b="0"/>
+      </a:effectRef>
+      <a:fontRef idx="minor"/>
+    </dgm:style>
+  </dgm:styleLbl>
+  <dgm:styleLbl name="parChTrans1D3">
+    <dgm:scene3d>
+      <a:camera prst="orthographicFront"/>
+      <a:lightRig rig="threePt" dir="t"/>
+    </dgm:scene3d>
+    <dgm:sp3d/>
+    <dgm:txPr/>
+    <dgm:style>
+      <a:lnRef idx="2">
+        <a:scrgbClr r="0" g="0" b="0"/>
+      </a:lnRef>
+      <a:fillRef idx="0">
+        <a:scrgbClr r="0" g="0" b="0"/>
+      </a:fillRef>
+      <a:effectRef idx="0">
+        <a:scrgbClr r="0" g="0" b="0"/>
+      </a:effectRef>
+      <a:fontRef idx="minor"/>
+    </dgm:style>
+  </dgm:styleLbl>
+  <dgm:styleLbl name="parChTrans1D4">
+    <dgm:scene3d>
+      <a:camera prst="orthographicFront"/>
+      <a:lightRig rig="threePt" dir="t"/>
+    </dgm:scene3d>
+    <dgm:sp3d/>
+    <dgm:txPr/>
+    <dgm:style>
+      <a:lnRef idx="2">
+        <a:scrgbClr r="0" g="0" b="0"/>
+      </a:lnRef>
+      <a:fillRef idx="0">
+        <a:scrgbClr r="0" g="0" b="0"/>
+      </a:fillRef>
+      <a:effectRef idx="0">
+        <a:scrgbClr r="0" g="0" b="0"/>
+      </a:effectRef>
+      <a:fontRef idx="minor"/>
+    </dgm:style>
+  </dgm:styleLbl>
+  <dgm:styleLbl name="fgAcc1">
+    <dgm:scene3d>
+      <a:camera prst="orthographicFront"/>
+      <a:lightRig rig="threePt" dir="t"/>
+    </dgm:scene3d>
+    <dgm:sp3d/>
+    <dgm:txPr/>
+    <dgm:style>
+      <a:lnRef idx="2">
+        <a:scrgbClr r="0" g="0" b="0"/>
+      </a:lnRef>
+      <a:fillRef idx="1">
+        <a:scrgbClr r="0" g="0" b="0"/>
+      </a:fillRef>
+      <a:effectRef idx="0">
+        <a:scrgbClr r="0" g="0" b="0"/>
+      </a:effectRef>
+      <a:fontRef idx="minor"/>
+    </dgm:style>
+  </dgm:styleLbl>
+  <dgm:styleLbl name="conFgAcc1">
+    <dgm:scene3d>
+      <a:camera prst="orthographicFront"/>
+      <a:lightRig rig="threePt" dir="t"/>
+    </dgm:scene3d>
+    <dgm:sp3d/>
+    <dgm:txPr/>
+    <dgm:style>
+      <a:lnRef idx="2">
+        <a:scrgbClr r="0" g="0" b="0"/>
+      </a:lnRef>
+      <a:fillRef idx="1">
+        <a:scrgbClr r="0" g="0" b="0"/>
+      </a:fillRef>
+      <a:effectRef idx="0">
+        <a:scrgbClr r="0" g="0" b="0"/>
+      </a:effectRef>
+      <a:fontRef idx="minor"/>
+    </dgm:style>
+  </dgm:styleLbl>
+  <dgm:styleLbl name="alignAcc1">
+    <dgm:scene3d>
+      <a:camera prst="orthographicFront"/>
+      <a:lightRig rig="threePt" dir="t"/>
+    </dgm:scene3d>
+    <dgm:sp3d/>
+    <dgm:txPr/>
+    <dgm:style>
+      <a:lnRef idx="2">
+        <a:scrgbClr r="0" g="0" b="0"/>
+      </a:lnRef>
+      <a:fillRef idx="1">
+        <a:scrgbClr r="0" g="0" b="0"/>
+      </a:fillRef>
+      <a:effectRef idx="0">
+        <a:scrgbClr r="0" g="0" b="0"/>
+      </a:effectRef>
+      <a:fontRef idx="minor"/>
+    </dgm:style>
+  </dgm:styleLbl>
+  <dgm:styleLbl name="trAlignAcc1">
+    <dgm:scene3d>
+      <a:camera prst="orthographicFront"/>
+      <a:lightRig rig="threePt" dir="t"/>
+    </dgm:scene3d>
+    <dgm:sp3d/>
+    <dgm:txPr/>
+    <dgm:style>
+      <a:lnRef idx="1">
+        <a:scrgbClr r="0" g="0" b="0"/>
+      </a:lnRef>
+      <a:fillRef idx="1">
+        <a:scrgbClr r="0" g="0" b="0"/>
+      </a:fillRef>
+      <a:effectRef idx="0">
+        <a:scrgbClr r="0" g="0" b="0"/>
+      </a:effectRef>
+      <a:fontRef idx="minor"/>
+    </dgm:style>
+  </dgm:styleLbl>
+  <dgm:styleLbl name="bgAcc1">
+    <dgm:scene3d>
+      <a:camera prst="orthographicFront"/>
+      <a:lightRig rig="threePt" dir="t"/>
+    </dgm:scene3d>
+    <dgm:sp3d/>
+    <dgm:txPr/>
+    <dgm:style>
+      <a:lnRef idx="2">
+        <a:scrgbClr r="0" g="0" b="0"/>
+      </a:lnRef>
+      <a:fillRef idx="1">
+        <a:scrgbClr r="0" g="0" b="0"/>
+      </a:fillRef>
+      <a:effectRef idx="0">
+        <a:scrgbClr r="0" g="0" b="0"/>
+      </a:effectRef>
+      <a:fontRef idx="minor"/>
+    </dgm:style>
+  </dgm:styleLbl>
+  <dgm:styleLbl name="solidFgAcc1">
+    <dgm:scene3d>
+      <a:camera prst="orthographicFront"/>
+      <a:lightRig rig="threePt" dir="t"/>
+    </dgm:scene3d>
+    <dgm:sp3d/>
+    <dgm:txPr/>
+    <dgm:style>
+      <a:lnRef idx="2">
+        <a:scrgbClr r="0" g="0" b="0"/>
+      </a:lnRef>
+      <a:fillRef idx="1">
+        <a:scrgbClr r="0" g="0" b="0"/>
+      </a:fillRef>
+      <a:effectRef idx="0">
+        <a:scrgbClr r="0" g="0" b="0"/>
+      </a:effectRef>
+      <a:fontRef idx="minor"/>
+    </dgm:style>
+  </dgm:styleLbl>
+  <dgm:styleLbl name="solidAlignAcc1">
+    <dgm:scene3d>
+      <a:camera prst="orthographicFront"/>
+      <a:lightRig rig="threePt" dir="t"/>
+    </dgm:scene3d>
+    <dgm:sp3d/>
+    <dgm:txPr/>
+    <dgm:style>
+      <a:lnRef idx="2">
+        <a:scrgbClr r="0" g="0" b="0"/>
+      </a:lnRef>
+      <a:fillRef idx="1">
+        <a:scrgbClr r="0" g="0" b="0"/>
+      </a:fillRef>
+      <a:effectRef idx="0">
+        <a:scrgbClr r="0" g="0" b="0"/>
+      </a:effectRef>
+      <a:fontRef idx="minor"/>
+    </dgm:style>
+  </dgm:styleLbl>
+  <dgm:styleLbl name="solidBgAcc1">
+    <dgm:scene3d>
+      <a:camera prst="orthographicFront"/>
+      <a:lightRig rig="threePt" dir="t"/>
+    </dgm:scene3d>
+    <dgm:sp3d/>
+    <dgm:txPr/>
+    <dgm:style>
+      <a:lnRef idx="2">
+        <a:scrgbClr r="0" g="0" b="0"/>
+      </a:lnRef>
+      <a:fillRef idx="1">
+        <a:scrgbClr r="0" g="0" b="0"/>
+      </a:fillRef>
+      <a:effectRef idx="0">
+        <a:scrgbClr r="0" g="0" b="0"/>
+      </a:effectRef>
+      <a:fontRef idx="minor"/>
+    </dgm:style>
+  </dgm:styleLbl>
+  <dgm:styleLbl name="fgAccFollowNode1">
+    <dgm:scene3d>
+      <a:camera prst="orthographicFront"/>
+      <a:lightRig rig="threePt" dir="t"/>
+    </dgm:scene3d>
+    <dgm:sp3d/>
+    <dgm:txPr/>
+    <dgm:style>
+      <a:lnRef idx="2">
+        <a:scrgbClr r="0" g="0" b="0"/>
+      </a:lnRef>
+      <a:fillRef idx="1">
+        <a:scrgbClr r="0" g="0" b="0"/>
+      </a:fillRef>
+      <a:effectRef idx="0">
+        <a:scrgbClr r="0" g="0" b="0"/>
+      </a:effectRef>
+      <a:fontRef idx="minor"/>
+    </dgm:style>
+  </dgm:styleLbl>
+  <dgm:styleLbl name="alignAccFollowNode1">
+    <dgm:scene3d>
+      <a:camera prst="orthographicFront"/>
+      <a:lightRig rig="threePt" dir="t"/>
+    </dgm:scene3d>
+    <dgm:sp3d/>
+    <dgm:txPr/>
+    <dgm:style>
+      <a:lnRef idx="2">
+        <a:scrgbClr r="0" g="0" b="0"/>
+      </a:lnRef>
+      <a:fillRef idx="1">
+        <a:scrgbClr r="0" g="0" b="0"/>
+      </a:fillRef>
+      <a:effectRef idx="0">
+        <a:scrgbClr r="0" g="0" b="0"/>
+      </a:effectRef>
+      <a:fontRef idx="minor"/>
+    </dgm:style>
+  </dgm:styleLbl>
+  <dgm:styleLbl name="bgAccFollowNode1">
+    <dgm:scene3d>
+      <a:camera prst="orthographicFront"/>
+      <a:lightRig rig="threePt" dir="t"/>
+    </dgm:scene3d>
+    <dgm:sp3d/>
+    <dgm:txPr/>
+    <dgm:style>
+      <a:lnRef idx="2">
+        <a:scrgbClr r="0" g="0" b="0"/>
+      </a:lnRef>
+      <a:fillRef idx="1">
+        <a:scrgbClr r="0" g="0" b="0"/>
+      </a:fillRef>
+      <a:effectRef idx="0">
+        <a:scrgbClr r="0" g="0" b="0"/>
+      </a:effectRef>
+      <a:fontRef idx="minor"/>
+    </dgm:style>
+  </dgm:styleLbl>
+  <dgm:styleLbl name="fgAcc0">
+    <dgm:scene3d>
+      <a:camera prst="orthographicFront"/>
+      <a:lightRig rig="threePt" dir="t"/>
+    </dgm:scene3d>
+    <dgm:sp3d/>
+    <dgm:txPr/>
+    <dgm:style>
+      <a:lnRef idx="2">
+        <a:scrgbClr r="0" g="0" b="0"/>
+      </a:lnRef>
+      <a:fillRef idx="1">
+        <a:scrgbClr r="0" g="0" b="0"/>
+      </a:fillRef>
+      <a:effectRef idx="0">
+        <a:scrgbClr r="0" g="0" b="0"/>
+      </a:effectRef>
+      <a:fontRef idx="minor"/>
+    </dgm:style>
+  </dgm:styleLbl>
+  <dgm:styleLbl name="fgAcc2">
+    <dgm:scene3d>
+      <a:camera prst="orthographicFront"/>
+      <a:lightRig rig="threePt" dir="t"/>
+    </dgm:scene3d>
+    <dgm:sp3d/>
+    <dgm:txPr/>
+    <dgm:style>
+      <a:lnRef idx="2">
+        <a:scrgbClr r="0" g="0" b="0"/>
+      </a:lnRef>
+      <a:fillRef idx="1">
+        <a:scrgbClr r="0" g="0" b="0"/>
+      </a:fillRef>
+      <a:effectRef idx="0">
+        <a:scrgbClr r="0" g="0" b="0"/>
+      </a:effectRef>
+      <a:fontRef idx="minor"/>
+    </dgm:style>
+  </dgm:styleLbl>
+  <dgm:styleLbl name="fgAcc3">
+    <dgm:scene3d>
+      <a:camera prst="orthographicFront"/>
+      <a:lightRig rig="threePt" dir="t"/>
+    </dgm:scene3d>
+    <dgm:sp3d/>
+    <dgm:txPr/>
+    <dgm:style>
+      <a:lnRef idx="2">
+        <a:scrgbClr r="0" g="0" b="0"/>
+      </a:lnRef>
+      <a:fillRef idx="1">
+        <a:scrgbClr r="0" g="0" b="0"/>
+      </a:fillRef>
+      <a:effectRef idx="0">
+        <a:scrgbClr r="0" g="0" b="0"/>
+      </a:effectRef>
+      <a:fontRef idx="minor"/>
+    </dgm:style>
+  </dgm:styleLbl>
+  <dgm:styleLbl name="fgAcc4">
+    <dgm:scene3d>
+      <a:camera prst="orthographicFront"/>
+      <a:lightRig rig="threePt" dir="t"/>
+    </dgm:scene3d>
+    <dgm:sp3d/>
+    <dgm:txPr/>
+    <dgm:style>
+      <a:lnRef idx="2">
+        <a:scrgbClr r="0" g="0" b="0"/>
+      </a:lnRef>
+      <a:fillRef idx="1">
+        <a:scrgbClr r="0" g="0" b="0"/>
+      </a:fillRef>
+      <a:effectRef idx="0">
+        <a:scrgbClr r="0" g="0" b="0"/>
+      </a:effectRef>
+      <a:fontRef idx="minor"/>
+    </dgm:style>
+  </dgm:styleLbl>
+  <dgm:styleLbl name="bgShp">
+    <dgm:scene3d>
+      <a:camera prst="orthographicFront"/>
+      <a:lightRig rig="threePt" dir="t"/>
+    </dgm:scene3d>
+    <dgm:sp3d/>
+    <dgm:txPr/>
+    <dgm:style>
+      <a:lnRef idx="0">
+        <a:scrgbClr r="0" g="0" b="0"/>
+      </a:lnRef>
+      <a:fillRef idx="1">
+        <a:scrgbClr r="0" g="0" b="0"/>
+      </a:fillRef>
+      <a:effectRef idx="0">
+        <a:scrgbClr r="0" g="0" b="0"/>
+      </a:effectRef>
+      <a:fontRef idx="minor"/>
+    </dgm:style>
+  </dgm:styleLbl>
+  <dgm:styleLbl name="dkBgShp">
+    <dgm:scene3d>
+      <a:camera prst="orthographicFront"/>
+      <a:lightRig rig="threePt" dir="t"/>
+    </dgm:scene3d>
+    <dgm:sp3d/>
+    <dgm:txPr/>
+    <dgm:style>
+      <a:lnRef idx="0">
+        <a:scrgbClr r="0" g="0" b="0"/>
+      </a:lnRef>
+      <a:fillRef idx="1">
+        <a:scrgbClr r="0" g="0" b="0"/>
+      </a:fillRef>
+      <a:effectRef idx="0">
+        <a:scrgbClr r="0" g="0" b="0"/>
+      </a:effectRef>
+      <a:fontRef idx="minor"/>
+    </dgm:style>
+  </dgm:styleLbl>
+  <dgm:styleLbl name="trBgShp">
+    <dgm:scene3d>
+      <a:camera prst="orthographicFront"/>
+      <a:lightRig rig="threePt" dir="t"/>
+    </dgm:scene3d>
+    <dgm:sp3d/>
+    <dgm:txPr/>
+    <dgm:style>
+      <a:lnRef idx="0">
+        <a:scrgbClr r="0" g="0" b="0"/>
+      </a:lnRef>
+      <a:fillRef idx="1">
+        <a:scrgbClr r="0" g="0" b="0"/>
+      </a:fillRef>
+      <a:effectRef idx="0">
+        <a:scrgbClr r="0" g="0" b="0"/>
+      </a:effectRef>
+      <a:fontRef idx="minor"/>
+    </dgm:style>
+  </dgm:styleLbl>
+  <dgm:styleLbl name="fgShp">
+    <dgm:scene3d>
+      <a:camera prst="orthographicFront"/>
+      <a:lightRig rig="threePt" dir="t"/>
+    </dgm:scene3d>
+    <dgm:sp3d/>
+    <dgm:txPr/>
+    <dgm:style>
+      <a:lnRef idx="2">
+        <a:scrgbClr r="0" g="0" b="0"/>
+      </a:lnRef>
+      <a:fillRef idx="1">
+        <a:scrgbClr r="0" g="0" b="0"/>
+      </a:fillRef>
+      <a:effectRef idx="0">
+        <a:scrgbClr r="0" g="0" b="0"/>
+      </a:effectRef>
+      <a:fontRef idx="minor"/>
+    </dgm:style>
+  </dgm:styleLbl>
+  <dgm:styleLbl name="revTx">
+    <dgm:scene3d>
+      <a:camera prst="orthographicFront"/>
+      <a:lightRig rig="threePt" dir="t"/>
+    </dgm:scene3d>
+    <dgm:sp3d/>
+    <dgm:txPr/>
+    <dgm:style>
+      <a:lnRef idx="0">
+        <a:scrgbClr r="0" g="0" b="0"/>
+      </a:lnRef>
+      <a:fillRef idx="0">
+        <a:scrgbClr r="0" g="0" b="0"/>
+      </a:fillRef>
+      <a:effectRef idx="0">
+        <a:scrgbClr r="0" g="0" b="0"/>
+      </a:effectRef>
+      <a:fontRef idx="minor"/>
+    </dgm:style>
+  </dgm:styleLbl>
+</dgm:styleDef>
+</file>
+
+<file path=ppt/diagrams/quickStyle2.xml><?xml version="1.0" encoding="utf-8"?>
 <dgm:styleDef xmlns:dgm="http://schemas.openxmlformats.org/drawingml/2006/diagram" xmlns:a="http://schemas.openxmlformats.org/drawingml/2006/main" uniqueId="urn:microsoft.com/office/officeart/2005/8/quickstyle/simple1">
   <dgm:title val=""/>
   <dgm:desc val=""/>
@@ -4395,7 +8522,7 @@
           <a:p>
             <a:fld id="{8AC6D50A-D06E-8F4A-9608-5BEA5D9EC503}" type="datetimeFigureOut">
               <a:rPr lang="en-US" smtClean="0"/>
-              <a:t>4/22/22</a:t>
+              <a:t>4/25/22</a:t>
             </a:fld>
             <a:endParaRPr lang="en-US"/>
           </a:p>
@@ -4593,7 +8720,7 @@
           <a:p>
             <a:fld id="{8AC6D50A-D06E-8F4A-9608-5BEA5D9EC503}" type="datetimeFigureOut">
               <a:rPr lang="en-US" smtClean="0"/>
-              <a:t>4/22/22</a:t>
+              <a:t>4/25/22</a:t>
             </a:fld>
             <a:endParaRPr lang="en-US"/>
           </a:p>
@@ -4801,7 +8928,7 @@
           <a:p>
             <a:fld id="{8AC6D50A-D06E-8F4A-9608-5BEA5D9EC503}" type="datetimeFigureOut">
               <a:rPr lang="en-US" smtClean="0"/>
-              <a:t>4/22/22</a:t>
+              <a:t>4/25/22</a:t>
             </a:fld>
             <a:endParaRPr lang="en-US"/>
           </a:p>
@@ -4999,7 +9126,7 @@
           <a:p>
             <a:fld id="{8AC6D50A-D06E-8F4A-9608-5BEA5D9EC503}" type="datetimeFigureOut">
               <a:rPr lang="en-US" smtClean="0"/>
-              <a:t>4/22/22</a:t>
+              <a:t>4/25/22</a:t>
             </a:fld>
             <a:endParaRPr lang="en-US"/>
           </a:p>
@@ -5274,7 +9401,7 @@
           <a:p>
             <a:fld id="{8AC6D50A-D06E-8F4A-9608-5BEA5D9EC503}" type="datetimeFigureOut">
               <a:rPr lang="en-US" smtClean="0"/>
-              <a:t>4/22/22</a:t>
+              <a:t>4/25/22</a:t>
             </a:fld>
             <a:endParaRPr lang="en-US"/>
           </a:p>
@@ -5539,7 +9666,7 @@
           <a:p>
             <a:fld id="{8AC6D50A-D06E-8F4A-9608-5BEA5D9EC503}" type="datetimeFigureOut">
               <a:rPr lang="en-US" smtClean="0"/>
-              <a:t>4/22/22</a:t>
+              <a:t>4/25/22</a:t>
             </a:fld>
             <a:endParaRPr lang="en-US"/>
           </a:p>
@@ -5951,7 +10078,7 @@
           <a:p>
             <a:fld id="{8AC6D50A-D06E-8F4A-9608-5BEA5D9EC503}" type="datetimeFigureOut">
               <a:rPr lang="en-US" smtClean="0"/>
-              <a:t>4/22/22</a:t>
+              <a:t>4/25/22</a:t>
             </a:fld>
             <a:endParaRPr lang="en-US"/>
           </a:p>
@@ -6092,7 +10219,7 @@
           <a:p>
             <a:fld id="{8AC6D50A-D06E-8F4A-9608-5BEA5D9EC503}" type="datetimeFigureOut">
               <a:rPr lang="en-US" smtClean="0"/>
-              <a:t>4/22/22</a:t>
+              <a:t>4/25/22</a:t>
             </a:fld>
             <a:endParaRPr lang="en-US"/>
           </a:p>
@@ -6205,7 +10332,7 @@
           <a:p>
             <a:fld id="{8AC6D50A-D06E-8F4A-9608-5BEA5D9EC503}" type="datetimeFigureOut">
               <a:rPr lang="en-US" smtClean="0"/>
-              <a:t>4/22/22</a:t>
+              <a:t>4/25/22</a:t>
             </a:fld>
             <a:endParaRPr lang="en-US"/>
           </a:p>
@@ -6516,7 +10643,7 @@
           <a:p>
             <a:fld id="{8AC6D50A-D06E-8F4A-9608-5BEA5D9EC503}" type="datetimeFigureOut">
               <a:rPr lang="en-US" smtClean="0"/>
-              <a:t>4/22/22</a:t>
+              <a:t>4/25/22</a:t>
             </a:fld>
             <a:endParaRPr lang="en-US"/>
           </a:p>
@@ -6804,7 +10931,7 @@
           <a:p>
             <a:fld id="{8AC6D50A-D06E-8F4A-9608-5BEA5D9EC503}" type="datetimeFigureOut">
               <a:rPr lang="en-US" smtClean="0"/>
-              <a:t>4/22/22</a:t>
+              <a:t>4/25/22</a:t>
             </a:fld>
             <a:endParaRPr lang="en-US"/>
           </a:p>
@@ -7045,7 +11172,7 @@
           <a:p>
             <a:fld id="{8AC6D50A-D06E-8F4A-9608-5BEA5D9EC503}" type="datetimeFigureOut">
               <a:rPr lang="en-US" smtClean="0"/>
-              <a:t>4/22/22</a:t>
+              <a:t>4/25/22</a:t>
             </a:fld>
             <a:endParaRPr lang="en-US"/>
           </a:p>
@@ -7475,10 +11602,293 @@
           <p:nvPr>
             <p:extLst>
               <p:ext uri="{D42A27DB-BD31-4B8C-83A1-F6EECF244321}">
-                <p14:modId xmlns:p14="http://schemas.microsoft.com/office/powerpoint/2010/main" val="4140711727"/>
+                <p14:modId xmlns:p14="http://schemas.microsoft.com/office/powerpoint/2010/main" val="4203187382"/>
               </p:ext>
             </p:extLst>
           </p:nvPr>
+        </p:nvGraphicFramePr>
+        <p:xfrm>
+          <a:off x="2032000" y="719666"/>
+          <a:ext cx="8128000" cy="5418667"/>
+        </p:xfrm>
+        <a:graphic>
+          <a:graphicData uri="http://schemas.openxmlformats.org/drawingml/2006/diagram">
+            <dgm:relIds xmlns:dgm="http://schemas.openxmlformats.org/drawingml/2006/diagram" xmlns:r="http://schemas.openxmlformats.org/officeDocument/2006/relationships" r:dm="rId2" r:lo="rId3" r:qs="rId4" r:cs="rId5"/>
+          </a:graphicData>
+        </a:graphic>
+      </p:graphicFrame>
+      <p:pic>
+        <p:nvPicPr>
+          <p:cNvPr id="1026" name="Picture 2" descr="NDX Catalog Logo">
+            <a:extLst>
+              <a:ext uri="{FF2B5EF4-FFF2-40B4-BE49-F238E27FC236}">
+                <a16:creationId xmlns:a16="http://schemas.microsoft.com/office/drawing/2014/main" id="{7989E1A5-99BB-E847-9EC6-939D51D6AB44}"/>
+              </a:ext>
+            </a:extLst>
+          </p:cNvPr>
+          <p:cNvPicPr>
+            <a:picLocks noChangeAspect="1" noChangeArrowheads="1"/>
+          </p:cNvPicPr>
+          <p:nvPr/>
+        </p:nvPicPr>
+        <p:blipFill>
+          <a:blip r:embed="rId7">
+            <a:extLst>
+              <a:ext uri="{28A0092B-C50C-407E-A947-70E740481C1C}">
+                <a14:useLocalDpi xmlns:a14="http://schemas.microsoft.com/office/drawing/2010/main" val="0"/>
+              </a:ext>
+            </a:extLst>
+          </a:blip>
+          <a:srcRect/>
+          <a:stretch>
+            <a:fillRect/>
+          </a:stretch>
+        </p:blipFill>
+        <p:spPr bwMode="auto">
+          <a:xfrm>
+            <a:off x="6355405" y="1065390"/>
+            <a:ext cx="3247678" cy="1118081"/>
+          </a:xfrm>
+          <a:prstGeom prst="rect">
+            <a:avLst/>
+          </a:prstGeom>
+          <a:noFill/>
+          <a:extLst>
+            <a:ext uri="{909E8E84-426E-40DD-AFC4-6F175D3DCCD1}">
+              <a14:hiddenFill xmlns:a14="http://schemas.microsoft.com/office/drawing/2010/main">
+                <a:solidFill>
+                  <a:srgbClr val="FFFFFF"/>
+                </a:solidFill>
+              </a14:hiddenFill>
+            </a:ext>
+          </a:extLst>
+        </p:spPr>
+      </p:pic>
+      <p:pic>
+        <p:nvPicPr>
+          <p:cNvPr id="8" name="Graphic 7">
+            <a:extLst>
+              <a:ext uri="{FF2B5EF4-FFF2-40B4-BE49-F238E27FC236}">
+                <a16:creationId xmlns:a16="http://schemas.microsoft.com/office/drawing/2014/main" id="{F62A146F-E544-FE4E-B36F-D3EE9476BF2D}"/>
+              </a:ext>
+            </a:extLst>
+          </p:cNvPr>
+          <p:cNvPicPr>
+            <a:picLocks noChangeAspect="1"/>
+          </p:cNvPicPr>
+          <p:nvPr/>
+        </p:nvPicPr>
+        <p:blipFill>
+          <a:blip r:embed="rId8">
+            <a:extLst>
+              <a:ext uri="{96DAC541-7B7A-43D3-8B79-37D633B846F1}">
+                <asvg:svgBlip xmlns:asvg="http://schemas.microsoft.com/office/drawing/2016/SVG/main" r:embed="rId9"/>
+              </a:ext>
+            </a:extLst>
+          </a:blip>
+          <a:stretch>
+            <a:fillRect/>
+          </a:stretch>
+        </p:blipFill>
+        <p:spPr>
+          <a:xfrm>
+            <a:off x="4146939" y="2166083"/>
+            <a:ext cx="1550971" cy="1159059"/>
+          </a:xfrm>
+          <a:prstGeom prst="rect">
+            <a:avLst/>
+          </a:prstGeom>
+        </p:spPr>
+      </p:pic>
+      <p:pic>
+        <p:nvPicPr>
+          <p:cNvPr id="3" name="Picture 2" descr="A picture containing text&#10;&#10;Description automatically generated">
+            <a:extLst>
+              <a:ext uri="{FF2B5EF4-FFF2-40B4-BE49-F238E27FC236}">
+                <a16:creationId xmlns:a16="http://schemas.microsoft.com/office/drawing/2014/main" id="{51518AB7-CD95-1343-B546-C9BEA3F2CD27}"/>
+              </a:ext>
+            </a:extLst>
+          </p:cNvPr>
+          <p:cNvPicPr>
+            <a:picLocks noChangeAspect="1"/>
+          </p:cNvPicPr>
+          <p:nvPr/>
+        </p:nvPicPr>
+        <p:blipFill>
+          <a:blip r:embed="rId10"/>
+          <a:stretch>
+            <a:fillRect/>
+          </a:stretch>
+        </p:blipFill>
+        <p:spPr>
+          <a:xfrm>
+            <a:off x="1989041" y="3784424"/>
+            <a:ext cx="1619463" cy="663979"/>
+          </a:xfrm>
+          <a:prstGeom prst="rect">
+            <a:avLst/>
+          </a:prstGeom>
+        </p:spPr>
+      </p:pic>
+      <p:pic>
+        <p:nvPicPr>
+          <p:cNvPr id="6" name="Picture 5" descr="Icon&#10;&#10;Description automatically generated">
+            <a:extLst>
+              <a:ext uri="{FF2B5EF4-FFF2-40B4-BE49-F238E27FC236}">
+                <a16:creationId xmlns:a16="http://schemas.microsoft.com/office/drawing/2014/main" id="{DC35A8F8-2DFC-A640-AFAF-480ECAE8B9A8}"/>
+              </a:ext>
+            </a:extLst>
+          </p:cNvPr>
+          <p:cNvPicPr>
+            <a:picLocks noChangeAspect="1"/>
+          </p:cNvPicPr>
+          <p:nvPr/>
+        </p:nvPicPr>
+        <p:blipFill>
+          <a:blip r:embed="rId11"/>
+          <a:stretch>
+            <a:fillRect/>
+          </a:stretch>
+        </p:blipFill>
+        <p:spPr>
+          <a:xfrm>
+            <a:off x="2266538" y="2978091"/>
+            <a:ext cx="1054963" cy="876938"/>
+          </a:xfrm>
+          <a:prstGeom prst="rect">
+            <a:avLst/>
+          </a:prstGeom>
+        </p:spPr>
+      </p:pic>
+    </p:spTree>
+    <p:extLst>
+      <p:ext uri="{BB962C8B-B14F-4D97-AF65-F5344CB8AC3E}">
+        <p14:creationId xmlns:p14="http://schemas.microsoft.com/office/powerpoint/2010/main" val="857639491"/>
+      </p:ext>
+    </p:extLst>
+  </p:cSld>
+  <p:clrMapOvr>
+    <a:masterClrMapping/>
+  </p:clrMapOvr>
+</p:sld>
+</file>
+
+<file path=ppt/slides/slide2.xml><?xml version="1.0" encoding="utf-8"?>
+<p:sld xmlns:a="http://schemas.openxmlformats.org/drawingml/2006/main" xmlns:r="http://schemas.openxmlformats.org/officeDocument/2006/relationships" xmlns:p="http://schemas.openxmlformats.org/presentationml/2006/main">
+  <p:cSld>
+    <p:spTree>
+      <p:nvGrpSpPr>
+        <p:cNvPr id="1" name=""/>
+        <p:cNvGrpSpPr/>
+        <p:nvPr/>
+      </p:nvGrpSpPr>
+      <p:grpSpPr>
+        <a:xfrm>
+          <a:off x="0" y="0"/>
+          <a:ext cx="0" cy="0"/>
+          <a:chOff x="0" y="0"/>
+          <a:chExt cx="0" cy="0"/>
+        </a:xfrm>
+      </p:grpSpPr>
+      <p:sp>
+        <p:nvSpPr>
+          <p:cNvPr id="2" name="Title 1">
+            <a:extLst>
+              <a:ext uri="{FF2B5EF4-FFF2-40B4-BE49-F238E27FC236}">
+                <a16:creationId xmlns:a16="http://schemas.microsoft.com/office/drawing/2014/main" id="{AC572763-4001-604C-AD80-5D4763D1B486}"/>
+              </a:ext>
+            </a:extLst>
+          </p:cNvPr>
+          <p:cNvSpPr>
+            <a:spLocks noGrp="1"/>
+          </p:cNvSpPr>
+          <p:nvPr>
+            <p:ph type="title"/>
+          </p:nvPr>
+        </p:nvSpPr>
+        <p:spPr/>
+        <p:txBody>
+          <a:bodyPr/>
+          <a:lstStyle/>
+          <a:p>
+            <a:r>
+              <a:rPr lang="en-US" dirty="0"/>
+              <a:t>Previous </a:t>
+            </a:r>
+            <a:r>
+              <a:rPr lang="en-US" dirty="0" err="1"/>
+              <a:t>Verions</a:t>
+            </a:r>
+            <a:endParaRPr lang="en-US" dirty="0"/>
+          </a:p>
+        </p:txBody>
+      </p:sp>
+      <p:sp>
+        <p:nvSpPr>
+          <p:cNvPr id="3" name="Content Placeholder 2">
+            <a:extLst>
+              <a:ext uri="{FF2B5EF4-FFF2-40B4-BE49-F238E27FC236}">
+                <a16:creationId xmlns:a16="http://schemas.microsoft.com/office/drawing/2014/main" id="{0E509F04-76B2-F442-8EAB-99301597B994}"/>
+              </a:ext>
+            </a:extLst>
+          </p:cNvPr>
+          <p:cNvSpPr>
+            <a:spLocks noGrp="1"/>
+          </p:cNvSpPr>
+          <p:nvPr>
+            <p:ph idx="1"/>
+          </p:nvPr>
+        </p:nvSpPr>
+        <p:spPr/>
+        <p:txBody>
+          <a:bodyPr/>
+          <a:lstStyle/>
+          <a:p>
+            <a:endParaRPr lang="en-US"/>
+          </a:p>
+        </p:txBody>
+      </p:sp>
+    </p:spTree>
+    <p:extLst>
+      <p:ext uri="{BB962C8B-B14F-4D97-AF65-F5344CB8AC3E}">
+        <p14:creationId xmlns:p14="http://schemas.microsoft.com/office/powerpoint/2010/main" val="650708503"/>
+      </p:ext>
+    </p:extLst>
+  </p:cSld>
+  <p:clrMapOvr>
+    <a:masterClrMapping/>
+  </p:clrMapOvr>
+</p:sld>
+</file>
+
+<file path=ppt/slides/slide3.xml><?xml version="1.0" encoding="utf-8"?>
+<p:sld xmlns:a="http://schemas.openxmlformats.org/drawingml/2006/main" xmlns:r="http://schemas.openxmlformats.org/officeDocument/2006/relationships" xmlns:p="http://schemas.openxmlformats.org/presentationml/2006/main">
+  <p:cSld>
+    <p:spTree>
+      <p:nvGrpSpPr>
+        <p:cNvPr id="1" name=""/>
+        <p:cNvGrpSpPr/>
+        <p:nvPr/>
+      </p:nvGrpSpPr>
+      <p:grpSpPr>
+        <a:xfrm>
+          <a:off x="0" y="0"/>
+          <a:ext cx="0" cy="0"/>
+          <a:chOff x="0" y="0"/>
+          <a:chExt cx="0" cy="0"/>
+        </a:xfrm>
+      </p:grpSpPr>
+      <p:graphicFrame>
+        <p:nvGraphicFramePr>
+          <p:cNvPr id="4" name="Diagram 3">
+            <a:extLst>
+              <a:ext uri="{FF2B5EF4-FFF2-40B4-BE49-F238E27FC236}">
+                <a16:creationId xmlns:a16="http://schemas.microsoft.com/office/drawing/2014/main" id="{5FC4C9ED-D834-E942-AC62-ADF710117A33}"/>
+              </a:ext>
+            </a:extLst>
+          </p:cNvPr>
+          <p:cNvGraphicFramePr/>
+          <p:nvPr/>
         </p:nvGraphicFramePr>
         <p:xfrm>
           <a:off x="2032000" y="719666"/>
@@ -7623,7 +12033,7 @@
     </p:spTree>
     <p:extLst>
       <p:ext uri="{BB962C8B-B14F-4D97-AF65-F5344CB8AC3E}">
-        <p14:creationId xmlns:p14="http://schemas.microsoft.com/office/powerpoint/2010/main" val="857639491"/>
+        <p14:creationId xmlns:p14="http://schemas.microsoft.com/office/powerpoint/2010/main" val="3874467772"/>
       </p:ext>
     </p:extLst>
   </p:cSld>

</xml_diff>